<commit_message>
Lectures 2 to 5
</commit_message>
<xml_diff>
--- a/lecture1/lecture1.pptx
+++ b/lecture1/lecture1.pptx
@@ -5,7 +5,7 @@
     <p:sldMasterId id="2147483660" r:id="rId1"/>
   </p:sldMasterIdLst>
   <p:notesMasterIdLst>
-    <p:notesMasterId r:id="rId31"/>
+    <p:notesMasterId r:id="rId29"/>
   </p:notesMasterIdLst>
   <p:sldIdLst>
     <p:sldId id="256" r:id="rId2"/>
@@ -34,9 +34,7 @@
     <p:sldId id="281" r:id="rId25"/>
     <p:sldId id="282" r:id="rId26"/>
     <p:sldId id="286" r:id="rId27"/>
-    <p:sldId id="274" r:id="rId28"/>
-    <p:sldId id="275" r:id="rId29"/>
-    <p:sldId id="276" r:id="rId30"/>
+    <p:sldId id="287" r:id="rId28"/>
   </p:sldIdLst>
   <p:sldSz cx="12192000" cy="6858000"/>
   <p:notesSz cx="6858000" cy="9144000"/>
@@ -225,7 +223,7 @@
           <a:p>
             <a:fld id="{BD15EF38-3B10-40F0-B249-86CE6663FE34}" type="datetimeFigureOut">
               <a:rPr lang="en-US" smtClean="0"/>
-              <a:t>9/7/2021</a:t>
+              <a:t>10/20/2021</a:t>
             </a:fld>
             <a:endParaRPr lang="en-US"/>
           </a:p>
@@ -1299,7 +1297,7 @@
           <a:p>
             <a:fld id="{CE714A4D-0714-4252-833A-B8AD32A83945}" type="datetimeFigureOut">
               <a:rPr lang="en-US" smtClean="0"/>
-              <a:t>9/7/2021</a:t>
+              <a:t>10/20/2021</a:t>
             </a:fld>
             <a:endParaRPr lang="en-US"/>
           </a:p>
@@ -1550,7 +1548,7 @@
           <a:p>
             <a:fld id="{CE714A4D-0714-4252-833A-B8AD32A83945}" type="datetimeFigureOut">
               <a:rPr lang="en-US" smtClean="0"/>
-              <a:t>9/7/2021</a:t>
+              <a:t>10/20/2021</a:t>
             </a:fld>
             <a:endParaRPr lang="en-US"/>
           </a:p>
@@ -1864,7 +1862,7 @@
           <a:p>
             <a:fld id="{CE714A4D-0714-4252-833A-B8AD32A83945}" type="datetimeFigureOut">
               <a:rPr lang="en-US" smtClean="0"/>
-              <a:t>9/7/2021</a:t>
+              <a:t>10/20/2021</a:t>
             </a:fld>
             <a:endParaRPr lang="en-US"/>
           </a:p>
@@ -2205,7 +2203,7 @@
           <a:p>
             <a:fld id="{CE714A4D-0714-4252-833A-B8AD32A83945}" type="datetimeFigureOut">
               <a:rPr lang="en-US" smtClean="0"/>
-              <a:t>9/7/2021</a:t>
+              <a:t>10/20/2021</a:t>
             </a:fld>
             <a:endParaRPr lang="en-US"/>
           </a:p>
@@ -2519,7 +2517,7 @@
           <a:p>
             <a:fld id="{CE714A4D-0714-4252-833A-B8AD32A83945}" type="datetimeFigureOut">
               <a:rPr lang="en-US" smtClean="0"/>
-              <a:t>9/7/2021</a:t>
+              <a:t>10/20/2021</a:t>
             </a:fld>
             <a:endParaRPr lang="en-US"/>
           </a:p>
@@ -2912,7 +2910,7 @@
           <a:p>
             <a:fld id="{CE714A4D-0714-4252-833A-B8AD32A83945}" type="datetimeFigureOut">
               <a:rPr lang="en-US" smtClean="0"/>
-              <a:t>9/7/2021</a:t>
+              <a:t>10/20/2021</a:t>
             </a:fld>
             <a:endParaRPr lang="en-US"/>
           </a:p>
@@ -3082,7 +3080,7 @@
           <a:p>
             <a:fld id="{CE714A4D-0714-4252-833A-B8AD32A83945}" type="datetimeFigureOut">
               <a:rPr lang="en-US" smtClean="0"/>
-              <a:t>9/7/2021</a:t>
+              <a:t>10/20/2021</a:t>
             </a:fld>
             <a:endParaRPr lang="en-US"/>
           </a:p>
@@ -3262,7 +3260,7 @@
           <a:p>
             <a:fld id="{CE714A4D-0714-4252-833A-B8AD32A83945}" type="datetimeFigureOut">
               <a:rPr lang="en-US" smtClean="0"/>
-              <a:t>9/7/2021</a:t>
+              <a:t>10/20/2021</a:t>
             </a:fld>
             <a:endParaRPr lang="en-US"/>
           </a:p>
@@ -3438,7 +3436,7 @@
           <a:p>
             <a:fld id="{CE714A4D-0714-4252-833A-B8AD32A83945}" type="datetimeFigureOut">
               <a:rPr lang="en-US" smtClean="0"/>
-              <a:t>9/7/2021</a:t>
+              <a:t>10/20/2021</a:t>
             </a:fld>
             <a:endParaRPr lang="en-US"/>
           </a:p>
@@ -3685,7 +3683,7 @@
           <a:p>
             <a:fld id="{CE714A4D-0714-4252-833A-B8AD32A83945}" type="datetimeFigureOut">
               <a:rPr lang="en-US" smtClean="0"/>
-              <a:t>9/7/2021</a:t>
+              <a:t>10/20/2021</a:t>
             </a:fld>
             <a:endParaRPr lang="en-US"/>
           </a:p>
@@ -3917,7 +3915,7 @@
           <a:p>
             <a:fld id="{CE714A4D-0714-4252-833A-B8AD32A83945}" type="datetimeFigureOut">
               <a:rPr lang="en-US" smtClean="0"/>
-              <a:t>9/7/2021</a:t>
+              <a:t>10/20/2021</a:t>
             </a:fld>
             <a:endParaRPr lang="en-US"/>
           </a:p>
@@ -4291,7 +4289,7 @@
           <a:p>
             <a:fld id="{CE714A4D-0714-4252-833A-B8AD32A83945}" type="datetimeFigureOut">
               <a:rPr lang="en-US" smtClean="0"/>
-              <a:t>9/7/2021</a:t>
+              <a:t>10/20/2021</a:t>
             </a:fld>
             <a:endParaRPr lang="en-US"/>
           </a:p>
@@ -4414,7 +4412,7 @@
           <a:p>
             <a:fld id="{CE714A4D-0714-4252-833A-B8AD32A83945}" type="datetimeFigureOut">
               <a:rPr lang="en-US" smtClean="0"/>
-              <a:t>9/7/2021</a:t>
+              <a:t>10/20/2021</a:t>
             </a:fld>
             <a:endParaRPr lang="en-US"/>
           </a:p>
@@ -4509,7 +4507,7 @@
           <a:p>
             <a:fld id="{CE714A4D-0714-4252-833A-B8AD32A83945}" type="datetimeFigureOut">
               <a:rPr lang="en-US" smtClean="0"/>
-              <a:t>9/7/2021</a:t>
+              <a:t>10/20/2021</a:t>
             </a:fld>
             <a:endParaRPr lang="en-US"/>
           </a:p>
@@ -4764,7 +4762,7 @@
           <a:p>
             <a:fld id="{CE714A4D-0714-4252-833A-B8AD32A83945}" type="datetimeFigureOut">
               <a:rPr lang="en-US" smtClean="0"/>
-              <a:t>9/7/2021</a:t>
+              <a:t>10/20/2021</a:t>
             </a:fld>
             <a:endParaRPr lang="en-US"/>
           </a:p>
@@ -5027,7 +5025,7 @@
           <a:p>
             <a:fld id="{CE714A4D-0714-4252-833A-B8AD32A83945}" type="datetimeFigureOut">
               <a:rPr lang="en-US" smtClean="0"/>
-              <a:t>9/7/2021</a:t>
+              <a:t>10/20/2021</a:t>
             </a:fld>
             <a:endParaRPr lang="en-US"/>
           </a:p>
@@ -5770,7 +5768,7 @@
           <a:p>
             <a:fld id="{CE714A4D-0714-4252-833A-B8AD32A83945}" type="datetimeFigureOut">
               <a:rPr lang="en-US" smtClean="0"/>
-              <a:t>9/7/2021</a:t>
+              <a:t>10/20/2021</a:t>
             </a:fld>
             <a:endParaRPr lang="en-US"/>
           </a:p>
@@ -23496,25 +23494,6 @@
       </p:grpSpPr>
       <p:sp>
         <p:nvSpPr>
-          <p:cNvPr id="3" name="Объект 2"/>
-          <p:cNvSpPr>
-            <a:spLocks noGrp="1"/>
-          </p:cNvSpPr>
-          <p:nvPr>
-            <p:ph idx="1"/>
-          </p:nvPr>
-        </p:nvSpPr>
-        <p:spPr/>
-        <p:txBody>
-          <a:bodyPr/>
-          <a:lstStyle/>
-          <a:p>
-            <a:endParaRPr lang="en-US"/>
-          </a:p>
-        </p:txBody>
-      </p:sp>
-      <p:sp>
-        <p:nvSpPr>
           <p:cNvPr id="4" name="Title 1">
             <a:extLst>
               <a:ext uri="{FF2B5EF4-FFF2-40B4-BE49-F238E27FC236}">
@@ -23623,6 +23602,14 @@
           <a:p>
             <a:pPr algn="ctr"/>
             <a:r>
+              <a:rPr lang="ru-RU" sz="2800" dirty="0" smtClean="0"/>
+              <a:t>Неупорядоченные контейнеры</a:t>
+            </a:r>
+            <a:r>
+              <a:rPr lang="en-US" sz="2800" dirty="0" smtClean="0"/>
+              <a:t>. </a:t>
+            </a:r>
+            <a:r>
               <a:rPr lang="en-US" sz="2800" dirty="0" err="1" smtClean="0"/>
               <a:t>std</a:t>
             </a:r>
@@ -23632,24 +23619,621 @@
             </a:r>
             <a:r>
               <a:rPr lang="en-US" sz="2800" dirty="0" err="1" smtClean="0"/>
-              <a:t>priority_queue</a:t>
-            </a:r>
-            <a:r>
-              <a:rPr lang="ru-RU" sz="2800" dirty="0" smtClean="0"/>
-              <a:t> </a:t>
-            </a:r>
-            <a:r>
-              <a:rPr lang="en-US" sz="2800" dirty="0" smtClean="0"/>
-              <a:t>:</a:t>
-            </a:r>
-            <a:r>
-              <a:rPr lang="ru-RU" sz="2800" dirty="0" smtClean="0"/>
-              <a:t> Почему это контейнер-адаптер?</a:t>
+              <a:t>unordered_set</a:t>
             </a:r>
             <a:endParaRPr lang="en-US" sz="2800" dirty="0"/>
           </a:p>
         </p:txBody>
       </p:sp>
+      <p:pic>
+        <p:nvPicPr>
+          <p:cNvPr id="2" name="Рисунок 1"/>
+          <p:cNvPicPr>
+            <a:picLocks noChangeAspect="1"/>
+          </p:cNvPicPr>
+          <p:nvPr/>
+        </p:nvPicPr>
+        <p:blipFill>
+          <a:blip r:embed="rId2"/>
+          <a:stretch>
+            <a:fillRect/>
+          </a:stretch>
+        </p:blipFill>
+        <p:spPr>
+          <a:xfrm>
+            <a:off x="235669" y="1217477"/>
+            <a:ext cx="4039501" cy="1543478"/>
+          </a:xfrm>
+          <a:prstGeom prst="rect">
+            <a:avLst/>
+          </a:prstGeom>
+        </p:spPr>
+      </p:pic>
+      <p:sp>
+        <p:nvSpPr>
+          <p:cNvPr id="6" name="Прямоугольник 5"/>
+          <p:cNvSpPr/>
+          <p:nvPr/>
+        </p:nvSpPr>
+        <p:spPr>
+          <a:xfrm>
+            <a:off x="153880" y="809265"/>
+            <a:ext cx="4521887" cy="286497"/>
+          </a:xfrm>
+          <a:prstGeom prst="rect">
+            <a:avLst/>
+          </a:prstGeom>
+        </p:spPr>
+        <p:txBody>
+          <a:bodyPr wrap="square">
+            <a:spAutoFit/>
+          </a:bodyPr>
+          <a:lstStyle/>
+          <a:p>
+            <a:r>
+              <a:rPr lang="en-US" sz="1200" dirty="0"/>
+              <a:t>https://en.cppreference.com/w/cpp/container/unordered_set</a:t>
+            </a:r>
+            <a:endParaRPr lang="en-US" dirty="0"/>
+          </a:p>
+        </p:txBody>
+      </p:sp>
+      <p:pic>
+        <p:nvPicPr>
+          <p:cNvPr id="7" name="Рисунок 6"/>
+          <p:cNvPicPr>
+            <a:picLocks noChangeAspect="1"/>
+          </p:cNvPicPr>
+          <p:nvPr/>
+        </p:nvPicPr>
+        <p:blipFill>
+          <a:blip r:embed="rId3"/>
+          <a:stretch>
+            <a:fillRect/>
+          </a:stretch>
+        </p:blipFill>
+        <p:spPr>
+          <a:xfrm>
+            <a:off x="471076" y="3060233"/>
+            <a:ext cx="4338688" cy="3187084"/>
+          </a:xfrm>
+          <a:prstGeom prst="rect">
+            <a:avLst/>
+          </a:prstGeom>
+        </p:spPr>
+      </p:pic>
+      <mc:AlternateContent xmlns:mc="http://schemas.openxmlformats.org/markup-compatibility/2006" xmlns:a14="http://schemas.microsoft.com/office/drawing/2010/main">
+        <mc:Choice Requires="a14">
+          <p:sp>
+            <p:nvSpPr>
+              <p:cNvPr id="11" name="Объект 2"/>
+              <p:cNvSpPr txBox="1">
+                <a:spLocks/>
+              </p:cNvSpPr>
+              <p:nvPr/>
+            </p:nvSpPr>
+            <p:spPr>
+              <a:xfrm>
+                <a:off x="5344357" y="809265"/>
+                <a:ext cx="6655965" cy="5765359"/>
+              </a:xfrm>
+              <a:prstGeom prst="rect">
+                <a:avLst/>
+              </a:prstGeom>
+              <a:solidFill>
+                <a:schemeClr val="bg1"/>
+              </a:solidFill>
+            </p:spPr>
+            <p:txBody>
+              <a:bodyPr vert="horz" lIns="91440" tIns="45720" rIns="91440" bIns="45720" rtlCol="0">
+                <a:normAutofit/>
+              </a:bodyPr>
+              <a:lstStyle>
+                <a:lvl1pPr marL="342900" indent="-342900" algn="l" defTabSz="457200" rtl="0" eaLnBrk="1" latinLnBrk="0" hangingPunct="1">
+                  <a:spcBef>
+                    <a:spcPts val="1000"/>
+                  </a:spcBef>
+                  <a:spcAft>
+                    <a:spcPts val="0"/>
+                  </a:spcAft>
+                  <a:buClr>
+                    <a:schemeClr val="accent1"/>
+                  </a:buClr>
+                  <a:buSzPct val="80000"/>
+                  <a:buFont typeface="Wingdings 3" charset="2"/>
+                  <a:buChar char=""/>
+                  <a:defRPr sz="1800" kern="1200">
+                    <a:solidFill>
+                      <a:schemeClr val="tx1">
+                        <a:lumMod val="75000"/>
+                        <a:lumOff val="25000"/>
+                      </a:schemeClr>
+                    </a:solidFill>
+                    <a:latin typeface="+mn-lt"/>
+                    <a:ea typeface="+mn-ea"/>
+                    <a:cs typeface="+mn-cs"/>
+                  </a:defRPr>
+                </a:lvl1pPr>
+                <a:lvl2pPr marL="742950" indent="-285750" algn="l" defTabSz="457200" rtl="0" eaLnBrk="1" latinLnBrk="0" hangingPunct="1">
+                  <a:spcBef>
+                    <a:spcPts val="1000"/>
+                  </a:spcBef>
+                  <a:spcAft>
+                    <a:spcPts val="0"/>
+                  </a:spcAft>
+                  <a:buClr>
+                    <a:schemeClr val="accent1"/>
+                  </a:buClr>
+                  <a:buSzPct val="80000"/>
+                  <a:buFont typeface="Wingdings 3" charset="2"/>
+                  <a:buChar char=""/>
+                  <a:defRPr sz="1600" kern="1200">
+                    <a:solidFill>
+                      <a:schemeClr val="tx1">
+                        <a:lumMod val="75000"/>
+                        <a:lumOff val="25000"/>
+                      </a:schemeClr>
+                    </a:solidFill>
+                    <a:latin typeface="+mn-lt"/>
+                    <a:ea typeface="+mn-ea"/>
+                    <a:cs typeface="+mn-cs"/>
+                  </a:defRPr>
+                </a:lvl2pPr>
+                <a:lvl3pPr marL="1143000" indent="-228600" algn="l" defTabSz="457200" rtl="0" eaLnBrk="1" latinLnBrk="0" hangingPunct="1">
+                  <a:spcBef>
+                    <a:spcPts val="1000"/>
+                  </a:spcBef>
+                  <a:spcAft>
+                    <a:spcPts val="0"/>
+                  </a:spcAft>
+                  <a:buClr>
+                    <a:schemeClr val="accent1"/>
+                  </a:buClr>
+                  <a:buSzPct val="80000"/>
+                  <a:buFont typeface="Wingdings 3" charset="2"/>
+                  <a:buChar char=""/>
+                  <a:defRPr sz="1400" kern="1200">
+                    <a:solidFill>
+                      <a:schemeClr val="tx1">
+                        <a:lumMod val="75000"/>
+                        <a:lumOff val="25000"/>
+                      </a:schemeClr>
+                    </a:solidFill>
+                    <a:latin typeface="+mn-lt"/>
+                    <a:ea typeface="+mn-ea"/>
+                    <a:cs typeface="+mn-cs"/>
+                  </a:defRPr>
+                </a:lvl3pPr>
+                <a:lvl4pPr marL="1600200" indent="-228600" algn="l" defTabSz="457200" rtl="0" eaLnBrk="1" latinLnBrk="0" hangingPunct="1">
+                  <a:spcBef>
+                    <a:spcPts val="1000"/>
+                  </a:spcBef>
+                  <a:spcAft>
+                    <a:spcPts val="0"/>
+                  </a:spcAft>
+                  <a:buClr>
+                    <a:schemeClr val="accent1"/>
+                  </a:buClr>
+                  <a:buSzPct val="80000"/>
+                  <a:buFont typeface="Wingdings 3" charset="2"/>
+                  <a:buChar char=""/>
+                  <a:defRPr sz="1200" kern="1200">
+                    <a:solidFill>
+                      <a:schemeClr val="tx1">
+                        <a:lumMod val="75000"/>
+                        <a:lumOff val="25000"/>
+                      </a:schemeClr>
+                    </a:solidFill>
+                    <a:latin typeface="+mn-lt"/>
+                    <a:ea typeface="+mn-ea"/>
+                    <a:cs typeface="+mn-cs"/>
+                  </a:defRPr>
+                </a:lvl4pPr>
+                <a:lvl5pPr marL="2057400" indent="-228600" algn="l" defTabSz="457200" rtl="0" eaLnBrk="1" latinLnBrk="0" hangingPunct="1">
+                  <a:spcBef>
+                    <a:spcPts val="1000"/>
+                  </a:spcBef>
+                  <a:spcAft>
+                    <a:spcPts val="0"/>
+                  </a:spcAft>
+                  <a:buClr>
+                    <a:schemeClr val="accent1"/>
+                  </a:buClr>
+                  <a:buSzPct val="80000"/>
+                  <a:buFont typeface="Wingdings 3" charset="2"/>
+                  <a:buChar char=""/>
+                  <a:defRPr sz="1200" kern="1200">
+                    <a:solidFill>
+                      <a:schemeClr val="tx1">
+                        <a:lumMod val="75000"/>
+                        <a:lumOff val="25000"/>
+                      </a:schemeClr>
+                    </a:solidFill>
+                    <a:latin typeface="+mn-lt"/>
+                    <a:ea typeface="+mn-ea"/>
+                    <a:cs typeface="+mn-cs"/>
+                  </a:defRPr>
+                </a:lvl5pPr>
+                <a:lvl6pPr marL="2514600" indent="-228600" algn="l" defTabSz="457200" rtl="0" eaLnBrk="1" latinLnBrk="0" hangingPunct="1">
+                  <a:spcBef>
+                    <a:spcPts val="1000"/>
+                  </a:spcBef>
+                  <a:spcAft>
+                    <a:spcPts val="0"/>
+                  </a:spcAft>
+                  <a:buClr>
+                    <a:schemeClr val="accent1"/>
+                  </a:buClr>
+                  <a:buSzPct val="80000"/>
+                  <a:buFont typeface="Wingdings 3" charset="2"/>
+                  <a:buChar char=""/>
+                  <a:defRPr sz="1200" kern="1200">
+                    <a:solidFill>
+                      <a:schemeClr val="tx1">
+                        <a:lumMod val="75000"/>
+                        <a:lumOff val="25000"/>
+                      </a:schemeClr>
+                    </a:solidFill>
+                    <a:latin typeface="+mn-lt"/>
+                    <a:ea typeface="+mn-ea"/>
+                    <a:cs typeface="+mn-cs"/>
+                  </a:defRPr>
+                </a:lvl6pPr>
+                <a:lvl7pPr marL="2971800" indent="-228600" algn="l" defTabSz="457200" rtl="0" eaLnBrk="1" latinLnBrk="0" hangingPunct="1">
+                  <a:spcBef>
+                    <a:spcPts val="1000"/>
+                  </a:spcBef>
+                  <a:spcAft>
+                    <a:spcPts val="0"/>
+                  </a:spcAft>
+                  <a:buClr>
+                    <a:schemeClr val="accent1"/>
+                  </a:buClr>
+                  <a:buSzPct val="80000"/>
+                  <a:buFont typeface="Wingdings 3" charset="2"/>
+                  <a:buChar char=""/>
+                  <a:defRPr sz="1200" kern="1200">
+                    <a:solidFill>
+                      <a:schemeClr val="tx1">
+                        <a:lumMod val="75000"/>
+                        <a:lumOff val="25000"/>
+                      </a:schemeClr>
+                    </a:solidFill>
+                    <a:latin typeface="+mn-lt"/>
+                    <a:ea typeface="+mn-ea"/>
+                    <a:cs typeface="+mn-cs"/>
+                  </a:defRPr>
+                </a:lvl7pPr>
+                <a:lvl8pPr marL="3429000" indent="-228600" algn="l" defTabSz="457200" rtl="0" eaLnBrk="1" latinLnBrk="0" hangingPunct="1">
+                  <a:spcBef>
+                    <a:spcPts val="1000"/>
+                  </a:spcBef>
+                  <a:spcAft>
+                    <a:spcPts val="0"/>
+                  </a:spcAft>
+                  <a:buClr>
+                    <a:schemeClr val="accent1"/>
+                  </a:buClr>
+                  <a:buSzPct val="80000"/>
+                  <a:buFont typeface="Wingdings 3" charset="2"/>
+                  <a:buChar char=""/>
+                  <a:defRPr sz="1200" kern="1200">
+                    <a:solidFill>
+                      <a:schemeClr val="tx1">
+                        <a:lumMod val="75000"/>
+                        <a:lumOff val="25000"/>
+                      </a:schemeClr>
+                    </a:solidFill>
+                    <a:latin typeface="+mn-lt"/>
+                    <a:ea typeface="+mn-ea"/>
+                    <a:cs typeface="+mn-cs"/>
+                  </a:defRPr>
+                </a:lvl8pPr>
+                <a:lvl9pPr marL="3886200" indent="-228600" algn="l" defTabSz="457200" rtl="0" eaLnBrk="1" latinLnBrk="0" hangingPunct="1">
+                  <a:spcBef>
+                    <a:spcPts val="1000"/>
+                  </a:spcBef>
+                  <a:spcAft>
+                    <a:spcPts val="0"/>
+                  </a:spcAft>
+                  <a:buClr>
+                    <a:schemeClr val="accent1"/>
+                  </a:buClr>
+                  <a:buSzPct val="80000"/>
+                  <a:buFont typeface="Wingdings 3" charset="2"/>
+                  <a:buChar char=""/>
+                  <a:defRPr sz="1200" kern="1200">
+                    <a:solidFill>
+                      <a:schemeClr val="tx1">
+                        <a:lumMod val="75000"/>
+                        <a:lumOff val="25000"/>
+                      </a:schemeClr>
+                    </a:solidFill>
+                    <a:latin typeface="+mn-lt"/>
+                    <a:ea typeface="+mn-ea"/>
+                    <a:cs typeface="+mn-cs"/>
+                  </a:defRPr>
+                </a:lvl9pPr>
+              </a:lstStyle>
+              <a:p>
+                <a:r>
+                  <a:rPr lang="en-US" dirty="0" smtClean="0"/>
+                  <a:t>std::</a:t>
+                </a:r>
+                <a:r>
+                  <a:rPr lang="en-US" dirty="0" err="1" smtClean="0"/>
+                  <a:t>unordered_set</a:t>
+                </a:r>
+                <a:r>
+                  <a:rPr lang="en-US" dirty="0" smtClean="0"/>
+                  <a:t> – </a:t>
+                </a:r>
+                <a:r>
+                  <a:rPr lang="ru-RU" dirty="0" smtClean="0"/>
+                  <a:t>хэш-таблица (</a:t>
+                </a:r>
+                <a:r>
+                  <a:rPr lang="en-US" dirty="0" err="1" smtClean="0"/>
+                  <a:t>hashtable</a:t>
+                </a:r>
+                <a:r>
+                  <a:rPr lang="ru-RU" dirty="0" smtClean="0"/>
+                  <a:t>)</a:t>
+                </a:r>
+                <a:endParaRPr lang="en-US" dirty="0" smtClean="0"/>
+              </a:p>
+              <a:p>
+                <a:r>
+                  <a:rPr lang="ru-RU" dirty="0" smtClean="0"/>
+                  <a:t>Формальные параметры шаблона:</a:t>
+                </a:r>
+              </a:p>
+              <a:p>
+                <a:pPr marL="574675" indent="-234950" defTabSz="574675">
+                  <a:buFont typeface="Arial" panose="020B0604020202020204" pitchFamily="34" charset="0"/>
+                  <a:buChar char="•"/>
+                </a:pPr>
+                <a:r>
+                  <a:rPr lang="en-US" dirty="0" smtClean="0"/>
+                  <a:t>Hash – </a:t>
+                </a:r>
+                <a:r>
+                  <a:rPr lang="ru-RU" dirty="0" smtClean="0"/>
+                  <a:t>функциональный объект, </a:t>
+                </a:r>
+                <a:r>
+                  <a:rPr lang="ru-RU" dirty="0" err="1" smtClean="0"/>
+                  <a:t>релазизующий</a:t>
+                </a:r>
+                <a:r>
+                  <a:rPr lang="ru-RU" dirty="0" smtClean="0"/>
+                  <a:t> хэш-функцию</a:t>
+                </a:r>
+              </a:p>
+              <a:p>
+                <a:pPr marL="574675" indent="-234950" defTabSz="574675">
+                  <a:buFont typeface="Arial" panose="020B0604020202020204" pitchFamily="34" charset="0"/>
+                  <a:buChar char="•"/>
+                </a:pPr>
+                <a:r>
+                  <a:rPr lang="en-US" dirty="0" err="1" smtClean="0"/>
+                  <a:t>KeyEqual</a:t>
+                </a:r>
+                <a:r>
+                  <a:rPr lang="en-US" dirty="0" smtClean="0"/>
+                  <a:t> – </a:t>
+                </a:r>
+                <a:r>
+                  <a:rPr lang="ru-RU" dirty="0" smtClean="0"/>
+                  <a:t>функциональный объект, реализующий сравнение элементов</a:t>
+                </a:r>
+              </a:p>
+              <a:p>
+                <a:r>
+                  <a:rPr lang="ru-RU" dirty="0" smtClean="0"/>
+                  <a:t>При вставке ключа в контейнер, от данного ключа вычисляется хэш-функция. Ключ помещается в ячейку массива с индексом, равным соответствующему значению хэш-функции. Таким образом, значение ключа определяет его положение</a:t>
+                </a:r>
+              </a:p>
+              <a:p>
+                <a:r>
+                  <a:rPr lang="ru-RU" b="0" dirty="0" smtClean="0">
+                    <a:ea typeface="Cambria Math" panose="02040503050406030204" pitchFamily="18" charset="0"/>
+                  </a:rPr>
+                  <a:t>Для любого множества</a:t>
+                </a:r>
+                <a:r>
+                  <a:rPr lang="ru-RU" b="0" i="1" dirty="0" smtClean="0">
+                    <a:ea typeface="Cambria Math" panose="02040503050406030204" pitchFamily="18" charset="0"/>
+                  </a:rPr>
+                  <a:t> </a:t>
+                </a:r>
+                <a:r>
+                  <a:rPr lang="en-US" b="0" i="1" dirty="0" smtClean="0">
+                    <a:ea typeface="Cambria Math" panose="02040503050406030204" pitchFamily="18" charset="0"/>
+                  </a:rPr>
+                  <a:t>S </a:t>
+                </a:r>
+                <a:r>
+                  <a:rPr lang="ru-RU" b="0" dirty="0" smtClean="0">
+                    <a:ea typeface="Cambria Math" panose="02040503050406030204" pitchFamily="18" charset="0"/>
+                  </a:rPr>
+                  <a:t>и для любого положительного целого числа </a:t>
+                </a:r>
+                <a:r>
+                  <a:rPr lang="en-US" b="0" i="1" dirty="0" smtClean="0">
+                    <a:ea typeface="Cambria Math" panose="02040503050406030204" pitchFamily="18" charset="0"/>
+                  </a:rPr>
+                  <a:t>m</a:t>
+                </a:r>
+                <a:r>
+                  <a:rPr lang="en-US" b="0" dirty="0" smtClean="0">
+                    <a:ea typeface="Cambria Math" panose="02040503050406030204" pitchFamily="18" charset="0"/>
+                  </a:rPr>
+                  <a:t> </a:t>
+                </a:r>
+                <a:r>
+                  <a:rPr lang="ru-RU" b="0" dirty="0" smtClean="0">
+                    <a:ea typeface="Cambria Math" panose="02040503050406030204" pitchFamily="18" charset="0"/>
+                  </a:rPr>
+                  <a:t>функция </a:t>
+                </a:r>
+                <a14:m>
+                  <m:oMath xmlns:m="http://schemas.openxmlformats.org/officeDocument/2006/math">
+                    <m:r>
+                      <a:rPr lang="en-US" b="0" i="1" smtClean="0">
+                        <a:latin typeface="Cambria Math" panose="02040503050406030204" pitchFamily="18" charset="0"/>
+                        <a:ea typeface="Cambria Math" panose="02040503050406030204" pitchFamily="18" charset="0"/>
+                      </a:rPr>
+                      <m:t>h</m:t>
+                    </m:r>
+                    <m:r>
+                      <a:rPr lang="en-US" b="0" i="1" smtClean="0">
+                        <a:latin typeface="Cambria Math" panose="02040503050406030204" pitchFamily="18" charset="0"/>
+                        <a:ea typeface="Cambria Math" panose="02040503050406030204" pitchFamily="18" charset="0"/>
+                      </a:rPr>
+                      <m:t>:</m:t>
+                    </m:r>
+                    <m:r>
+                      <a:rPr lang="en-US" b="0" i="1" smtClean="0">
+                        <a:latin typeface="Cambria Math" panose="02040503050406030204" pitchFamily="18" charset="0"/>
+                        <a:ea typeface="Cambria Math" panose="02040503050406030204" pitchFamily="18" charset="0"/>
+                      </a:rPr>
+                      <m:t>𝑆</m:t>
+                    </m:r>
+                    <m:r>
+                      <a:rPr lang="en-US" b="0" i="1" smtClean="0">
+                        <a:latin typeface="Cambria Math" panose="02040503050406030204" pitchFamily="18" charset="0"/>
+                        <a:ea typeface="Cambria Math" panose="02040503050406030204" pitchFamily="18" charset="0"/>
+                      </a:rPr>
+                      <m:t> →</m:t>
+                    </m:r>
+                    <m:d>
+                      <m:dPr>
+                        <m:begChr m:val="{"/>
+                        <m:endChr m:val="}"/>
+                        <m:ctrlPr>
+                          <a:rPr lang="en-US" b="0" i="1" smtClean="0">
+                            <a:latin typeface="Cambria Math" panose="02040503050406030204" pitchFamily="18" charset="0"/>
+                            <a:ea typeface="Cambria Math" panose="02040503050406030204" pitchFamily="18" charset="0"/>
+                          </a:rPr>
+                        </m:ctrlPr>
+                      </m:dPr>
+                      <m:e>
+                        <m:r>
+                          <a:rPr lang="en-US" b="0" i="1" smtClean="0">
+                            <a:latin typeface="Cambria Math" panose="02040503050406030204" pitchFamily="18" charset="0"/>
+                            <a:ea typeface="Cambria Math" panose="02040503050406030204" pitchFamily="18" charset="0"/>
+                          </a:rPr>
+                          <m:t>0, 1, …, </m:t>
+                        </m:r>
+                        <m:r>
+                          <a:rPr lang="en-US" b="0" i="1" smtClean="0">
+                            <a:latin typeface="Cambria Math" panose="02040503050406030204" pitchFamily="18" charset="0"/>
+                            <a:ea typeface="Cambria Math" panose="02040503050406030204" pitchFamily="18" charset="0"/>
+                          </a:rPr>
+                          <m:t>𝑚</m:t>
+                        </m:r>
+                        <m:r>
+                          <a:rPr lang="en-US" b="0" i="1" smtClean="0">
+                            <a:latin typeface="Cambria Math" panose="02040503050406030204" pitchFamily="18" charset="0"/>
+                            <a:ea typeface="Cambria Math" panose="02040503050406030204" pitchFamily="18" charset="0"/>
+                          </a:rPr>
+                          <m:t>−1</m:t>
+                        </m:r>
+                      </m:e>
+                    </m:d>
+                  </m:oMath>
+                </a14:m>
+                <a:r>
+                  <a:rPr lang="ru-RU" b="0" dirty="0" smtClean="0">
+                    <a:ea typeface="Cambria Math" panose="02040503050406030204" pitchFamily="18" charset="0"/>
+                  </a:rPr>
+                  <a:t> - хэш-функция</a:t>
+                </a:r>
+              </a:p>
+              <a:p>
+                <a:r>
+                  <a:rPr lang="en-US" dirty="0" smtClean="0">
+                    <a:ea typeface="Cambria Math" panose="02040503050406030204" pitchFamily="18" charset="0"/>
+                  </a:rPr>
+                  <a:t>m – </a:t>
+                </a:r>
+                <a:r>
+                  <a:rPr lang="ru-RU" dirty="0" smtClean="0">
+                    <a:ea typeface="Cambria Math" panose="02040503050406030204" pitchFamily="18" charset="0"/>
+                  </a:rPr>
+                  <a:t>количество возможных значений хэш-функции – </a:t>
+                </a:r>
+                <a:r>
+                  <a:rPr lang="ru-RU" dirty="0" err="1" smtClean="0">
+                    <a:ea typeface="Cambria Math" panose="02040503050406030204" pitchFamily="18" charset="0"/>
+                  </a:rPr>
+                  <a:t>хэш</a:t>
+                </a:r>
+                <a:r>
+                  <a:rPr lang="ru-RU" dirty="0" smtClean="0">
+                    <a:ea typeface="Cambria Math" panose="02040503050406030204" pitchFamily="18" charset="0"/>
+                  </a:rPr>
+                  <a:t>-мощность, мощность хэш-функции (</a:t>
+                </a:r>
+                <a:r>
+                  <a:rPr lang="en-US" dirty="0" smtClean="0">
+                    <a:ea typeface="Cambria Math" panose="02040503050406030204" pitchFamily="18" charset="0"/>
+                  </a:rPr>
+                  <a:t>cardinality of hash function</a:t>
+                </a:r>
+                <a:r>
+                  <a:rPr lang="ru-RU" dirty="0" smtClean="0">
+                    <a:ea typeface="Cambria Math" panose="02040503050406030204" pitchFamily="18" charset="0"/>
+                  </a:rPr>
+                  <a:t>)</a:t>
+                </a:r>
+                <a:endParaRPr lang="ru-RU" b="0" dirty="0" smtClean="0">
+                  <a:ea typeface="Cambria Math" panose="02040503050406030204" pitchFamily="18" charset="0"/>
+                </a:endParaRPr>
+              </a:p>
+            </p:txBody>
+          </p:sp>
+        </mc:Choice>
+        <mc:Fallback xmlns="">
+          <p:sp>
+            <p:nvSpPr>
+              <p:cNvPr id="11" name="Объект 2"/>
+              <p:cNvSpPr txBox="1">
+                <a:spLocks noRot="1" noChangeAspect="1" noMove="1" noResize="1" noEditPoints="1" noAdjustHandles="1" noChangeArrowheads="1" noChangeShapeType="1" noTextEdit="1"/>
+              </p:cNvSpPr>
+              <p:nvPr/>
+            </p:nvSpPr>
+            <p:spPr>
+              <a:xfrm>
+                <a:off x="5344357" y="809265"/>
+                <a:ext cx="6655965" cy="5765359"/>
+              </a:xfrm>
+              <a:prstGeom prst="rect">
+                <a:avLst/>
+              </a:prstGeom>
+              <a:blipFill rotWithShape="0">
+                <a:blip r:embed="rId4"/>
+                <a:stretch>
+                  <a:fillRect l="-275" t="-740" r="-1282"/>
+                </a:stretch>
+              </a:blipFill>
+            </p:spPr>
+            <p:txBody>
+              <a:bodyPr/>
+              <a:lstStyle/>
+              <a:p>
+                <a:r>
+                  <a:rPr lang="en-US">
+                    <a:noFill/>
+                  </a:rPr>
+                  <a:t> </a:t>
+                </a:r>
+              </a:p>
+            </p:txBody>
+          </p:sp>
+        </mc:Fallback>
+      </mc:AlternateContent>
     </p:spTree>
     <p:extLst>
       <p:ext uri="{BB962C8B-B14F-4D97-AF65-F5344CB8AC3E}">
@@ -23682,10 +24266,161 @@
       </p:grpSpPr>
       <p:sp>
         <p:nvSpPr>
-          <p:cNvPr id="4" name="Title 1">
+          <p:cNvPr id="3" name="Объект 2"/>
+          <p:cNvSpPr>
+            <a:spLocks noGrp="1"/>
+          </p:cNvSpPr>
+          <p:nvPr>
+            <p:ph idx="1"/>
+          </p:nvPr>
+        </p:nvSpPr>
+        <p:spPr>
+          <a:xfrm>
+            <a:off x="5264459" y="833115"/>
+            <a:ext cx="6770498" cy="5683218"/>
+          </a:xfrm>
+          <a:solidFill>
+            <a:schemeClr val="bg1"/>
+          </a:solidFill>
+        </p:spPr>
+        <p:txBody>
+          <a:bodyPr/>
+          <a:lstStyle/>
+          <a:p>
+            <a:r>
+              <a:rPr lang="en-US" dirty="0" err="1" smtClean="0"/>
+              <a:t>std</a:t>
+            </a:r>
+            <a:r>
+              <a:rPr lang="en-US" dirty="0" smtClean="0"/>
+              <a:t>::</a:t>
+            </a:r>
+            <a:r>
+              <a:rPr lang="en-US" dirty="0" err="1" smtClean="0"/>
+              <a:t>unordered_map</a:t>
+            </a:r>
+            <a:r>
+              <a:rPr lang="en-US" dirty="0" smtClean="0"/>
+              <a:t> – </a:t>
+            </a:r>
+            <a:r>
+              <a:rPr lang="ru-RU" dirty="0" smtClean="0"/>
+              <a:t>тоже хэш-таблица, но хранит пары ключ-значение</a:t>
+            </a:r>
+            <a:r>
+              <a:rPr lang="en-US" dirty="0" smtClean="0"/>
+              <a:t>. </a:t>
+            </a:r>
+            <a:r>
+              <a:rPr lang="ru-RU" dirty="0" smtClean="0"/>
+              <a:t>Хэш-функция применяется к ключу</a:t>
+            </a:r>
+          </a:p>
+          <a:p>
+            <a:r>
+              <a:rPr lang="ru-RU" dirty="0" smtClean="0"/>
+              <a:t>Хэш</a:t>
+            </a:r>
+            <a:r>
+              <a:rPr lang="ru-RU" dirty="0"/>
+              <a:t>-</a:t>
+            </a:r>
+            <a:r>
+              <a:rPr lang="ru-RU" dirty="0" smtClean="0"/>
+              <a:t>функция должна вычисляться за небольшое время и давать различные значения для различных аргументов</a:t>
+            </a:r>
+          </a:p>
+          <a:p>
+            <a:r>
+              <a:rPr lang="ru-RU" dirty="0" smtClean="0"/>
+              <a:t>Про коллизии</a:t>
+            </a:r>
+            <a:endParaRPr lang="en-US" dirty="0"/>
+          </a:p>
+        </p:txBody>
+      </p:sp>
+      <p:pic>
+        <p:nvPicPr>
+          <p:cNvPr id="5" name="Рисунок 4"/>
+          <p:cNvPicPr>
+            <a:picLocks noChangeAspect="1"/>
+          </p:cNvPicPr>
+          <p:nvPr/>
+        </p:nvPicPr>
+        <p:blipFill>
+          <a:blip r:embed="rId2"/>
+          <a:stretch>
+            <a:fillRect/>
+          </a:stretch>
+        </p:blipFill>
+        <p:spPr>
+          <a:xfrm>
+            <a:off x="345890" y="2738252"/>
+            <a:ext cx="4645034" cy="3778081"/>
+          </a:xfrm>
+          <a:prstGeom prst="rect">
+            <a:avLst/>
+          </a:prstGeom>
+        </p:spPr>
+      </p:pic>
+      <p:pic>
+        <p:nvPicPr>
+          <p:cNvPr id="6" name="Рисунок 5"/>
+          <p:cNvPicPr>
+            <a:picLocks noChangeAspect="1"/>
+          </p:cNvPicPr>
+          <p:nvPr/>
+        </p:nvPicPr>
+        <p:blipFill>
+          <a:blip r:embed="rId3"/>
+          <a:stretch>
+            <a:fillRect/>
+          </a:stretch>
+        </p:blipFill>
+        <p:spPr>
+          <a:xfrm>
+            <a:off x="345890" y="1138509"/>
+            <a:ext cx="4531164" cy="1409382"/>
+          </a:xfrm>
+          <a:prstGeom prst="rect">
+            <a:avLst/>
+          </a:prstGeom>
+        </p:spPr>
+      </p:pic>
+      <p:sp>
+        <p:nvSpPr>
+          <p:cNvPr id="7" name="Прямоугольник 6"/>
+          <p:cNvSpPr/>
+          <p:nvPr/>
+        </p:nvSpPr>
+        <p:spPr>
+          <a:xfrm>
+            <a:off x="235670" y="833114"/>
+            <a:ext cx="6096000" cy="276999"/>
+          </a:xfrm>
+          <a:prstGeom prst="rect">
+            <a:avLst/>
+          </a:prstGeom>
+        </p:spPr>
+        <p:txBody>
+          <a:bodyPr>
+            <a:spAutoFit/>
+          </a:bodyPr>
+          <a:lstStyle/>
+          <a:p>
+            <a:r>
+              <a:rPr lang="en-US" sz="1200" dirty="0"/>
+              <a:t>https://en.cppreference.com/w/cpp/container/unordered_map</a:t>
+            </a:r>
+          </a:p>
+        </p:txBody>
+      </p:sp>
+      <p:sp>
+        <p:nvSpPr>
+          <p:cNvPr id="8" name="Title 1">
             <a:extLst>
               <a:ext uri="{FF2B5EF4-FFF2-40B4-BE49-F238E27FC236}">
-                <a16:creationId xmlns:a16="http://schemas.microsoft.com/office/drawing/2014/main" xmlns="" id="{C60BD838-89F7-4CB1-8B5E-1D5AD5FDEA16}"/>
+                <a16:creationId xmlns:a16="http://schemas.microsoft.com/office/drawing/2014/main" xmlns="" id="{78F05172-2BB6-4969-9FAE-01AFF727CD79}"/>
               </a:ext>
             </a:extLst>
           </p:cNvPr>
@@ -23696,8 +24431,8 @@
         </p:nvSpPr>
         <p:spPr>
           <a:xfrm>
-            <a:off x="443058" y="128922"/>
-            <a:ext cx="11491275" cy="476150"/>
+            <a:off x="235670" y="128922"/>
+            <a:ext cx="11764652" cy="561900"/>
           </a:xfrm>
           <a:prstGeom prst="rect">
             <a:avLst/>
@@ -23790,2115 +24525,39 @@
           <a:p>
             <a:pPr algn="ctr"/>
             <a:r>
-              <a:rPr lang="en-US" sz="2800" dirty="0"/>
-              <a:t>STL</a:t>
-            </a:r>
-            <a:r>
-              <a:rPr lang="ru-RU" sz="2800" dirty="0"/>
-              <a:t>: </a:t>
-            </a:r>
-            <a:r>
-              <a:rPr lang="en-US" sz="2800" dirty="0" err="1"/>
-              <a:t>InputIterator</a:t>
-            </a:r>
-            <a:r>
-              <a:rPr lang="en-US" sz="2800" dirty="0"/>
-              <a:t> </a:t>
-            </a:r>
-            <a:r>
-              <a:rPr lang="ru-RU" sz="2800" dirty="0"/>
-              <a:t>и </a:t>
-            </a:r>
-            <a:r>
-              <a:rPr lang="en-US" sz="2800" dirty="0" err="1"/>
-              <a:t>OutputIterator</a:t>
+              <a:rPr lang="ru-RU" sz="2800" dirty="0" smtClean="0"/>
+              <a:t>Неупорядоченные контейнеры</a:t>
+            </a:r>
+            <a:r>
+              <a:rPr lang="en-US" sz="2800" dirty="0" smtClean="0"/>
+              <a:t>. </a:t>
+            </a:r>
+            <a:r>
+              <a:rPr lang="en-US" sz="2800" dirty="0" err="1" smtClean="0"/>
+              <a:t>std</a:t>
+            </a:r>
+            <a:r>
+              <a:rPr lang="en-US" sz="2800" dirty="0" smtClean="0"/>
+              <a:t>::</a:t>
+            </a:r>
+            <a:r>
+              <a:rPr lang="en-US" sz="2800" dirty="0" err="1" smtClean="0"/>
+              <a:t>unordered_map</a:t>
             </a:r>
             <a:endParaRPr lang="en-US" sz="2800" dirty="0"/>
           </a:p>
         </p:txBody>
       </p:sp>
-      <p:graphicFrame>
-        <p:nvGraphicFramePr>
-          <p:cNvPr id="12" name="Table 11">
-            <a:extLst>
-              <a:ext uri="{FF2B5EF4-FFF2-40B4-BE49-F238E27FC236}">
-                <a16:creationId xmlns:a16="http://schemas.microsoft.com/office/drawing/2014/main" xmlns="" id="{CCE7D441-96BC-4D6A-BE32-CEC98DB5865D}"/>
-              </a:ext>
-            </a:extLst>
-          </p:cNvPr>
-          <p:cNvGraphicFramePr>
-            <a:graphicFrameLocks noGrp="1"/>
-          </p:cNvGraphicFramePr>
-          <p:nvPr>
-            <p:extLst/>
-          </p:nvPr>
-        </p:nvGraphicFramePr>
-        <p:xfrm>
-          <a:off x="519415" y="688958"/>
-          <a:ext cx="11414917" cy="6040120"/>
-        </p:xfrm>
-        <a:graphic>
-          <a:graphicData uri="http://schemas.openxmlformats.org/drawingml/2006/table">
-            <a:tbl>
-              <a:tblPr firstRow="1" bandRow="1">
-                <a:tableStyleId>{5C22544A-7EE6-4342-B048-85BDC9FD1C3A}</a:tableStyleId>
-              </a:tblPr>
-              <a:tblGrid>
-                <a:gridCol w="2648261">
-                  <a:extLst>
-                    <a:ext uri="{9D8B030D-6E8A-4147-A177-3AD203B41FA5}">
-                      <a16:colId xmlns:a16="http://schemas.microsoft.com/office/drawing/2014/main" xmlns="" val="673896950"/>
-                    </a:ext>
-                  </a:extLst>
-                </a:gridCol>
-                <a:gridCol w="2191664">
-                  <a:extLst>
-                    <a:ext uri="{9D8B030D-6E8A-4147-A177-3AD203B41FA5}">
-                      <a16:colId xmlns:a16="http://schemas.microsoft.com/office/drawing/2014/main" xmlns="" val="3404116454"/>
-                    </a:ext>
-                  </a:extLst>
-                </a:gridCol>
-                <a:gridCol w="3287496">
-                  <a:extLst>
-                    <a:ext uri="{9D8B030D-6E8A-4147-A177-3AD203B41FA5}">
-                      <a16:colId xmlns:a16="http://schemas.microsoft.com/office/drawing/2014/main" xmlns="" val="2546970233"/>
-                    </a:ext>
-                  </a:extLst>
-                </a:gridCol>
-                <a:gridCol w="3287496">
-                  <a:extLst>
-                    <a:ext uri="{9D8B030D-6E8A-4147-A177-3AD203B41FA5}">
-                      <a16:colId xmlns:a16="http://schemas.microsoft.com/office/drawing/2014/main" xmlns="" val="1905818927"/>
-                    </a:ext>
-                  </a:extLst>
-                </a:gridCol>
-              </a:tblGrid>
-              <a:tr h="370840">
-                <a:tc>
-                  <a:txBody>
-                    <a:bodyPr/>
-                    <a:lstStyle/>
-                    <a:p>
-                      <a:endParaRPr lang="en-US" dirty="0"/>
-                    </a:p>
-                  </a:txBody>
-                  <a:tcPr/>
-                </a:tc>
-                <a:tc>
-                  <a:txBody>
-                    <a:bodyPr/>
-                    <a:lstStyle/>
-                    <a:p>
-                      <a:r>
-                        <a:rPr lang="ru-RU" dirty="0"/>
-                        <a:t>Оператор</a:t>
-                      </a:r>
-                      <a:endParaRPr lang="en-US" dirty="0"/>
-                    </a:p>
-                  </a:txBody>
-                  <a:tcPr/>
-                </a:tc>
-                <a:tc>
-                  <a:txBody>
-                    <a:bodyPr/>
-                    <a:lstStyle/>
-                    <a:p>
-                      <a:r>
-                        <a:rPr lang="en-US" dirty="0" err="1"/>
-                        <a:t>InputIterator</a:t>
-                      </a:r>
-                      <a:endParaRPr lang="en-US" dirty="0"/>
-                    </a:p>
-                  </a:txBody>
-                  <a:tcPr/>
-                </a:tc>
-                <a:tc>
-                  <a:txBody>
-                    <a:bodyPr/>
-                    <a:lstStyle/>
-                    <a:p>
-                      <a:r>
-                        <a:rPr lang="en-US" dirty="0" err="1"/>
-                        <a:t>OutputIterator</a:t>
-                      </a:r>
-                      <a:endParaRPr lang="en-US" dirty="0"/>
-                    </a:p>
-                  </a:txBody>
-                  <a:tcPr/>
-                </a:tc>
-                <a:extLst>
-                  <a:ext uri="{0D108BD9-81ED-4DB2-BD59-A6C34878D82A}">
-                    <a16:rowId xmlns:a16="http://schemas.microsoft.com/office/drawing/2014/main" xmlns="" val="3707840138"/>
-                  </a:ext>
-                </a:extLst>
-              </a:tr>
-              <a:tr h="370840">
-                <a:tc>
-                  <a:txBody>
-                    <a:bodyPr/>
-                    <a:lstStyle/>
-                    <a:p>
-                      <a:r>
-                        <a:rPr lang="ru-RU" dirty="0"/>
-                        <a:t>Савнение на равенство</a:t>
-                      </a:r>
-                    </a:p>
-                    <a:p>
-                      <a:r>
-                        <a:rPr lang="en-US" dirty="0"/>
-                        <a:t>A == B </a:t>
-                      </a:r>
-                      <a:endParaRPr lang="ru-RU" dirty="0"/>
-                    </a:p>
-                    <a:p>
-                      <a:r>
-                        <a:rPr lang="en-US" dirty="0"/>
-                        <a:t>A != B</a:t>
-                      </a:r>
-                    </a:p>
-                  </a:txBody>
-                  <a:tcPr/>
-                </a:tc>
-                <a:tc>
-                  <a:txBody>
-                    <a:bodyPr/>
-                    <a:lstStyle/>
-                    <a:p>
-                      <a:r>
-                        <a:rPr lang="en-US" dirty="0"/>
-                        <a:t>bool operator==(B)</a:t>
-                      </a:r>
-                    </a:p>
-                    <a:p>
-                      <a:r>
-                        <a:rPr lang="en-US" dirty="0"/>
-                        <a:t>bool operator!=(B)</a:t>
-                      </a:r>
-                    </a:p>
-                  </a:txBody>
-                  <a:tcPr/>
-                </a:tc>
-                <a:tc>
-                  <a:txBody>
-                    <a:bodyPr/>
-                    <a:lstStyle/>
-                    <a:p>
-                      <a:pPr algn="ctr"/>
-                      <a:r>
-                        <a:rPr lang="en-US" sz="3200" dirty="0">
-                          <a:solidFill>
-                            <a:schemeClr val="accent2">
-                              <a:lumMod val="50000"/>
-                            </a:schemeClr>
-                          </a:solidFill>
-                          <a:latin typeface="Wingdings 2" panose="05020102010507070707" pitchFamily="18" charset="2"/>
-                          <a:sym typeface="Wingdings 2" panose="05020102010507070707" pitchFamily="18" charset="2"/>
-                        </a:rPr>
-                        <a:t></a:t>
-                      </a:r>
-                      <a:endParaRPr lang="ru-RU" sz="3200" dirty="0">
-                        <a:solidFill>
-                          <a:schemeClr val="accent2">
-                            <a:lumMod val="50000"/>
-                          </a:schemeClr>
-                        </a:solidFill>
-                        <a:latin typeface="Wingdings 2" panose="05020102010507070707" pitchFamily="18" charset="2"/>
-                        <a:sym typeface="Wingdings 2" panose="05020102010507070707" pitchFamily="18" charset="2"/>
-                      </a:endParaRPr>
-                    </a:p>
-                    <a:p>
-                      <a:pPr algn="ctr"/>
-                      <a:r>
-                        <a:rPr lang="ru-RU" sz="1800" dirty="0">
-                          <a:solidFill>
-                            <a:schemeClr val="tx1"/>
-                          </a:solidFill>
-                          <a:latin typeface="+mn-lt"/>
-                        </a:rPr>
-                        <a:t>Может стоять по обе стороны знака</a:t>
-                      </a:r>
-                      <a:endParaRPr lang="en-US" sz="1800" dirty="0">
-                        <a:solidFill>
-                          <a:schemeClr val="tx1"/>
-                        </a:solidFill>
-                        <a:latin typeface="+mn-lt"/>
-                      </a:endParaRPr>
-                    </a:p>
-                  </a:txBody>
-                  <a:tcPr/>
-                </a:tc>
-                <a:tc>
-                  <a:txBody>
-                    <a:bodyPr/>
-                    <a:lstStyle/>
-                    <a:p>
-                      <a:pPr marL="0" marR="0" lvl="0" indent="0" algn="ctr" defTabSz="457200" rtl="0" eaLnBrk="1" fontAlgn="auto" latinLnBrk="0" hangingPunct="1">
-                        <a:lnSpc>
-                          <a:spcPct val="100000"/>
-                        </a:lnSpc>
-                        <a:spcBef>
-                          <a:spcPts val="0"/>
-                        </a:spcBef>
-                        <a:spcAft>
-                          <a:spcPts val="0"/>
-                        </a:spcAft>
-                        <a:buClrTx/>
-                        <a:buSzTx/>
-                        <a:buFontTx/>
-                        <a:buNone/>
-                        <a:tabLst/>
-                        <a:defRPr/>
-                      </a:pPr>
-                      <a:r>
-                        <a:rPr lang="en-US" sz="3200" dirty="0">
-                          <a:solidFill>
-                            <a:schemeClr val="accent5">
-                              <a:lumMod val="75000"/>
-                            </a:schemeClr>
-                          </a:solidFill>
-                          <a:sym typeface="Wingdings 2" panose="05020102010507070707" pitchFamily="18" charset="2"/>
-                        </a:rPr>
-                        <a:t></a:t>
-                      </a:r>
-                      <a:endParaRPr lang="ru-RU" sz="3200" dirty="0">
-                        <a:solidFill>
-                          <a:schemeClr val="accent5">
-                            <a:lumMod val="75000"/>
-                          </a:schemeClr>
-                        </a:solidFill>
-                        <a:sym typeface="Wingdings 2" panose="05020102010507070707" pitchFamily="18" charset="2"/>
-                      </a:endParaRPr>
-                    </a:p>
-                    <a:p>
-                      <a:pPr marL="0" marR="0" lvl="0" indent="0" algn="ctr" defTabSz="457200" rtl="0" eaLnBrk="1" fontAlgn="auto" latinLnBrk="0" hangingPunct="1">
-                        <a:lnSpc>
-                          <a:spcPct val="100000"/>
-                        </a:lnSpc>
-                        <a:spcBef>
-                          <a:spcPts val="0"/>
-                        </a:spcBef>
-                        <a:spcAft>
-                          <a:spcPts val="0"/>
-                        </a:spcAft>
-                        <a:buClrTx/>
-                        <a:buSzTx/>
-                        <a:buFontTx/>
-                        <a:buNone/>
-                        <a:tabLst/>
-                        <a:defRPr/>
-                      </a:pPr>
-                      <a:r>
-                        <a:rPr lang="ru-RU" sz="1800" dirty="0">
-                          <a:latin typeface="+mn-lt"/>
-                        </a:rPr>
-                        <a:t>Может стоять только справа от знака</a:t>
-                      </a:r>
-                      <a:endParaRPr lang="en-US" sz="1800" dirty="0">
-                        <a:latin typeface="+mn-lt"/>
-                      </a:endParaRPr>
-                    </a:p>
-                  </a:txBody>
-                  <a:tcPr/>
-                </a:tc>
-                <a:extLst>
-                  <a:ext uri="{0D108BD9-81ED-4DB2-BD59-A6C34878D82A}">
-                    <a16:rowId xmlns:a16="http://schemas.microsoft.com/office/drawing/2014/main" xmlns="" val="541336909"/>
-                  </a:ext>
-                </a:extLst>
-              </a:tr>
-              <a:tr h="370840">
-                <a:tc>
-                  <a:txBody>
-                    <a:bodyPr/>
-                    <a:lstStyle/>
-                    <a:p>
-                      <a:r>
-                        <a:rPr lang="ru-RU" dirty="0"/>
-                        <a:t>Инкремент</a:t>
-                      </a:r>
-                    </a:p>
-                    <a:p>
-                      <a:r>
-                        <a:rPr lang="ru-RU" dirty="0"/>
-                        <a:t>++</a:t>
-                      </a:r>
-                      <a:r>
-                        <a:rPr lang="en-US" dirty="0"/>
-                        <a:t>A</a:t>
-                      </a:r>
-                    </a:p>
-                    <a:p>
-                      <a:r>
-                        <a:rPr lang="en-US" dirty="0"/>
-                        <a:t>A++</a:t>
-                      </a:r>
-                    </a:p>
-                  </a:txBody>
-                  <a:tcPr/>
-                </a:tc>
-                <a:tc>
-                  <a:txBody>
-                    <a:bodyPr/>
-                    <a:lstStyle/>
-                    <a:p>
-                      <a:r>
-                        <a:rPr lang="en-US" dirty="0"/>
-                        <a:t>A</a:t>
-                      </a:r>
-                      <a:r>
-                        <a:rPr lang="en-US" dirty="0">
-                          <a:latin typeface="Times New Roman" panose="02020603050405020304" pitchFamily="18" charset="0"/>
-                          <a:cs typeface="Times New Roman" panose="02020603050405020304" pitchFamily="18" charset="0"/>
-                        </a:rPr>
-                        <a:t>&amp;</a:t>
-                      </a:r>
-                      <a:r>
-                        <a:rPr lang="en-US" dirty="0"/>
-                        <a:t> operator++()</a:t>
-                      </a:r>
-                    </a:p>
-                    <a:p>
-                      <a:r>
-                        <a:rPr lang="en-US" dirty="0"/>
-                        <a:t>A operator++(int n)</a:t>
-                      </a:r>
-                    </a:p>
-                  </a:txBody>
-                  <a:tcPr/>
-                </a:tc>
-                <a:tc>
-                  <a:txBody>
-                    <a:bodyPr/>
-                    <a:lstStyle/>
-                    <a:p>
-                      <a:pPr algn="ctr"/>
-                      <a:r>
-                        <a:rPr lang="en-US" sz="3200" dirty="0">
-                          <a:solidFill>
-                            <a:schemeClr val="accent2">
-                              <a:lumMod val="50000"/>
-                            </a:schemeClr>
-                          </a:solidFill>
-                          <a:latin typeface="Wingdings 2" panose="05020102010507070707" pitchFamily="18" charset="2"/>
-                          <a:sym typeface="Wingdings 2" panose="05020102010507070707" pitchFamily="18" charset="2"/>
-                        </a:rPr>
-                        <a:t></a:t>
-                      </a:r>
-                      <a:endParaRPr lang="en-US" sz="3200" dirty="0">
-                        <a:solidFill>
-                          <a:schemeClr val="accent2">
-                            <a:lumMod val="50000"/>
-                          </a:schemeClr>
-                        </a:solidFill>
-                      </a:endParaRPr>
-                    </a:p>
-                  </a:txBody>
-                  <a:tcPr/>
-                </a:tc>
-                <a:tc>
-                  <a:txBody>
-                    <a:bodyPr/>
-                    <a:lstStyle/>
-                    <a:p>
-                      <a:pPr algn="ctr"/>
-                      <a:r>
-                        <a:rPr lang="en-US" sz="3200" dirty="0">
-                          <a:solidFill>
-                            <a:schemeClr val="accent2">
-                              <a:lumMod val="50000"/>
-                            </a:schemeClr>
-                          </a:solidFill>
-                          <a:latin typeface="Wingdings 2" panose="05020102010507070707" pitchFamily="18" charset="2"/>
-                          <a:sym typeface="Wingdings 2" panose="05020102010507070707" pitchFamily="18" charset="2"/>
-                        </a:rPr>
-                        <a:t></a:t>
-                      </a:r>
-                      <a:endParaRPr lang="en-US" sz="3200" dirty="0">
-                        <a:solidFill>
-                          <a:schemeClr val="accent2">
-                            <a:lumMod val="50000"/>
-                          </a:schemeClr>
-                        </a:solidFill>
-                        <a:latin typeface="Wingdings 2" panose="05020102010507070707" pitchFamily="18" charset="2"/>
-                      </a:endParaRPr>
-                    </a:p>
-                  </a:txBody>
-                  <a:tcPr/>
-                </a:tc>
-                <a:extLst>
-                  <a:ext uri="{0D108BD9-81ED-4DB2-BD59-A6C34878D82A}">
-                    <a16:rowId xmlns:a16="http://schemas.microsoft.com/office/drawing/2014/main" xmlns="" val="2595382089"/>
-                  </a:ext>
-                </a:extLst>
-              </a:tr>
-              <a:tr h="370840">
-                <a:tc>
-                  <a:txBody>
-                    <a:bodyPr/>
-                    <a:lstStyle/>
-                    <a:p>
-                      <a:r>
-                        <a:rPr lang="en-US" dirty="0"/>
-                        <a:t>Dereference as </a:t>
-                      </a:r>
-                      <a:r>
-                        <a:rPr lang="en-US" dirty="0" err="1"/>
-                        <a:t>rvalue</a:t>
-                      </a:r>
-                      <a:endParaRPr lang="ru-RU" dirty="0"/>
-                    </a:p>
-                    <a:p>
-                      <a:r>
-                        <a:rPr lang="en-US" dirty="0"/>
-                        <a:t>n = </a:t>
-                      </a:r>
-                      <a:r>
-                        <a:rPr lang="ru-RU" dirty="0"/>
-                        <a:t>*</a:t>
-                      </a:r>
-                      <a:r>
-                        <a:rPr lang="en-US" dirty="0"/>
-                        <a:t>A</a:t>
-                      </a:r>
-                    </a:p>
-                    <a:p>
-                      <a:r>
-                        <a:rPr lang="en-US" dirty="0"/>
-                        <a:t>n = A</a:t>
-                      </a:r>
-                      <a:r>
-                        <a:rPr lang="ru-RU" dirty="0"/>
-                        <a:t>-</a:t>
-                      </a:r>
-                      <a:r>
-                        <a:rPr lang="en-US" dirty="0"/>
-                        <a:t>&gt;m</a:t>
-                      </a:r>
-                    </a:p>
-                  </a:txBody>
-                  <a:tcPr/>
-                </a:tc>
-                <a:tc>
-                  <a:txBody>
-                    <a:bodyPr/>
-                    <a:lstStyle/>
-                    <a:p>
-                      <a:r>
-                        <a:rPr lang="en-US" dirty="0"/>
-                        <a:t>T operator*()</a:t>
-                      </a:r>
-                    </a:p>
-                    <a:p>
-                      <a:r>
-                        <a:rPr lang="en-US" dirty="0"/>
-                        <a:t>T operator-&gt;()</a:t>
-                      </a:r>
-                    </a:p>
-                  </a:txBody>
-                  <a:tcPr/>
-                </a:tc>
-                <a:tc>
-                  <a:txBody>
-                    <a:bodyPr/>
-                    <a:lstStyle/>
-                    <a:p>
-                      <a:pPr algn="ctr"/>
-                      <a:r>
-                        <a:rPr lang="en-US" sz="3200" dirty="0">
-                          <a:solidFill>
-                            <a:schemeClr val="accent2">
-                              <a:lumMod val="50000"/>
-                            </a:schemeClr>
-                          </a:solidFill>
-                          <a:latin typeface="Wingdings 2" panose="05020102010507070707" pitchFamily="18" charset="2"/>
-                          <a:sym typeface="Wingdings 2" panose="05020102010507070707" pitchFamily="18" charset="2"/>
-                        </a:rPr>
-                        <a:t></a:t>
-                      </a:r>
-                      <a:endParaRPr lang="ru-RU" sz="3200" dirty="0">
-                        <a:solidFill>
-                          <a:schemeClr val="accent2">
-                            <a:lumMod val="50000"/>
-                          </a:schemeClr>
-                        </a:solidFill>
-                        <a:latin typeface="Wingdings 2" panose="05020102010507070707" pitchFamily="18" charset="2"/>
-                        <a:sym typeface="Wingdings 2" panose="05020102010507070707" pitchFamily="18" charset="2"/>
-                      </a:endParaRPr>
-                    </a:p>
-                    <a:p>
-                      <a:pPr algn="ctr"/>
-                      <a:r>
-                        <a:rPr lang="ru-RU" sz="1600" dirty="0">
-                          <a:solidFill>
-                            <a:schemeClr val="tx1"/>
-                          </a:solidFill>
-                          <a:latin typeface="+mn-lt"/>
-                        </a:rPr>
-                        <a:t>Изменения значения, на которое указывает итератор, не сохраняются</a:t>
-                      </a:r>
-                      <a:endParaRPr lang="en-US" sz="2400" dirty="0">
-                        <a:solidFill>
-                          <a:schemeClr val="accent2">
-                            <a:lumMod val="50000"/>
-                          </a:schemeClr>
-                        </a:solidFill>
-                        <a:latin typeface="+mn-lt"/>
-                      </a:endParaRPr>
-                    </a:p>
-                  </a:txBody>
-                  <a:tcPr/>
-                </a:tc>
-                <a:tc>
-                  <a:txBody>
-                    <a:bodyPr/>
-                    <a:lstStyle/>
-                    <a:p>
-                      <a:pPr marL="0" marR="0" lvl="0" indent="0" algn="ctr" defTabSz="457200" rtl="0" eaLnBrk="1" fontAlgn="auto" latinLnBrk="0" hangingPunct="1">
-                        <a:lnSpc>
-                          <a:spcPct val="100000"/>
-                        </a:lnSpc>
-                        <a:spcBef>
-                          <a:spcPts val="0"/>
-                        </a:spcBef>
-                        <a:spcAft>
-                          <a:spcPts val="0"/>
-                        </a:spcAft>
-                        <a:buClrTx/>
-                        <a:buSzTx/>
-                        <a:buFontTx/>
-                        <a:buNone/>
-                        <a:tabLst/>
-                        <a:defRPr/>
-                      </a:pPr>
-                      <a:r>
-                        <a:rPr lang="en-US" sz="3200" dirty="0">
-                          <a:solidFill>
-                            <a:schemeClr val="accent5">
-                              <a:lumMod val="75000"/>
-                            </a:schemeClr>
-                          </a:solidFill>
-                          <a:sym typeface="Wingdings 2" panose="05020102010507070707" pitchFamily="18" charset="2"/>
-                        </a:rPr>
-                        <a:t></a:t>
-                      </a:r>
-                      <a:endParaRPr lang="en-US" sz="3200" dirty="0">
-                        <a:solidFill>
-                          <a:schemeClr val="accent5">
-                            <a:lumMod val="75000"/>
-                          </a:schemeClr>
-                        </a:solidFill>
-                      </a:endParaRPr>
-                    </a:p>
-                    <a:p>
-                      <a:pPr algn="ctr"/>
-                      <a:endParaRPr lang="en-US" sz="3200" dirty="0">
-                        <a:solidFill>
-                          <a:schemeClr val="accent2">
-                            <a:lumMod val="50000"/>
-                          </a:schemeClr>
-                        </a:solidFill>
-                      </a:endParaRPr>
-                    </a:p>
-                  </a:txBody>
-                  <a:tcPr/>
-                </a:tc>
-                <a:extLst>
-                  <a:ext uri="{0D108BD9-81ED-4DB2-BD59-A6C34878D82A}">
-                    <a16:rowId xmlns:a16="http://schemas.microsoft.com/office/drawing/2014/main" xmlns="" val="1389121230"/>
-                  </a:ext>
-                </a:extLst>
-              </a:tr>
-              <a:tr h="370840">
-                <a:tc>
-                  <a:txBody>
-                    <a:bodyPr/>
-                    <a:lstStyle/>
-                    <a:p>
-                      <a:r>
-                        <a:rPr lang="en-US" dirty="0"/>
-                        <a:t>Dereference as </a:t>
-                      </a:r>
-                      <a:r>
-                        <a:rPr lang="en-US" dirty="0" err="1"/>
-                        <a:t>lvalue</a:t>
-                      </a:r>
-                      <a:endParaRPr lang="en-US" dirty="0"/>
-                    </a:p>
-                    <a:p>
-                      <a:r>
-                        <a:rPr lang="ru-RU" dirty="0"/>
-                        <a:t>*</a:t>
-                      </a:r>
-                      <a:r>
-                        <a:rPr lang="en-US" dirty="0"/>
-                        <a:t>A = n,</a:t>
-                      </a:r>
-                    </a:p>
-                    <a:p>
-                      <a:r>
-                        <a:rPr lang="en-US" dirty="0"/>
-                        <a:t>A-&gt;m = n</a:t>
-                      </a:r>
-                    </a:p>
-                  </a:txBody>
-                  <a:tcPr/>
-                </a:tc>
-                <a:tc>
-                  <a:txBody>
-                    <a:bodyPr/>
-                    <a:lstStyle/>
-                    <a:p>
-                      <a:r>
-                        <a:rPr lang="en-US" dirty="0"/>
-                        <a:t>T</a:t>
-                      </a:r>
-                      <a:r>
-                        <a:rPr lang="en-US" dirty="0">
-                          <a:latin typeface="Times New Roman" panose="02020603050405020304" pitchFamily="18" charset="0"/>
-                          <a:cs typeface="Times New Roman" panose="02020603050405020304" pitchFamily="18" charset="0"/>
-                        </a:rPr>
-                        <a:t>&amp; operator*()</a:t>
-                      </a:r>
-                    </a:p>
-                    <a:p>
-                      <a:r>
-                        <a:rPr lang="en-US" dirty="0">
-                          <a:latin typeface="Times New Roman" panose="02020603050405020304" pitchFamily="18" charset="0"/>
-                          <a:cs typeface="Times New Roman" panose="02020603050405020304" pitchFamily="18" charset="0"/>
-                        </a:rPr>
-                        <a:t>T&amp; operator-&gt;()</a:t>
-                      </a:r>
-                    </a:p>
-                  </a:txBody>
-                  <a:tcPr/>
-                </a:tc>
-                <a:tc>
-                  <a:txBody>
-                    <a:bodyPr/>
-                    <a:lstStyle/>
-                    <a:p>
-                      <a:pPr algn="ctr"/>
-                      <a:r>
-                        <a:rPr lang="en-US" sz="3200" dirty="0">
-                          <a:solidFill>
-                            <a:schemeClr val="accent5">
-                              <a:lumMod val="75000"/>
-                            </a:schemeClr>
-                          </a:solidFill>
-                          <a:sym typeface="Wingdings 2" panose="05020102010507070707" pitchFamily="18" charset="2"/>
-                        </a:rPr>
-                        <a:t></a:t>
-                      </a:r>
-                      <a:endParaRPr lang="en-US" sz="3200" dirty="0">
-                        <a:solidFill>
-                          <a:schemeClr val="accent5">
-                            <a:lumMod val="75000"/>
-                          </a:schemeClr>
-                        </a:solidFill>
-                      </a:endParaRPr>
-                    </a:p>
-                  </a:txBody>
-                  <a:tcPr/>
-                </a:tc>
-                <a:tc>
-                  <a:txBody>
-                    <a:bodyPr/>
-                    <a:lstStyle/>
-                    <a:p>
-                      <a:pPr algn="ctr"/>
-                      <a:r>
-                        <a:rPr lang="en-US" sz="3200" dirty="0">
-                          <a:solidFill>
-                            <a:schemeClr val="accent2">
-                              <a:lumMod val="50000"/>
-                            </a:schemeClr>
-                          </a:solidFill>
-                          <a:latin typeface="Wingdings 2" panose="05020102010507070707" pitchFamily="18" charset="2"/>
-                          <a:sym typeface="Wingdings 2" panose="05020102010507070707" pitchFamily="18" charset="2"/>
-                        </a:rPr>
-                        <a:t></a:t>
-                      </a:r>
-                      <a:endParaRPr lang="ru-RU" sz="3200" dirty="0">
-                        <a:solidFill>
-                          <a:schemeClr val="accent2">
-                            <a:lumMod val="50000"/>
-                          </a:schemeClr>
-                        </a:solidFill>
-                        <a:latin typeface="Wingdings 2" panose="05020102010507070707" pitchFamily="18" charset="2"/>
-                        <a:sym typeface="Wingdings 2" panose="05020102010507070707" pitchFamily="18" charset="2"/>
-                      </a:endParaRPr>
-                    </a:p>
-                    <a:p>
-                      <a:pPr algn="ctr"/>
-                      <a:r>
-                        <a:rPr lang="ru-RU" sz="1800" dirty="0">
-                          <a:solidFill>
-                            <a:schemeClr val="accent2">
-                              <a:lumMod val="50000"/>
-                            </a:schemeClr>
-                          </a:solidFill>
-                          <a:latin typeface="+mn-lt"/>
-                          <a:sym typeface="Wingdings 2" panose="05020102010507070707" pitchFamily="18" charset="2"/>
-                        </a:rPr>
-                        <a:t>Можно изменять значение, на которое указывает итератор</a:t>
-                      </a:r>
-                      <a:endParaRPr lang="en-US" sz="1800" dirty="0">
-                        <a:solidFill>
-                          <a:schemeClr val="accent2">
-                            <a:lumMod val="50000"/>
-                          </a:schemeClr>
-                        </a:solidFill>
-                        <a:latin typeface="+mn-lt"/>
-                      </a:endParaRPr>
-                    </a:p>
-                  </a:txBody>
-                  <a:tcPr/>
-                </a:tc>
-                <a:extLst>
-                  <a:ext uri="{0D108BD9-81ED-4DB2-BD59-A6C34878D82A}">
-                    <a16:rowId xmlns:a16="http://schemas.microsoft.com/office/drawing/2014/main" xmlns="" val="4012556742"/>
-                  </a:ext>
-                </a:extLst>
-              </a:tr>
-              <a:tr h="370840">
-                <a:tc>
-                  <a:txBody>
-                    <a:bodyPr/>
-                    <a:lstStyle/>
-                    <a:p>
-                      <a:r>
-                        <a:rPr lang="ru-RU" dirty="0"/>
-                        <a:t>Декремент</a:t>
-                      </a:r>
-                      <a:endParaRPr lang="en-US" dirty="0"/>
-                    </a:p>
-                    <a:p>
-                      <a:r>
-                        <a:rPr lang="ru-RU" dirty="0"/>
-                        <a:t>--</a:t>
-                      </a:r>
-                      <a:r>
-                        <a:rPr lang="en-US" dirty="0"/>
-                        <a:t>A</a:t>
-                      </a:r>
-                    </a:p>
-                    <a:p>
-                      <a:r>
-                        <a:rPr lang="en-US" dirty="0"/>
-                        <a:t>A</a:t>
-                      </a:r>
-                      <a:r>
-                        <a:rPr lang="ru-RU" dirty="0"/>
-                        <a:t>--</a:t>
-                      </a:r>
-                      <a:endParaRPr lang="en-US" dirty="0"/>
-                    </a:p>
-                  </a:txBody>
-                  <a:tcPr/>
-                </a:tc>
-                <a:tc>
-                  <a:txBody>
-                    <a:bodyPr/>
-                    <a:lstStyle/>
-                    <a:p>
-                      <a:r>
-                        <a:rPr lang="en-US" dirty="0"/>
-                        <a:t>A</a:t>
-                      </a:r>
-                      <a:r>
-                        <a:rPr lang="en-US" dirty="0">
-                          <a:latin typeface="Times New Roman" panose="02020603050405020304" pitchFamily="18" charset="0"/>
-                          <a:cs typeface="Times New Roman" panose="02020603050405020304" pitchFamily="18" charset="0"/>
-                        </a:rPr>
-                        <a:t>&amp;</a:t>
-                      </a:r>
-                      <a:r>
-                        <a:rPr lang="en-US" dirty="0"/>
-                        <a:t> operator--()</a:t>
-                      </a:r>
-                    </a:p>
-                    <a:p>
-                      <a:r>
-                        <a:rPr lang="en-US" dirty="0"/>
-                        <a:t>A operator--(int n)</a:t>
-                      </a:r>
-                    </a:p>
-                    <a:p>
-                      <a:endParaRPr lang="en-US" dirty="0"/>
-                    </a:p>
-                  </a:txBody>
-                  <a:tcPr/>
-                </a:tc>
-                <a:tc>
-                  <a:txBody>
-                    <a:bodyPr/>
-                    <a:lstStyle/>
-                    <a:p>
-                      <a:pPr algn="ctr"/>
-                      <a:r>
-                        <a:rPr lang="en-US" sz="3200" dirty="0">
-                          <a:solidFill>
-                            <a:schemeClr val="accent5">
-                              <a:lumMod val="75000"/>
-                            </a:schemeClr>
-                          </a:solidFill>
-                          <a:sym typeface="Wingdings 2" panose="05020102010507070707" pitchFamily="18" charset="2"/>
-                        </a:rPr>
-                        <a:t></a:t>
-                      </a:r>
-                      <a:endParaRPr lang="en-US" sz="3200" dirty="0">
-                        <a:solidFill>
-                          <a:schemeClr val="accent5">
-                            <a:lumMod val="75000"/>
-                          </a:schemeClr>
-                        </a:solidFill>
-                      </a:endParaRPr>
-                    </a:p>
-                  </a:txBody>
-                  <a:tcPr/>
-                </a:tc>
-                <a:tc>
-                  <a:txBody>
-                    <a:bodyPr/>
-                    <a:lstStyle/>
-                    <a:p>
-                      <a:pPr marL="0" marR="0" lvl="0" indent="0" algn="ctr" defTabSz="457200" rtl="0" eaLnBrk="1" fontAlgn="auto" latinLnBrk="0" hangingPunct="1">
-                        <a:lnSpc>
-                          <a:spcPct val="100000"/>
-                        </a:lnSpc>
-                        <a:spcBef>
-                          <a:spcPts val="0"/>
-                        </a:spcBef>
-                        <a:spcAft>
-                          <a:spcPts val="0"/>
-                        </a:spcAft>
-                        <a:buClrTx/>
-                        <a:buSzTx/>
-                        <a:buFontTx/>
-                        <a:buNone/>
-                        <a:tabLst/>
-                        <a:defRPr/>
-                      </a:pPr>
-                      <a:r>
-                        <a:rPr lang="en-US" sz="3200" dirty="0">
-                          <a:solidFill>
-                            <a:schemeClr val="accent5">
-                              <a:lumMod val="75000"/>
-                            </a:schemeClr>
-                          </a:solidFill>
-                          <a:sym typeface="Wingdings 2" panose="05020102010507070707" pitchFamily="18" charset="2"/>
-                        </a:rPr>
-                        <a:t></a:t>
-                      </a:r>
-                      <a:endParaRPr lang="en-US" sz="3200" dirty="0">
-                        <a:solidFill>
-                          <a:schemeClr val="accent5">
-                            <a:lumMod val="75000"/>
-                          </a:schemeClr>
-                        </a:solidFill>
-                      </a:endParaRPr>
-                    </a:p>
-                    <a:p>
-                      <a:pPr algn="ctr"/>
-                      <a:endParaRPr lang="en-US" dirty="0"/>
-                    </a:p>
-                  </a:txBody>
-                  <a:tcPr/>
-                </a:tc>
-                <a:extLst>
-                  <a:ext uri="{0D108BD9-81ED-4DB2-BD59-A6C34878D82A}">
-                    <a16:rowId xmlns:a16="http://schemas.microsoft.com/office/drawing/2014/main" xmlns="" val="2771488528"/>
-                  </a:ext>
-                </a:extLst>
-              </a:tr>
-            </a:tbl>
-          </a:graphicData>
-        </a:graphic>
-      </p:graphicFrame>
     </p:spTree>
     <p:extLst>
       <p:ext uri="{BB962C8B-B14F-4D97-AF65-F5344CB8AC3E}">
-        <p14:creationId xmlns:p14="http://schemas.microsoft.com/office/powerpoint/2010/main" val="1941159857"/>
+        <p14:creationId xmlns:p14="http://schemas.microsoft.com/office/powerpoint/2010/main" val="3638549102"/>
       </p:ext>
     </p:extLst>
   </p:cSld>
   <p:clrMapOvr>
     <a:masterClrMapping/>
   </p:clrMapOvr>
-  <p:timing>
-    <p:tnLst>
-      <p:par>
-        <p:cTn id="1" dur="indefinite" restart="never" nodeType="tmRoot"/>
-      </p:par>
-    </p:tnLst>
-  </p:timing>
-</p:sld>
-</file>
-
-<file path=ppt/slides/slide28.xml><?xml version="1.0" encoding="utf-8"?>
-<p:sld xmlns:a="http://schemas.openxmlformats.org/drawingml/2006/main" xmlns:r="http://schemas.openxmlformats.org/officeDocument/2006/relationships" xmlns:p="http://schemas.openxmlformats.org/presentationml/2006/main">
-  <p:cSld>
-    <p:spTree>
-      <p:nvGrpSpPr>
-        <p:cNvPr id="1" name=""/>
-        <p:cNvGrpSpPr/>
-        <p:nvPr/>
-      </p:nvGrpSpPr>
-      <p:grpSpPr>
-        <a:xfrm>
-          <a:off x="0" y="0"/>
-          <a:ext cx="0" cy="0"/>
-          <a:chOff x="0" y="0"/>
-          <a:chExt cx="0" cy="0"/>
-        </a:xfrm>
-      </p:grpSpPr>
-      <p:sp>
-        <p:nvSpPr>
-          <p:cNvPr id="3" name="Content Placeholder 2">
-            <a:extLst>
-              <a:ext uri="{FF2B5EF4-FFF2-40B4-BE49-F238E27FC236}">
-                <a16:creationId xmlns:a16="http://schemas.microsoft.com/office/drawing/2014/main" xmlns="" id="{26CEDBBB-DE92-40B8-B2B5-F45A320C25F4}"/>
-              </a:ext>
-            </a:extLst>
-          </p:cNvPr>
-          <p:cNvSpPr>
-            <a:spLocks noGrp="1"/>
-          </p:cNvSpPr>
-          <p:nvPr>
-            <p:ph idx="1"/>
-          </p:nvPr>
-        </p:nvSpPr>
-        <p:spPr>
-          <a:xfrm>
-            <a:off x="6825677" y="1656039"/>
-            <a:ext cx="5108656" cy="1075267"/>
-          </a:xfrm>
-          <a:solidFill>
-            <a:schemeClr val="bg1"/>
-          </a:solidFill>
-        </p:spPr>
-        <p:txBody>
-          <a:bodyPr>
-            <a:normAutofit/>
-          </a:bodyPr>
-          <a:lstStyle/>
-          <a:p>
-            <a:r>
-              <a:rPr lang="ru-RU" sz="2000" dirty="0"/>
-              <a:t>Когда не нужно изменять элементы контейнера, можно ограничится </a:t>
-            </a:r>
-            <a:r>
-              <a:rPr lang="en-US" sz="2000" dirty="0" err="1"/>
-              <a:t>InputIterator</a:t>
-            </a:r>
-            <a:endParaRPr lang="en-US" sz="2000" dirty="0"/>
-          </a:p>
-        </p:txBody>
-      </p:sp>
-      <p:sp>
-        <p:nvSpPr>
-          <p:cNvPr id="4" name="Title 1">
-            <a:extLst>
-              <a:ext uri="{FF2B5EF4-FFF2-40B4-BE49-F238E27FC236}">
-                <a16:creationId xmlns:a16="http://schemas.microsoft.com/office/drawing/2014/main" xmlns="" id="{65E8CEB3-E3E6-4768-8409-72F9C78EF2D5}"/>
-              </a:ext>
-            </a:extLst>
-          </p:cNvPr>
-          <p:cNvSpPr txBox="1">
-            <a:spLocks/>
-          </p:cNvSpPr>
-          <p:nvPr/>
-        </p:nvSpPr>
-        <p:spPr>
-          <a:xfrm>
-            <a:off x="443058" y="128922"/>
-            <a:ext cx="11491275" cy="476150"/>
-          </a:xfrm>
-          <a:prstGeom prst="rect">
-            <a:avLst/>
-          </a:prstGeom>
-          <a:solidFill>
-            <a:schemeClr val="bg1"/>
-          </a:solidFill>
-          <a:ln>
-            <a:solidFill>
-              <a:schemeClr val="tx1"/>
-            </a:solidFill>
-          </a:ln>
-        </p:spPr>
-        <p:txBody>
-          <a:bodyPr vert="horz" lIns="91440" tIns="45720" rIns="91440" bIns="45720" rtlCol="0" anchor="t">
-            <a:noAutofit/>
-          </a:bodyPr>
-          <a:lstStyle>
-            <a:lvl1pPr algn="l" defTabSz="457200" rtl="0" eaLnBrk="1" latinLnBrk="0" hangingPunct="1">
-              <a:spcBef>
-                <a:spcPct val="0"/>
-              </a:spcBef>
-              <a:buNone/>
-              <a:defRPr sz="3600" kern="1200">
-                <a:solidFill>
-                  <a:schemeClr val="accent1"/>
-                </a:solidFill>
-                <a:latin typeface="+mj-lt"/>
-                <a:ea typeface="+mj-ea"/>
-                <a:cs typeface="+mj-cs"/>
-              </a:defRPr>
-            </a:lvl1pPr>
-            <a:lvl2pPr eaLnBrk="1" hangingPunct="1">
-              <a:defRPr>
-                <a:solidFill>
-                  <a:schemeClr val="tx2"/>
-                </a:solidFill>
-              </a:defRPr>
-            </a:lvl2pPr>
-            <a:lvl3pPr eaLnBrk="1" hangingPunct="1">
-              <a:defRPr>
-                <a:solidFill>
-                  <a:schemeClr val="tx2"/>
-                </a:solidFill>
-              </a:defRPr>
-            </a:lvl3pPr>
-            <a:lvl4pPr eaLnBrk="1" hangingPunct="1">
-              <a:defRPr>
-                <a:solidFill>
-                  <a:schemeClr val="tx2"/>
-                </a:solidFill>
-              </a:defRPr>
-            </a:lvl4pPr>
-            <a:lvl5pPr eaLnBrk="1" hangingPunct="1">
-              <a:defRPr>
-                <a:solidFill>
-                  <a:schemeClr val="tx2"/>
-                </a:solidFill>
-              </a:defRPr>
-            </a:lvl5pPr>
-            <a:lvl6pPr eaLnBrk="1" hangingPunct="1">
-              <a:defRPr>
-                <a:solidFill>
-                  <a:schemeClr val="tx2"/>
-                </a:solidFill>
-              </a:defRPr>
-            </a:lvl6pPr>
-            <a:lvl7pPr eaLnBrk="1" hangingPunct="1">
-              <a:defRPr>
-                <a:solidFill>
-                  <a:schemeClr val="tx2"/>
-                </a:solidFill>
-              </a:defRPr>
-            </a:lvl7pPr>
-            <a:lvl8pPr eaLnBrk="1" hangingPunct="1">
-              <a:defRPr>
-                <a:solidFill>
-                  <a:schemeClr val="tx2"/>
-                </a:solidFill>
-              </a:defRPr>
-            </a:lvl8pPr>
-            <a:lvl9pPr eaLnBrk="1" hangingPunct="1">
-              <a:defRPr>
-                <a:solidFill>
-                  <a:schemeClr val="tx2"/>
-                </a:solidFill>
-              </a:defRPr>
-            </a:lvl9pPr>
-          </a:lstStyle>
-          <a:p>
-            <a:pPr algn="ctr"/>
-            <a:r>
-              <a:rPr lang="en-US" sz="2800" dirty="0"/>
-              <a:t>STL</a:t>
-            </a:r>
-            <a:r>
-              <a:rPr lang="ru-RU" sz="2800" dirty="0"/>
-              <a:t>: </a:t>
-            </a:r>
-            <a:r>
-              <a:rPr lang="en-US" sz="2800" dirty="0" err="1"/>
-              <a:t>InputIterator</a:t>
-            </a:r>
-            <a:r>
-              <a:rPr lang="en-US" sz="2800" dirty="0"/>
-              <a:t> </a:t>
-            </a:r>
-            <a:r>
-              <a:rPr lang="ru-RU" sz="2800" dirty="0"/>
-              <a:t>и </a:t>
-            </a:r>
-            <a:r>
-              <a:rPr lang="en-US" sz="2800" dirty="0" err="1"/>
-              <a:t>OutputIterator</a:t>
-            </a:r>
-            <a:endParaRPr lang="en-US" sz="2800" dirty="0"/>
-          </a:p>
-        </p:txBody>
-      </p:sp>
-      <p:pic>
-        <p:nvPicPr>
-          <p:cNvPr id="5" name="Picture 4">
-            <a:extLst>
-              <a:ext uri="{FF2B5EF4-FFF2-40B4-BE49-F238E27FC236}">
-                <a16:creationId xmlns:a16="http://schemas.microsoft.com/office/drawing/2014/main" xmlns="" id="{34A4F7A9-FB6D-4A56-A01D-FC2A9E6A3C9D}"/>
-              </a:ext>
-            </a:extLst>
-          </p:cNvPr>
-          <p:cNvPicPr>
-            <a:picLocks noChangeAspect="1"/>
-          </p:cNvPicPr>
-          <p:nvPr/>
-        </p:nvPicPr>
-        <p:blipFill>
-          <a:blip r:embed="rId2"/>
-          <a:stretch>
-            <a:fillRect/>
-          </a:stretch>
-        </p:blipFill>
-        <p:spPr>
-          <a:xfrm>
-            <a:off x="443058" y="816637"/>
-            <a:ext cx="5815995" cy="2750651"/>
-          </a:xfrm>
-          <a:prstGeom prst="rect">
-            <a:avLst/>
-          </a:prstGeom>
-        </p:spPr>
-      </p:pic>
-      <p:pic>
-        <p:nvPicPr>
-          <p:cNvPr id="6" name="Picture 5">
-            <a:extLst>
-              <a:ext uri="{FF2B5EF4-FFF2-40B4-BE49-F238E27FC236}">
-                <a16:creationId xmlns:a16="http://schemas.microsoft.com/office/drawing/2014/main" xmlns="" id="{F1E797CF-4454-4FBB-8EEA-F80C7C5FD663}"/>
-              </a:ext>
-            </a:extLst>
-          </p:cNvPr>
-          <p:cNvPicPr>
-            <a:picLocks noChangeAspect="1"/>
-          </p:cNvPicPr>
-          <p:nvPr/>
-        </p:nvPicPr>
-        <p:blipFill>
-          <a:blip r:embed="rId3"/>
-          <a:stretch>
-            <a:fillRect/>
-          </a:stretch>
-        </p:blipFill>
-        <p:spPr>
-          <a:xfrm>
-            <a:off x="513275" y="4126694"/>
-            <a:ext cx="5777428" cy="1945223"/>
-          </a:xfrm>
-          <a:prstGeom prst="rect">
-            <a:avLst/>
-          </a:prstGeom>
-        </p:spPr>
-      </p:pic>
-      <p:sp>
-        <p:nvSpPr>
-          <p:cNvPr id="7" name="Content Placeholder 2">
-            <a:extLst>
-              <a:ext uri="{FF2B5EF4-FFF2-40B4-BE49-F238E27FC236}">
-                <a16:creationId xmlns:a16="http://schemas.microsoft.com/office/drawing/2014/main" xmlns="" id="{B4FAFC74-F36D-4B61-BE12-E6EFAC28AC60}"/>
-              </a:ext>
-            </a:extLst>
-          </p:cNvPr>
-          <p:cNvSpPr txBox="1">
-            <a:spLocks/>
-          </p:cNvSpPr>
-          <p:nvPr/>
-        </p:nvSpPr>
-        <p:spPr>
-          <a:xfrm>
-            <a:off x="6825677" y="4115900"/>
-            <a:ext cx="5108656" cy="2147821"/>
-          </a:xfrm>
-          <a:prstGeom prst="rect">
-            <a:avLst/>
-          </a:prstGeom>
-          <a:solidFill>
-            <a:schemeClr val="bg1"/>
-          </a:solidFill>
-        </p:spPr>
-        <p:txBody>
-          <a:bodyPr vert="horz" lIns="91440" tIns="45720" rIns="91440" bIns="45720" rtlCol="0">
-            <a:normAutofit/>
-          </a:bodyPr>
-          <a:lstStyle>
-            <a:lvl1pPr marL="342900" indent="-342900" algn="l" defTabSz="457200" rtl="0" eaLnBrk="1" latinLnBrk="0" hangingPunct="1">
-              <a:spcBef>
-                <a:spcPts val="1000"/>
-              </a:spcBef>
-              <a:spcAft>
-                <a:spcPts val="0"/>
-              </a:spcAft>
-              <a:buClr>
-                <a:schemeClr val="accent1"/>
-              </a:buClr>
-              <a:buSzPct val="80000"/>
-              <a:buFont typeface="Wingdings 3" charset="2"/>
-              <a:buChar char=""/>
-              <a:defRPr sz="1800" kern="1200">
-                <a:solidFill>
-                  <a:schemeClr val="tx1">
-                    <a:lumMod val="75000"/>
-                    <a:lumOff val="25000"/>
-                  </a:schemeClr>
-                </a:solidFill>
-                <a:latin typeface="+mn-lt"/>
-                <a:ea typeface="+mn-ea"/>
-                <a:cs typeface="+mn-cs"/>
-              </a:defRPr>
-            </a:lvl1pPr>
-            <a:lvl2pPr marL="742950" indent="-285750" algn="l" defTabSz="457200" rtl="0" eaLnBrk="1" latinLnBrk="0" hangingPunct="1">
-              <a:spcBef>
-                <a:spcPts val="1000"/>
-              </a:spcBef>
-              <a:spcAft>
-                <a:spcPts val="0"/>
-              </a:spcAft>
-              <a:buClr>
-                <a:schemeClr val="accent1"/>
-              </a:buClr>
-              <a:buSzPct val="80000"/>
-              <a:buFont typeface="Wingdings 3" charset="2"/>
-              <a:buChar char=""/>
-              <a:defRPr sz="1600" kern="1200">
-                <a:solidFill>
-                  <a:schemeClr val="tx1">
-                    <a:lumMod val="75000"/>
-                    <a:lumOff val="25000"/>
-                  </a:schemeClr>
-                </a:solidFill>
-                <a:latin typeface="+mn-lt"/>
-                <a:ea typeface="+mn-ea"/>
-                <a:cs typeface="+mn-cs"/>
-              </a:defRPr>
-            </a:lvl2pPr>
-            <a:lvl3pPr marL="1143000" indent="-228600" algn="l" defTabSz="457200" rtl="0" eaLnBrk="1" latinLnBrk="0" hangingPunct="1">
-              <a:spcBef>
-                <a:spcPts val="1000"/>
-              </a:spcBef>
-              <a:spcAft>
-                <a:spcPts val="0"/>
-              </a:spcAft>
-              <a:buClr>
-                <a:schemeClr val="accent1"/>
-              </a:buClr>
-              <a:buSzPct val="80000"/>
-              <a:buFont typeface="Wingdings 3" charset="2"/>
-              <a:buChar char=""/>
-              <a:defRPr sz="1400" kern="1200">
-                <a:solidFill>
-                  <a:schemeClr val="tx1">
-                    <a:lumMod val="75000"/>
-                    <a:lumOff val="25000"/>
-                  </a:schemeClr>
-                </a:solidFill>
-                <a:latin typeface="+mn-lt"/>
-                <a:ea typeface="+mn-ea"/>
-                <a:cs typeface="+mn-cs"/>
-              </a:defRPr>
-            </a:lvl3pPr>
-            <a:lvl4pPr marL="1600200" indent="-228600" algn="l" defTabSz="457200" rtl="0" eaLnBrk="1" latinLnBrk="0" hangingPunct="1">
-              <a:spcBef>
-                <a:spcPts val="1000"/>
-              </a:spcBef>
-              <a:spcAft>
-                <a:spcPts val="0"/>
-              </a:spcAft>
-              <a:buClr>
-                <a:schemeClr val="accent1"/>
-              </a:buClr>
-              <a:buSzPct val="80000"/>
-              <a:buFont typeface="Wingdings 3" charset="2"/>
-              <a:buChar char=""/>
-              <a:defRPr sz="1200" kern="1200">
-                <a:solidFill>
-                  <a:schemeClr val="tx1">
-                    <a:lumMod val="75000"/>
-                    <a:lumOff val="25000"/>
-                  </a:schemeClr>
-                </a:solidFill>
-                <a:latin typeface="+mn-lt"/>
-                <a:ea typeface="+mn-ea"/>
-                <a:cs typeface="+mn-cs"/>
-              </a:defRPr>
-            </a:lvl4pPr>
-            <a:lvl5pPr marL="2057400" indent="-228600" algn="l" defTabSz="457200" rtl="0" eaLnBrk="1" latinLnBrk="0" hangingPunct="1">
-              <a:spcBef>
-                <a:spcPts val="1000"/>
-              </a:spcBef>
-              <a:spcAft>
-                <a:spcPts val="0"/>
-              </a:spcAft>
-              <a:buClr>
-                <a:schemeClr val="accent1"/>
-              </a:buClr>
-              <a:buSzPct val="80000"/>
-              <a:buFont typeface="Wingdings 3" charset="2"/>
-              <a:buChar char=""/>
-              <a:defRPr sz="1200" kern="1200">
-                <a:solidFill>
-                  <a:schemeClr val="tx1">
-                    <a:lumMod val="75000"/>
-                    <a:lumOff val="25000"/>
-                  </a:schemeClr>
-                </a:solidFill>
-                <a:latin typeface="+mn-lt"/>
-                <a:ea typeface="+mn-ea"/>
-                <a:cs typeface="+mn-cs"/>
-              </a:defRPr>
-            </a:lvl5pPr>
-            <a:lvl6pPr marL="2514600" indent="-228600" algn="l" defTabSz="457200" rtl="0" eaLnBrk="1" latinLnBrk="0" hangingPunct="1">
-              <a:spcBef>
-                <a:spcPts val="1000"/>
-              </a:spcBef>
-              <a:spcAft>
-                <a:spcPts val="0"/>
-              </a:spcAft>
-              <a:buClr>
-                <a:schemeClr val="accent1"/>
-              </a:buClr>
-              <a:buSzPct val="80000"/>
-              <a:buFont typeface="Wingdings 3" charset="2"/>
-              <a:buChar char=""/>
-              <a:defRPr sz="1200" kern="1200">
-                <a:solidFill>
-                  <a:schemeClr val="tx1">
-                    <a:lumMod val="75000"/>
-                    <a:lumOff val="25000"/>
-                  </a:schemeClr>
-                </a:solidFill>
-                <a:latin typeface="+mn-lt"/>
-                <a:ea typeface="+mn-ea"/>
-                <a:cs typeface="+mn-cs"/>
-              </a:defRPr>
-            </a:lvl6pPr>
-            <a:lvl7pPr marL="2971800" indent="-228600" algn="l" defTabSz="457200" rtl="0" eaLnBrk="1" latinLnBrk="0" hangingPunct="1">
-              <a:spcBef>
-                <a:spcPts val="1000"/>
-              </a:spcBef>
-              <a:spcAft>
-                <a:spcPts val="0"/>
-              </a:spcAft>
-              <a:buClr>
-                <a:schemeClr val="accent1"/>
-              </a:buClr>
-              <a:buSzPct val="80000"/>
-              <a:buFont typeface="Wingdings 3" charset="2"/>
-              <a:buChar char=""/>
-              <a:defRPr sz="1200" kern="1200">
-                <a:solidFill>
-                  <a:schemeClr val="tx1">
-                    <a:lumMod val="75000"/>
-                    <a:lumOff val="25000"/>
-                  </a:schemeClr>
-                </a:solidFill>
-                <a:latin typeface="+mn-lt"/>
-                <a:ea typeface="+mn-ea"/>
-                <a:cs typeface="+mn-cs"/>
-              </a:defRPr>
-            </a:lvl7pPr>
-            <a:lvl8pPr marL="3429000" indent="-228600" algn="l" defTabSz="457200" rtl="0" eaLnBrk="1" latinLnBrk="0" hangingPunct="1">
-              <a:spcBef>
-                <a:spcPts val="1000"/>
-              </a:spcBef>
-              <a:spcAft>
-                <a:spcPts val="0"/>
-              </a:spcAft>
-              <a:buClr>
-                <a:schemeClr val="accent1"/>
-              </a:buClr>
-              <a:buSzPct val="80000"/>
-              <a:buFont typeface="Wingdings 3" charset="2"/>
-              <a:buChar char=""/>
-              <a:defRPr sz="1200" kern="1200">
-                <a:solidFill>
-                  <a:schemeClr val="tx1">
-                    <a:lumMod val="75000"/>
-                    <a:lumOff val="25000"/>
-                  </a:schemeClr>
-                </a:solidFill>
-                <a:latin typeface="+mn-lt"/>
-                <a:ea typeface="+mn-ea"/>
-                <a:cs typeface="+mn-cs"/>
-              </a:defRPr>
-            </a:lvl8pPr>
-            <a:lvl9pPr marL="3886200" indent="-228600" algn="l" defTabSz="457200" rtl="0" eaLnBrk="1" latinLnBrk="0" hangingPunct="1">
-              <a:spcBef>
-                <a:spcPts val="1000"/>
-              </a:spcBef>
-              <a:spcAft>
-                <a:spcPts val="0"/>
-              </a:spcAft>
-              <a:buClr>
-                <a:schemeClr val="accent1"/>
-              </a:buClr>
-              <a:buSzPct val="80000"/>
-              <a:buFont typeface="Wingdings 3" charset="2"/>
-              <a:buChar char=""/>
-              <a:defRPr sz="1200" kern="1200">
-                <a:solidFill>
-                  <a:schemeClr val="tx1">
-                    <a:lumMod val="75000"/>
-                    <a:lumOff val="25000"/>
-                  </a:schemeClr>
-                </a:solidFill>
-                <a:latin typeface="+mn-lt"/>
-                <a:ea typeface="+mn-ea"/>
-                <a:cs typeface="+mn-cs"/>
-              </a:defRPr>
-            </a:lvl9pPr>
-          </a:lstStyle>
-          <a:p>
-            <a:r>
-              <a:rPr lang="en-US" sz="2000" dirty="0" err="1"/>
-              <a:t>InputIterator</a:t>
-            </a:r>
-            <a:r>
-              <a:rPr lang="en-US" sz="2000" dirty="0"/>
-              <a:t> </a:t>
-            </a:r>
-            <a:r>
-              <a:rPr lang="en-US" sz="2000" dirty="0" err="1"/>
-              <a:t>fisrt</a:t>
-            </a:r>
-            <a:r>
-              <a:rPr lang="en-US" sz="2000" dirty="0"/>
-              <a:t> </a:t>
-            </a:r>
-            <a:r>
-              <a:rPr lang="ru-RU" sz="2000" dirty="0"/>
-              <a:t>стоит слева от знака оператора сравнения. </a:t>
-            </a:r>
-            <a:endParaRPr lang="en-US" sz="2000" dirty="0"/>
-          </a:p>
-          <a:p>
-            <a:r>
-              <a:rPr lang="en-US" sz="2000" dirty="0" err="1"/>
-              <a:t>OutputIterator</a:t>
-            </a:r>
-            <a:r>
-              <a:rPr lang="en-US" sz="2000" dirty="0"/>
-              <a:t> result </a:t>
-            </a:r>
-            <a:r>
-              <a:rPr lang="ru-RU" sz="2000" dirty="0"/>
-              <a:t>изменят совй значение на то, на которое указывает </a:t>
-            </a:r>
-            <a:r>
-              <a:rPr lang="en-US" sz="2000" dirty="0" err="1"/>
-              <a:t>InputIterator</a:t>
-            </a:r>
-            <a:r>
-              <a:rPr lang="en-US" sz="2000" dirty="0"/>
-              <a:t> first</a:t>
-            </a:r>
-          </a:p>
-        </p:txBody>
-      </p:sp>
-    </p:spTree>
-    <p:extLst>
-      <p:ext uri="{BB962C8B-B14F-4D97-AF65-F5344CB8AC3E}">
-        <p14:creationId xmlns:p14="http://schemas.microsoft.com/office/powerpoint/2010/main" val="1005149934"/>
-      </p:ext>
-    </p:extLst>
-  </p:cSld>
-  <p:clrMapOvr>
-    <a:masterClrMapping/>
-  </p:clrMapOvr>
-  <p:timing>
-    <p:tnLst>
-      <p:par>
-        <p:cTn id="1" dur="indefinite" restart="never" nodeType="tmRoot"/>
-      </p:par>
-    </p:tnLst>
-  </p:timing>
-</p:sld>
-</file>
-
-<file path=ppt/slides/slide29.xml><?xml version="1.0" encoding="utf-8"?>
-<p:sld xmlns:a="http://schemas.openxmlformats.org/drawingml/2006/main" xmlns:r="http://schemas.openxmlformats.org/officeDocument/2006/relationships" xmlns:p="http://schemas.openxmlformats.org/presentationml/2006/main">
-  <p:cSld>
-    <p:spTree>
-      <p:nvGrpSpPr>
-        <p:cNvPr id="1" name=""/>
-        <p:cNvGrpSpPr/>
-        <p:nvPr/>
-      </p:nvGrpSpPr>
-      <p:grpSpPr>
-        <a:xfrm>
-          <a:off x="0" y="0"/>
-          <a:ext cx="0" cy="0"/>
-          <a:chOff x="0" y="0"/>
-          <a:chExt cx="0" cy="0"/>
-        </a:xfrm>
-      </p:grpSpPr>
-      <p:sp>
-        <p:nvSpPr>
-          <p:cNvPr id="3" name="Content Placeholder 2">
-            <a:extLst>
-              <a:ext uri="{FF2B5EF4-FFF2-40B4-BE49-F238E27FC236}">
-                <a16:creationId xmlns:a16="http://schemas.microsoft.com/office/drawing/2014/main" xmlns="" id="{8A2ECED4-003D-4CB8-8A92-1A5FD64E89F7}"/>
-              </a:ext>
-            </a:extLst>
-          </p:cNvPr>
-          <p:cNvSpPr>
-            <a:spLocks noGrp="1"/>
-          </p:cNvSpPr>
-          <p:nvPr>
-            <p:ph idx="1"/>
-          </p:nvPr>
-        </p:nvSpPr>
-        <p:spPr>
-          <a:xfrm>
-            <a:off x="7119442" y="783343"/>
-            <a:ext cx="4814891" cy="2151768"/>
-          </a:xfrm>
-          <a:solidFill>
-            <a:schemeClr val="bg1"/>
-          </a:solidFill>
-        </p:spPr>
-        <p:txBody>
-          <a:bodyPr>
-            <a:noAutofit/>
-          </a:bodyPr>
-          <a:lstStyle/>
-          <a:p>
-            <a:r>
-              <a:rPr lang="en-US" sz="2000" dirty="0" err="1"/>
-              <a:t>ForwardIterator</a:t>
-            </a:r>
-            <a:r>
-              <a:rPr lang="en-US" sz="2000" dirty="0"/>
-              <a:t> </a:t>
-            </a:r>
-            <a:r>
-              <a:rPr lang="ru-RU" sz="2000" dirty="0"/>
-              <a:t>объединяет в себе функциональность </a:t>
-            </a:r>
-            <a:r>
-              <a:rPr lang="en-US" sz="2000" dirty="0" err="1"/>
-              <a:t>InutIterator</a:t>
-            </a:r>
-            <a:r>
-              <a:rPr lang="en-US" sz="2000" dirty="0"/>
-              <a:t> </a:t>
-            </a:r>
-            <a:r>
-              <a:rPr lang="ru-RU" sz="2000" dirty="0"/>
-              <a:t>и </a:t>
-            </a:r>
-            <a:r>
-              <a:rPr lang="en-US" sz="2000" dirty="0" err="1"/>
-              <a:t>OutputIterator</a:t>
-            </a:r>
-            <a:endParaRPr lang="en-US" sz="2000" dirty="0"/>
-          </a:p>
-          <a:p>
-            <a:r>
-              <a:rPr lang="ru-RU" sz="2000" dirty="0"/>
-              <a:t>Может использоваться в алгоритмах в качестве любого из них</a:t>
-            </a:r>
-            <a:r>
-              <a:rPr lang="en-US" sz="2000" dirty="0"/>
-              <a:t> </a:t>
-            </a:r>
-          </a:p>
-        </p:txBody>
-      </p:sp>
-      <p:pic>
-        <p:nvPicPr>
-          <p:cNvPr id="4" name="Picture 3">
-            <a:extLst>
-              <a:ext uri="{FF2B5EF4-FFF2-40B4-BE49-F238E27FC236}">
-                <a16:creationId xmlns:a16="http://schemas.microsoft.com/office/drawing/2014/main" xmlns="" id="{7EBB1CAC-E82C-4575-A59E-808C14D22364}"/>
-              </a:ext>
-            </a:extLst>
-          </p:cNvPr>
-          <p:cNvPicPr>
-            <a:picLocks noChangeAspect="1"/>
-          </p:cNvPicPr>
-          <p:nvPr/>
-        </p:nvPicPr>
-        <p:blipFill rotWithShape="1">
-          <a:blip r:embed="rId2"/>
-          <a:srcRect b="10299"/>
-          <a:stretch/>
-        </p:blipFill>
-        <p:spPr>
-          <a:xfrm>
-            <a:off x="443058" y="1097316"/>
-            <a:ext cx="5829300" cy="1307218"/>
-          </a:xfrm>
-          <a:prstGeom prst="rect">
-            <a:avLst/>
-          </a:prstGeom>
-        </p:spPr>
-      </p:pic>
-      <p:sp>
-        <p:nvSpPr>
-          <p:cNvPr id="5" name="Title 1">
-            <a:extLst>
-              <a:ext uri="{FF2B5EF4-FFF2-40B4-BE49-F238E27FC236}">
-                <a16:creationId xmlns:a16="http://schemas.microsoft.com/office/drawing/2014/main" xmlns="" id="{AB45E17C-D635-444C-9E6E-9F0B20ABC34B}"/>
-              </a:ext>
-            </a:extLst>
-          </p:cNvPr>
-          <p:cNvSpPr txBox="1">
-            <a:spLocks/>
-          </p:cNvSpPr>
-          <p:nvPr/>
-        </p:nvSpPr>
-        <p:spPr>
-          <a:xfrm>
-            <a:off x="443058" y="128922"/>
-            <a:ext cx="11491275" cy="476150"/>
-          </a:xfrm>
-          <a:prstGeom prst="rect">
-            <a:avLst/>
-          </a:prstGeom>
-          <a:solidFill>
-            <a:schemeClr val="bg1"/>
-          </a:solidFill>
-          <a:ln>
-            <a:solidFill>
-              <a:schemeClr val="tx1"/>
-            </a:solidFill>
-          </a:ln>
-        </p:spPr>
-        <p:txBody>
-          <a:bodyPr vert="horz" lIns="91440" tIns="45720" rIns="91440" bIns="45720" rtlCol="0" anchor="t">
-            <a:noAutofit/>
-          </a:bodyPr>
-          <a:lstStyle>
-            <a:lvl1pPr algn="l" defTabSz="457200" rtl="0" eaLnBrk="1" latinLnBrk="0" hangingPunct="1">
-              <a:spcBef>
-                <a:spcPct val="0"/>
-              </a:spcBef>
-              <a:buNone/>
-              <a:defRPr sz="3600" kern="1200">
-                <a:solidFill>
-                  <a:schemeClr val="accent1"/>
-                </a:solidFill>
-                <a:latin typeface="+mj-lt"/>
-                <a:ea typeface="+mj-ea"/>
-                <a:cs typeface="+mj-cs"/>
-              </a:defRPr>
-            </a:lvl1pPr>
-            <a:lvl2pPr eaLnBrk="1" hangingPunct="1">
-              <a:defRPr>
-                <a:solidFill>
-                  <a:schemeClr val="tx2"/>
-                </a:solidFill>
-              </a:defRPr>
-            </a:lvl2pPr>
-            <a:lvl3pPr eaLnBrk="1" hangingPunct="1">
-              <a:defRPr>
-                <a:solidFill>
-                  <a:schemeClr val="tx2"/>
-                </a:solidFill>
-              </a:defRPr>
-            </a:lvl3pPr>
-            <a:lvl4pPr eaLnBrk="1" hangingPunct="1">
-              <a:defRPr>
-                <a:solidFill>
-                  <a:schemeClr val="tx2"/>
-                </a:solidFill>
-              </a:defRPr>
-            </a:lvl4pPr>
-            <a:lvl5pPr eaLnBrk="1" hangingPunct="1">
-              <a:defRPr>
-                <a:solidFill>
-                  <a:schemeClr val="tx2"/>
-                </a:solidFill>
-              </a:defRPr>
-            </a:lvl5pPr>
-            <a:lvl6pPr eaLnBrk="1" hangingPunct="1">
-              <a:defRPr>
-                <a:solidFill>
-                  <a:schemeClr val="tx2"/>
-                </a:solidFill>
-              </a:defRPr>
-            </a:lvl6pPr>
-            <a:lvl7pPr eaLnBrk="1" hangingPunct="1">
-              <a:defRPr>
-                <a:solidFill>
-                  <a:schemeClr val="tx2"/>
-                </a:solidFill>
-              </a:defRPr>
-            </a:lvl7pPr>
-            <a:lvl8pPr eaLnBrk="1" hangingPunct="1">
-              <a:defRPr>
-                <a:solidFill>
-                  <a:schemeClr val="tx2"/>
-                </a:solidFill>
-              </a:defRPr>
-            </a:lvl8pPr>
-            <a:lvl9pPr eaLnBrk="1" hangingPunct="1">
-              <a:defRPr>
-                <a:solidFill>
-                  <a:schemeClr val="tx2"/>
-                </a:solidFill>
-              </a:defRPr>
-            </a:lvl9pPr>
-          </a:lstStyle>
-          <a:p>
-            <a:pPr algn="ctr"/>
-            <a:r>
-              <a:rPr lang="en-US" sz="2800" dirty="0"/>
-              <a:t>STL</a:t>
-            </a:r>
-            <a:r>
-              <a:rPr lang="ru-RU" sz="2800" dirty="0"/>
-              <a:t>: </a:t>
-            </a:r>
-            <a:r>
-              <a:rPr lang="en-US" sz="2800" dirty="0" err="1"/>
-              <a:t>ForwardIterator</a:t>
-            </a:r>
-            <a:endParaRPr lang="en-US" sz="2800" dirty="0"/>
-          </a:p>
-        </p:txBody>
-      </p:sp>
-      <p:pic>
-        <p:nvPicPr>
-          <p:cNvPr id="6" name="Picture 5">
-            <a:extLst>
-              <a:ext uri="{FF2B5EF4-FFF2-40B4-BE49-F238E27FC236}">
-                <a16:creationId xmlns:a16="http://schemas.microsoft.com/office/drawing/2014/main" xmlns="" id="{C590E18E-DB35-48A2-8D01-CCDDC5796071}"/>
-              </a:ext>
-            </a:extLst>
-          </p:cNvPr>
-          <p:cNvPicPr>
-            <a:picLocks noChangeAspect="1"/>
-          </p:cNvPicPr>
-          <p:nvPr/>
-        </p:nvPicPr>
-        <p:blipFill>
-          <a:blip r:embed="rId3"/>
-          <a:stretch>
-            <a:fillRect/>
-          </a:stretch>
-        </p:blipFill>
-        <p:spPr>
-          <a:xfrm>
-            <a:off x="561670" y="3429000"/>
-            <a:ext cx="6330420" cy="2385376"/>
-          </a:xfrm>
-          <a:prstGeom prst="rect">
-            <a:avLst/>
-          </a:prstGeom>
-        </p:spPr>
-      </p:pic>
-      <p:sp>
-        <p:nvSpPr>
-          <p:cNvPr id="7" name="Content Placeholder 2">
-            <a:extLst>
-              <a:ext uri="{FF2B5EF4-FFF2-40B4-BE49-F238E27FC236}">
-                <a16:creationId xmlns:a16="http://schemas.microsoft.com/office/drawing/2014/main" xmlns="" id="{6423B81A-58F9-4F18-87B4-FC1F266353F5}"/>
-              </a:ext>
-            </a:extLst>
-          </p:cNvPr>
-          <p:cNvSpPr txBox="1">
-            <a:spLocks/>
-          </p:cNvSpPr>
-          <p:nvPr/>
-        </p:nvSpPr>
-        <p:spPr>
-          <a:xfrm>
-            <a:off x="7119442" y="3545803"/>
-            <a:ext cx="4814891" cy="2787263"/>
-          </a:xfrm>
-          <a:prstGeom prst="rect">
-            <a:avLst/>
-          </a:prstGeom>
-          <a:solidFill>
-            <a:schemeClr val="bg1"/>
-          </a:solidFill>
-        </p:spPr>
-        <p:txBody>
-          <a:bodyPr vert="horz" lIns="91440" tIns="45720" rIns="91440" bIns="45720" rtlCol="0">
-            <a:noAutofit/>
-          </a:bodyPr>
-          <a:lstStyle>
-            <a:lvl1pPr marL="342900" indent="-342900" algn="l" defTabSz="457200" rtl="0" eaLnBrk="1" latinLnBrk="0" hangingPunct="1">
-              <a:spcBef>
-                <a:spcPts val="1000"/>
-              </a:spcBef>
-              <a:spcAft>
-                <a:spcPts val="0"/>
-              </a:spcAft>
-              <a:buClr>
-                <a:schemeClr val="accent1"/>
-              </a:buClr>
-              <a:buSzPct val="80000"/>
-              <a:buFont typeface="Wingdings 3" charset="2"/>
-              <a:buChar char=""/>
-              <a:defRPr sz="1800" kern="1200">
-                <a:solidFill>
-                  <a:schemeClr val="tx1">
-                    <a:lumMod val="75000"/>
-                    <a:lumOff val="25000"/>
-                  </a:schemeClr>
-                </a:solidFill>
-                <a:latin typeface="+mn-lt"/>
-                <a:ea typeface="+mn-ea"/>
-                <a:cs typeface="+mn-cs"/>
-              </a:defRPr>
-            </a:lvl1pPr>
-            <a:lvl2pPr marL="742950" indent="-285750" algn="l" defTabSz="457200" rtl="0" eaLnBrk="1" latinLnBrk="0" hangingPunct="1">
-              <a:spcBef>
-                <a:spcPts val="1000"/>
-              </a:spcBef>
-              <a:spcAft>
-                <a:spcPts val="0"/>
-              </a:spcAft>
-              <a:buClr>
-                <a:schemeClr val="accent1"/>
-              </a:buClr>
-              <a:buSzPct val="80000"/>
-              <a:buFont typeface="Wingdings 3" charset="2"/>
-              <a:buChar char=""/>
-              <a:defRPr sz="1600" kern="1200">
-                <a:solidFill>
-                  <a:schemeClr val="tx1">
-                    <a:lumMod val="75000"/>
-                    <a:lumOff val="25000"/>
-                  </a:schemeClr>
-                </a:solidFill>
-                <a:latin typeface="+mn-lt"/>
-                <a:ea typeface="+mn-ea"/>
-                <a:cs typeface="+mn-cs"/>
-              </a:defRPr>
-            </a:lvl2pPr>
-            <a:lvl3pPr marL="1143000" indent="-228600" algn="l" defTabSz="457200" rtl="0" eaLnBrk="1" latinLnBrk="0" hangingPunct="1">
-              <a:spcBef>
-                <a:spcPts val="1000"/>
-              </a:spcBef>
-              <a:spcAft>
-                <a:spcPts val="0"/>
-              </a:spcAft>
-              <a:buClr>
-                <a:schemeClr val="accent1"/>
-              </a:buClr>
-              <a:buSzPct val="80000"/>
-              <a:buFont typeface="Wingdings 3" charset="2"/>
-              <a:buChar char=""/>
-              <a:defRPr sz="1400" kern="1200">
-                <a:solidFill>
-                  <a:schemeClr val="tx1">
-                    <a:lumMod val="75000"/>
-                    <a:lumOff val="25000"/>
-                  </a:schemeClr>
-                </a:solidFill>
-                <a:latin typeface="+mn-lt"/>
-                <a:ea typeface="+mn-ea"/>
-                <a:cs typeface="+mn-cs"/>
-              </a:defRPr>
-            </a:lvl3pPr>
-            <a:lvl4pPr marL="1600200" indent="-228600" algn="l" defTabSz="457200" rtl="0" eaLnBrk="1" latinLnBrk="0" hangingPunct="1">
-              <a:spcBef>
-                <a:spcPts val="1000"/>
-              </a:spcBef>
-              <a:spcAft>
-                <a:spcPts val="0"/>
-              </a:spcAft>
-              <a:buClr>
-                <a:schemeClr val="accent1"/>
-              </a:buClr>
-              <a:buSzPct val="80000"/>
-              <a:buFont typeface="Wingdings 3" charset="2"/>
-              <a:buChar char=""/>
-              <a:defRPr sz="1200" kern="1200">
-                <a:solidFill>
-                  <a:schemeClr val="tx1">
-                    <a:lumMod val="75000"/>
-                    <a:lumOff val="25000"/>
-                  </a:schemeClr>
-                </a:solidFill>
-                <a:latin typeface="+mn-lt"/>
-                <a:ea typeface="+mn-ea"/>
-                <a:cs typeface="+mn-cs"/>
-              </a:defRPr>
-            </a:lvl4pPr>
-            <a:lvl5pPr marL="2057400" indent="-228600" algn="l" defTabSz="457200" rtl="0" eaLnBrk="1" latinLnBrk="0" hangingPunct="1">
-              <a:spcBef>
-                <a:spcPts val="1000"/>
-              </a:spcBef>
-              <a:spcAft>
-                <a:spcPts val="0"/>
-              </a:spcAft>
-              <a:buClr>
-                <a:schemeClr val="accent1"/>
-              </a:buClr>
-              <a:buSzPct val="80000"/>
-              <a:buFont typeface="Wingdings 3" charset="2"/>
-              <a:buChar char=""/>
-              <a:defRPr sz="1200" kern="1200">
-                <a:solidFill>
-                  <a:schemeClr val="tx1">
-                    <a:lumMod val="75000"/>
-                    <a:lumOff val="25000"/>
-                  </a:schemeClr>
-                </a:solidFill>
-                <a:latin typeface="+mn-lt"/>
-                <a:ea typeface="+mn-ea"/>
-                <a:cs typeface="+mn-cs"/>
-              </a:defRPr>
-            </a:lvl5pPr>
-            <a:lvl6pPr marL="2514600" indent="-228600" algn="l" defTabSz="457200" rtl="0" eaLnBrk="1" latinLnBrk="0" hangingPunct="1">
-              <a:spcBef>
-                <a:spcPts val="1000"/>
-              </a:spcBef>
-              <a:spcAft>
-                <a:spcPts val="0"/>
-              </a:spcAft>
-              <a:buClr>
-                <a:schemeClr val="accent1"/>
-              </a:buClr>
-              <a:buSzPct val="80000"/>
-              <a:buFont typeface="Wingdings 3" charset="2"/>
-              <a:buChar char=""/>
-              <a:defRPr sz="1200" kern="1200">
-                <a:solidFill>
-                  <a:schemeClr val="tx1">
-                    <a:lumMod val="75000"/>
-                    <a:lumOff val="25000"/>
-                  </a:schemeClr>
-                </a:solidFill>
-                <a:latin typeface="+mn-lt"/>
-                <a:ea typeface="+mn-ea"/>
-                <a:cs typeface="+mn-cs"/>
-              </a:defRPr>
-            </a:lvl6pPr>
-            <a:lvl7pPr marL="2971800" indent="-228600" algn="l" defTabSz="457200" rtl="0" eaLnBrk="1" latinLnBrk="0" hangingPunct="1">
-              <a:spcBef>
-                <a:spcPts val="1000"/>
-              </a:spcBef>
-              <a:spcAft>
-                <a:spcPts val="0"/>
-              </a:spcAft>
-              <a:buClr>
-                <a:schemeClr val="accent1"/>
-              </a:buClr>
-              <a:buSzPct val="80000"/>
-              <a:buFont typeface="Wingdings 3" charset="2"/>
-              <a:buChar char=""/>
-              <a:defRPr sz="1200" kern="1200">
-                <a:solidFill>
-                  <a:schemeClr val="tx1">
-                    <a:lumMod val="75000"/>
-                    <a:lumOff val="25000"/>
-                  </a:schemeClr>
-                </a:solidFill>
-                <a:latin typeface="+mn-lt"/>
-                <a:ea typeface="+mn-ea"/>
-                <a:cs typeface="+mn-cs"/>
-              </a:defRPr>
-            </a:lvl7pPr>
-            <a:lvl8pPr marL="3429000" indent="-228600" algn="l" defTabSz="457200" rtl="0" eaLnBrk="1" latinLnBrk="0" hangingPunct="1">
-              <a:spcBef>
-                <a:spcPts val="1000"/>
-              </a:spcBef>
-              <a:spcAft>
-                <a:spcPts val="0"/>
-              </a:spcAft>
-              <a:buClr>
-                <a:schemeClr val="accent1"/>
-              </a:buClr>
-              <a:buSzPct val="80000"/>
-              <a:buFont typeface="Wingdings 3" charset="2"/>
-              <a:buChar char=""/>
-              <a:defRPr sz="1200" kern="1200">
-                <a:solidFill>
-                  <a:schemeClr val="tx1">
-                    <a:lumMod val="75000"/>
-                    <a:lumOff val="25000"/>
-                  </a:schemeClr>
-                </a:solidFill>
-                <a:latin typeface="+mn-lt"/>
-                <a:ea typeface="+mn-ea"/>
-                <a:cs typeface="+mn-cs"/>
-              </a:defRPr>
-            </a:lvl8pPr>
-            <a:lvl9pPr marL="3886200" indent="-228600" algn="l" defTabSz="457200" rtl="0" eaLnBrk="1" latinLnBrk="0" hangingPunct="1">
-              <a:spcBef>
-                <a:spcPts val="1000"/>
-              </a:spcBef>
-              <a:spcAft>
-                <a:spcPts val="0"/>
-              </a:spcAft>
-              <a:buClr>
-                <a:schemeClr val="accent1"/>
-              </a:buClr>
-              <a:buSzPct val="80000"/>
-              <a:buFont typeface="Wingdings 3" charset="2"/>
-              <a:buChar char=""/>
-              <a:defRPr sz="1200" kern="1200">
-                <a:solidFill>
-                  <a:schemeClr val="tx1">
-                    <a:lumMod val="75000"/>
-                    <a:lumOff val="25000"/>
-                  </a:schemeClr>
-                </a:solidFill>
-                <a:latin typeface="+mn-lt"/>
-                <a:ea typeface="+mn-ea"/>
-                <a:cs typeface="+mn-cs"/>
-              </a:defRPr>
-            </a:lvl9pPr>
-          </a:lstStyle>
-          <a:p>
-            <a:r>
-              <a:rPr lang="ru-RU" sz="2000" dirty="0"/>
-              <a:t>И </a:t>
-            </a:r>
-            <a:r>
-              <a:rPr lang="en-US" sz="2000" dirty="0" err="1"/>
-              <a:t>ForwardIterator</a:t>
-            </a:r>
-            <a:r>
-              <a:rPr lang="en-US" sz="2000" dirty="0"/>
-              <a:t> first</a:t>
-            </a:r>
-            <a:r>
-              <a:rPr lang="ru-RU" sz="2000" dirty="0"/>
-              <a:t> стоит по левую сторону от знака оператора сравнения !=, т.е. он определяет этот оператор</a:t>
-            </a:r>
-          </a:p>
-          <a:p>
-            <a:r>
-              <a:rPr lang="en-US" sz="2000" dirty="0" err="1"/>
-              <a:t>ForwardIterator</a:t>
-            </a:r>
-            <a:r>
-              <a:rPr lang="en-US" sz="2000" dirty="0"/>
-              <a:t> first </a:t>
-            </a:r>
-            <a:r>
-              <a:rPr lang="ru-RU" sz="2000" dirty="0"/>
-              <a:t>разыменовывается с изменением значения</a:t>
-            </a:r>
-            <a:endParaRPr lang="en-US" sz="2000" dirty="0"/>
-          </a:p>
-        </p:txBody>
-      </p:sp>
-    </p:spTree>
-    <p:extLst>
-      <p:ext uri="{BB962C8B-B14F-4D97-AF65-F5344CB8AC3E}">
-        <p14:creationId xmlns:p14="http://schemas.microsoft.com/office/powerpoint/2010/main" val="507716601"/>
-      </p:ext>
-    </p:extLst>
-  </p:cSld>
-  <p:clrMapOvr>
-    <a:masterClrMapping/>
-  </p:clrMapOvr>
-  <p:timing>
-    <p:tnLst>
-      <p:par>
-        <p:cTn id="1" dur="indefinite" restart="never" nodeType="tmRoot"/>
-      </p:par>
-    </p:tnLst>
-  </p:timing>
 </p:sld>
 </file>
 

</xml_diff>

<commit_message>
Revert "Lectures 2 to 5"
This reverts commit a8b181fe978f405651e9afc11fbccf791c1c6800.
</commit_message>
<xml_diff>
--- a/lecture1/lecture1.pptx
+++ b/lecture1/lecture1.pptx
@@ -5,7 +5,7 @@
     <p:sldMasterId id="2147483660" r:id="rId1"/>
   </p:sldMasterIdLst>
   <p:notesMasterIdLst>
-    <p:notesMasterId r:id="rId29"/>
+    <p:notesMasterId r:id="rId31"/>
   </p:notesMasterIdLst>
   <p:sldIdLst>
     <p:sldId id="256" r:id="rId2"/>
@@ -34,7 +34,9 @@
     <p:sldId id="281" r:id="rId25"/>
     <p:sldId id="282" r:id="rId26"/>
     <p:sldId id="286" r:id="rId27"/>
-    <p:sldId id="287" r:id="rId28"/>
+    <p:sldId id="274" r:id="rId28"/>
+    <p:sldId id="275" r:id="rId29"/>
+    <p:sldId id="276" r:id="rId30"/>
   </p:sldIdLst>
   <p:sldSz cx="12192000" cy="6858000"/>
   <p:notesSz cx="6858000" cy="9144000"/>
@@ -223,7 +225,7 @@
           <a:p>
             <a:fld id="{BD15EF38-3B10-40F0-B249-86CE6663FE34}" type="datetimeFigureOut">
               <a:rPr lang="en-US" smtClean="0"/>
-              <a:t>10/20/2021</a:t>
+              <a:t>9/7/2021</a:t>
             </a:fld>
             <a:endParaRPr lang="en-US"/>
           </a:p>
@@ -1297,7 +1299,7 @@
           <a:p>
             <a:fld id="{CE714A4D-0714-4252-833A-B8AD32A83945}" type="datetimeFigureOut">
               <a:rPr lang="en-US" smtClean="0"/>
-              <a:t>10/20/2021</a:t>
+              <a:t>9/7/2021</a:t>
             </a:fld>
             <a:endParaRPr lang="en-US"/>
           </a:p>
@@ -1548,7 +1550,7 @@
           <a:p>
             <a:fld id="{CE714A4D-0714-4252-833A-B8AD32A83945}" type="datetimeFigureOut">
               <a:rPr lang="en-US" smtClean="0"/>
-              <a:t>10/20/2021</a:t>
+              <a:t>9/7/2021</a:t>
             </a:fld>
             <a:endParaRPr lang="en-US"/>
           </a:p>
@@ -1862,7 +1864,7 @@
           <a:p>
             <a:fld id="{CE714A4D-0714-4252-833A-B8AD32A83945}" type="datetimeFigureOut">
               <a:rPr lang="en-US" smtClean="0"/>
-              <a:t>10/20/2021</a:t>
+              <a:t>9/7/2021</a:t>
             </a:fld>
             <a:endParaRPr lang="en-US"/>
           </a:p>
@@ -2203,7 +2205,7 @@
           <a:p>
             <a:fld id="{CE714A4D-0714-4252-833A-B8AD32A83945}" type="datetimeFigureOut">
               <a:rPr lang="en-US" smtClean="0"/>
-              <a:t>10/20/2021</a:t>
+              <a:t>9/7/2021</a:t>
             </a:fld>
             <a:endParaRPr lang="en-US"/>
           </a:p>
@@ -2517,7 +2519,7 @@
           <a:p>
             <a:fld id="{CE714A4D-0714-4252-833A-B8AD32A83945}" type="datetimeFigureOut">
               <a:rPr lang="en-US" smtClean="0"/>
-              <a:t>10/20/2021</a:t>
+              <a:t>9/7/2021</a:t>
             </a:fld>
             <a:endParaRPr lang="en-US"/>
           </a:p>
@@ -2910,7 +2912,7 @@
           <a:p>
             <a:fld id="{CE714A4D-0714-4252-833A-B8AD32A83945}" type="datetimeFigureOut">
               <a:rPr lang="en-US" smtClean="0"/>
-              <a:t>10/20/2021</a:t>
+              <a:t>9/7/2021</a:t>
             </a:fld>
             <a:endParaRPr lang="en-US"/>
           </a:p>
@@ -3080,7 +3082,7 @@
           <a:p>
             <a:fld id="{CE714A4D-0714-4252-833A-B8AD32A83945}" type="datetimeFigureOut">
               <a:rPr lang="en-US" smtClean="0"/>
-              <a:t>10/20/2021</a:t>
+              <a:t>9/7/2021</a:t>
             </a:fld>
             <a:endParaRPr lang="en-US"/>
           </a:p>
@@ -3260,7 +3262,7 @@
           <a:p>
             <a:fld id="{CE714A4D-0714-4252-833A-B8AD32A83945}" type="datetimeFigureOut">
               <a:rPr lang="en-US" smtClean="0"/>
-              <a:t>10/20/2021</a:t>
+              <a:t>9/7/2021</a:t>
             </a:fld>
             <a:endParaRPr lang="en-US"/>
           </a:p>
@@ -3436,7 +3438,7 @@
           <a:p>
             <a:fld id="{CE714A4D-0714-4252-833A-B8AD32A83945}" type="datetimeFigureOut">
               <a:rPr lang="en-US" smtClean="0"/>
-              <a:t>10/20/2021</a:t>
+              <a:t>9/7/2021</a:t>
             </a:fld>
             <a:endParaRPr lang="en-US"/>
           </a:p>
@@ -3683,7 +3685,7 @@
           <a:p>
             <a:fld id="{CE714A4D-0714-4252-833A-B8AD32A83945}" type="datetimeFigureOut">
               <a:rPr lang="en-US" smtClean="0"/>
-              <a:t>10/20/2021</a:t>
+              <a:t>9/7/2021</a:t>
             </a:fld>
             <a:endParaRPr lang="en-US"/>
           </a:p>
@@ -3915,7 +3917,7 @@
           <a:p>
             <a:fld id="{CE714A4D-0714-4252-833A-B8AD32A83945}" type="datetimeFigureOut">
               <a:rPr lang="en-US" smtClean="0"/>
-              <a:t>10/20/2021</a:t>
+              <a:t>9/7/2021</a:t>
             </a:fld>
             <a:endParaRPr lang="en-US"/>
           </a:p>
@@ -4289,7 +4291,7 @@
           <a:p>
             <a:fld id="{CE714A4D-0714-4252-833A-B8AD32A83945}" type="datetimeFigureOut">
               <a:rPr lang="en-US" smtClean="0"/>
-              <a:t>10/20/2021</a:t>
+              <a:t>9/7/2021</a:t>
             </a:fld>
             <a:endParaRPr lang="en-US"/>
           </a:p>
@@ -4412,7 +4414,7 @@
           <a:p>
             <a:fld id="{CE714A4D-0714-4252-833A-B8AD32A83945}" type="datetimeFigureOut">
               <a:rPr lang="en-US" smtClean="0"/>
-              <a:t>10/20/2021</a:t>
+              <a:t>9/7/2021</a:t>
             </a:fld>
             <a:endParaRPr lang="en-US"/>
           </a:p>
@@ -4507,7 +4509,7 @@
           <a:p>
             <a:fld id="{CE714A4D-0714-4252-833A-B8AD32A83945}" type="datetimeFigureOut">
               <a:rPr lang="en-US" smtClean="0"/>
-              <a:t>10/20/2021</a:t>
+              <a:t>9/7/2021</a:t>
             </a:fld>
             <a:endParaRPr lang="en-US"/>
           </a:p>
@@ -4762,7 +4764,7 @@
           <a:p>
             <a:fld id="{CE714A4D-0714-4252-833A-B8AD32A83945}" type="datetimeFigureOut">
               <a:rPr lang="en-US" smtClean="0"/>
-              <a:t>10/20/2021</a:t>
+              <a:t>9/7/2021</a:t>
             </a:fld>
             <a:endParaRPr lang="en-US"/>
           </a:p>
@@ -5025,7 +5027,7 @@
           <a:p>
             <a:fld id="{CE714A4D-0714-4252-833A-B8AD32A83945}" type="datetimeFigureOut">
               <a:rPr lang="en-US" smtClean="0"/>
-              <a:t>10/20/2021</a:t>
+              <a:t>9/7/2021</a:t>
             </a:fld>
             <a:endParaRPr lang="en-US"/>
           </a:p>
@@ -5768,7 +5770,7 @@
           <a:p>
             <a:fld id="{CE714A4D-0714-4252-833A-B8AD32A83945}" type="datetimeFigureOut">
               <a:rPr lang="en-US" smtClean="0"/>
-              <a:t>10/20/2021</a:t>
+              <a:t>9/7/2021</a:t>
             </a:fld>
             <a:endParaRPr lang="en-US"/>
           </a:p>
@@ -23494,6 +23496,25 @@
       </p:grpSpPr>
       <p:sp>
         <p:nvSpPr>
+          <p:cNvPr id="3" name="Объект 2"/>
+          <p:cNvSpPr>
+            <a:spLocks noGrp="1"/>
+          </p:cNvSpPr>
+          <p:nvPr>
+            <p:ph idx="1"/>
+          </p:nvPr>
+        </p:nvSpPr>
+        <p:spPr/>
+        <p:txBody>
+          <a:bodyPr/>
+          <a:lstStyle/>
+          <a:p>
+            <a:endParaRPr lang="en-US"/>
+          </a:p>
+        </p:txBody>
+      </p:sp>
+      <p:sp>
+        <p:nvSpPr>
           <p:cNvPr id="4" name="Title 1">
             <a:extLst>
               <a:ext uri="{FF2B5EF4-FFF2-40B4-BE49-F238E27FC236}">
@@ -23602,14 +23623,6 @@
           <a:p>
             <a:pPr algn="ctr"/>
             <a:r>
-              <a:rPr lang="ru-RU" sz="2800" dirty="0" smtClean="0"/>
-              <a:t>Неупорядоченные контейнеры</a:t>
-            </a:r>
-            <a:r>
-              <a:rPr lang="en-US" sz="2800" dirty="0" smtClean="0"/>
-              <a:t>. </a:t>
-            </a:r>
-            <a:r>
               <a:rPr lang="en-US" sz="2800" dirty="0" err="1" smtClean="0"/>
               <a:t>std</a:t>
             </a:r>
@@ -23619,621 +23632,24 @@
             </a:r>
             <a:r>
               <a:rPr lang="en-US" sz="2800" dirty="0" err="1" smtClean="0"/>
-              <a:t>unordered_set</a:t>
+              <a:t>priority_queue</a:t>
+            </a:r>
+            <a:r>
+              <a:rPr lang="ru-RU" sz="2800" dirty="0" smtClean="0"/>
+              <a:t> </a:t>
+            </a:r>
+            <a:r>
+              <a:rPr lang="en-US" sz="2800" dirty="0" smtClean="0"/>
+              <a:t>:</a:t>
+            </a:r>
+            <a:r>
+              <a:rPr lang="ru-RU" sz="2800" dirty="0" smtClean="0"/>
+              <a:t> Почему это контейнер-адаптер?</a:t>
             </a:r>
             <a:endParaRPr lang="en-US" sz="2800" dirty="0"/>
           </a:p>
         </p:txBody>
       </p:sp>
-      <p:pic>
-        <p:nvPicPr>
-          <p:cNvPr id="2" name="Рисунок 1"/>
-          <p:cNvPicPr>
-            <a:picLocks noChangeAspect="1"/>
-          </p:cNvPicPr>
-          <p:nvPr/>
-        </p:nvPicPr>
-        <p:blipFill>
-          <a:blip r:embed="rId2"/>
-          <a:stretch>
-            <a:fillRect/>
-          </a:stretch>
-        </p:blipFill>
-        <p:spPr>
-          <a:xfrm>
-            <a:off x="235669" y="1217477"/>
-            <a:ext cx="4039501" cy="1543478"/>
-          </a:xfrm>
-          <a:prstGeom prst="rect">
-            <a:avLst/>
-          </a:prstGeom>
-        </p:spPr>
-      </p:pic>
-      <p:sp>
-        <p:nvSpPr>
-          <p:cNvPr id="6" name="Прямоугольник 5"/>
-          <p:cNvSpPr/>
-          <p:nvPr/>
-        </p:nvSpPr>
-        <p:spPr>
-          <a:xfrm>
-            <a:off x="153880" y="809265"/>
-            <a:ext cx="4521887" cy="286497"/>
-          </a:xfrm>
-          <a:prstGeom prst="rect">
-            <a:avLst/>
-          </a:prstGeom>
-        </p:spPr>
-        <p:txBody>
-          <a:bodyPr wrap="square">
-            <a:spAutoFit/>
-          </a:bodyPr>
-          <a:lstStyle/>
-          <a:p>
-            <a:r>
-              <a:rPr lang="en-US" sz="1200" dirty="0"/>
-              <a:t>https://en.cppreference.com/w/cpp/container/unordered_set</a:t>
-            </a:r>
-            <a:endParaRPr lang="en-US" dirty="0"/>
-          </a:p>
-        </p:txBody>
-      </p:sp>
-      <p:pic>
-        <p:nvPicPr>
-          <p:cNvPr id="7" name="Рисунок 6"/>
-          <p:cNvPicPr>
-            <a:picLocks noChangeAspect="1"/>
-          </p:cNvPicPr>
-          <p:nvPr/>
-        </p:nvPicPr>
-        <p:blipFill>
-          <a:blip r:embed="rId3"/>
-          <a:stretch>
-            <a:fillRect/>
-          </a:stretch>
-        </p:blipFill>
-        <p:spPr>
-          <a:xfrm>
-            <a:off x="471076" y="3060233"/>
-            <a:ext cx="4338688" cy="3187084"/>
-          </a:xfrm>
-          <a:prstGeom prst="rect">
-            <a:avLst/>
-          </a:prstGeom>
-        </p:spPr>
-      </p:pic>
-      <mc:AlternateContent xmlns:mc="http://schemas.openxmlformats.org/markup-compatibility/2006" xmlns:a14="http://schemas.microsoft.com/office/drawing/2010/main">
-        <mc:Choice Requires="a14">
-          <p:sp>
-            <p:nvSpPr>
-              <p:cNvPr id="11" name="Объект 2"/>
-              <p:cNvSpPr txBox="1">
-                <a:spLocks/>
-              </p:cNvSpPr>
-              <p:nvPr/>
-            </p:nvSpPr>
-            <p:spPr>
-              <a:xfrm>
-                <a:off x="5344357" y="809265"/>
-                <a:ext cx="6655965" cy="5765359"/>
-              </a:xfrm>
-              <a:prstGeom prst="rect">
-                <a:avLst/>
-              </a:prstGeom>
-              <a:solidFill>
-                <a:schemeClr val="bg1"/>
-              </a:solidFill>
-            </p:spPr>
-            <p:txBody>
-              <a:bodyPr vert="horz" lIns="91440" tIns="45720" rIns="91440" bIns="45720" rtlCol="0">
-                <a:normAutofit/>
-              </a:bodyPr>
-              <a:lstStyle>
-                <a:lvl1pPr marL="342900" indent="-342900" algn="l" defTabSz="457200" rtl="0" eaLnBrk="1" latinLnBrk="0" hangingPunct="1">
-                  <a:spcBef>
-                    <a:spcPts val="1000"/>
-                  </a:spcBef>
-                  <a:spcAft>
-                    <a:spcPts val="0"/>
-                  </a:spcAft>
-                  <a:buClr>
-                    <a:schemeClr val="accent1"/>
-                  </a:buClr>
-                  <a:buSzPct val="80000"/>
-                  <a:buFont typeface="Wingdings 3" charset="2"/>
-                  <a:buChar char=""/>
-                  <a:defRPr sz="1800" kern="1200">
-                    <a:solidFill>
-                      <a:schemeClr val="tx1">
-                        <a:lumMod val="75000"/>
-                        <a:lumOff val="25000"/>
-                      </a:schemeClr>
-                    </a:solidFill>
-                    <a:latin typeface="+mn-lt"/>
-                    <a:ea typeface="+mn-ea"/>
-                    <a:cs typeface="+mn-cs"/>
-                  </a:defRPr>
-                </a:lvl1pPr>
-                <a:lvl2pPr marL="742950" indent="-285750" algn="l" defTabSz="457200" rtl="0" eaLnBrk="1" latinLnBrk="0" hangingPunct="1">
-                  <a:spcBef>
-                    <a:spcPts val="1000"/>
-                  </a:spcBef>
-                  <a:spcAft>
-                    <a:spcPts val="0"/>
-                  </a:spcAft>
-                  <a:buClr>
-                    <a:schemeClr val="accent1"/>
-                  </a:buClr>
-                  <a:buSzPct val="80000"/>
-                  <a:buFont typeface="Wingdings 3" charset="2"/>
-                  <a:buChar char=""/>
-                  <a:defRPr sz="1600" kern="1200">
-                    <a:solidFill>
-                      <a:schemeClr val="tx1">
-                        <a:lumMod val="75000"/>
-                        <a:lumOff val="25000"/>
-                      </a:schemeClr>
-                    </a:solidFill>
-                    <a:latin typeface="+mn-lt"/>
-                    <a:ea typeface="+mn-ea"/>
-                    <a:cs typeface="+mn-cs"/>
-                  </a:defRPr>
-                </a:lvl2pPr>
-                <a:lvl3pPr marL="1143000" indent="-228600" algn="l" defTabSz="457200" rtl="0" eaLnBrk="1" latinLnBrk="0" hangingPunct="1">
-                  <a:spcBef>
-                    <a:spcPts val="1000"/>
-                  </a:spcBef>
-                  <a:spcAft>
-                    <a:spcPts val="0"/>
-                  </a:spcAft>
-                  <a:buClr>
-                    <a:schemeClr val="accent1"/>
-                  </a:buClr>
-                  <a:buSzPct val="80000"/>
-                  <a:buFont typeface="Wingdings 3" charset="2"/>
-                  <a:buChar char=""/>
-                  <a:defRPr sz="1400" kern="1200">
-                    <a:solidFill>
-                      <a:schemeClr val="tx1">
-                        <a:lumMod val="75000"/>
-                        <a:lumOff val="25000"/>
-                      </a:schemeClr>
-                    </a:solidFill>
-                    <a:latin typeface="+mn-lt"/>
-                    <a:ea typeface="+mn-ea"/>
-                    <a:cs typeface="+mn-cs"/>
-                  </a:defRPr>
-                </a:lvl3pPr>
-                <a:lvl4pPr marL="1600200" indent="-228600" algn="l" defTabSz="457200" rtl="0" eaLnBrk="1" latinLnBrk="0" hangingPunct="1">
-                  <a:spcBef>
-                    <a:spcPts val="1000"/>
-                  </a:spcBef>
-                  <a:spcAft>
-                    <a:spcPts val="0"/>
-                  </a:spcAft>
-                  <a:buClr>
-                    <a:schemeClr val="accent1"/>
-                  </a:buClr>
-                  <a:buSzPct val="80000"/>
-                  <a:buFont typeface="Wingdings 3" charset="2"/>
-                  <a:buChar char=""/>
-                  <a:defRPr sz="1200" kern="1200">
-                    <a:solidFill>
-                      <a:schemeClr val="tx1">
-                        <a:lumMod val="75000"/>
-                        <a:lumOff val="25000"/>
-                      </a:schemeClr>
-                    </a:solidFill>
-                    <a:latin typeface="+mn-lt"/>
-                    <a:ea typeface="+mn-ea"/>
-                    <a:cs typeface="+mn-cs"/>
-                  </a:defRPr>
-                </a:lvl4pPr>
-                <a:lvl5pPr marL="2057400" indent="-228600" algn="l" defTabSz="457200" rtl="0" eaLnBrk="1" latinLnBrk="0" hangingPunct="1">
-                  <a:spcBef>
-                    <a:spcPts val="1000"/>
-                  </a:spcBef>
-                  <a:spcAft>
-                    <a:spcPts val="0"/>
-                  </a:spcAft>
-                  <a:buClr>
-                    <a:schemeClr val="accent1"/>
-                  </a:buClr>
-                  <a:buSzPct val="80000"/>
-                  <a:buFont typeface="Wingdings 3" charset="2"/>
-                  <a:buChar char=""/>
-                  <a:defRPr sz="1200" kern="1200">
-                    <a:solidFill>
-                      <a:schemeClr val="tx1">
-                        <a:lumMod val="75000"/>
-                        <a:lumOff val="25000"/>
-                      </a:schemeClr>
-                    </a:solidFill>
-                    <a:latin typeface="+mn-lt"/>
-                    <a:ea typeface="+mn-ea"/>
-                    <a:cs typeface="+mn-cs"/>
-                  </a:defRPr>
-                </a:lvl5pPr>
-                <a:lvl6pPr marL="2514600" indent="-228600" algn="l" defTabSz="457200" rtl="0" eaLnBrk="1" latinLnBrk="0" hangingPunct="1">
-                  <a:spcBef>
-                    <a:spcPts val="1000"/>
-                  </a:spcBef>
-                  <a:spcAft>
-                    <a:spcPts val="0"/>
-                  </a:spcAft>
-                  <a:buClr>
-                    <a:schemeClr val="accent1"/>
-                  </a:buClr>
-                  <a:buSzPct val="80000"/>
-                  <a:buFont typeface="Wingdings 3" charset="2"/>
-                  <a:buChar char=""/>
-                  <a:defRPr sz="1200" kern="1200">
-                    <a:solidFill>
-                      <a:schemeClr val="tx1">
-                        <a:lumMod val="75000"/>
-                        <a:lumOff val="25000"/>
-                      </a:schemeClr>
-                    </a:solidFill>
-                    <a:latin typeface="+mn-lt"/>
-                    <a:ea typeface="+mn-ea"/>
-                    <a:cs typeface="+mn-cs"/>
-                  </a:defRPr>
-                </a:lvl6pPr>
-                <a:lvl7pPr marL="2971800" indent="-228600" algn="l" defTabSz="457200" rtl="0" eaLnBrk="1" latinLnBrk="0" hangingPunct="1">
-                  <a:spcBef>
-                    <a:spcPts val="1000"/>
-                  </a:spcBef>
-                  <a:spcAft>
-                    <a:spcPts val="0"/>
-                  </a:spcAft>
-                  <a:buClr>
-                    <a:schemeClr val="accent1"/>
-                  </a:buClr>
-                  <a:buSzPct val="80000"/>
-                  <a:buFont typeface="Wingdings 3" charset="2"/>
-                  <a:buChar char=""/>
-                  <a:defRPr sz="1200" kern="1200">
-                    <a:solidFill>
-                      <a:schemeClr val="tx1">
-                        <a:lumMod val="75000"/>
-                        <a:lumOff val="25000"/>
-                      </a:schemeClr>
-                    </a:solidFill>
-                    <a:latin typeface="+mn-lt"/>
-                    <a:ea typeface="+mn-ea"/>
-                    <a:cs typeface="+mn-cs"/>
-                  </a:defRPr>
-                </a:lvl7pPr>
-                <a:lvl8pPr marL="3429000" indent="-228600" algn="l" defTabSz="457200" rtl="0" eaLnBrk="1" latinLnBrk="0" hangingPunct="1">
-                  <a:spcBef>
-                    <a:spcPts val="1000"/>
-                  </a:spcBef>
-                  <a:spcAft>
-                    <a:spcPts val="0"/>
-                  </a:spcAft>
-                  <a:buClr>
-                    <a:schemeClr val="accent1"/>
-                  </a:buClr>
-                  <a:buSzPct val="80000"/>
-                  <a:buFont typeface="Wingdings 3" charset="2"/>
-                  <a:buChar char=""/>
-                  <a:defRPr sz="1200" kern="1200">
-                    <a:solidFill>
-                      <a:schemeClr val="tx1">
-                        <a:lumMod val="75000"/>
-                        <a:lumOff val="25000"/>
-                      </a:schemeClr>
-                    </a:solidFill>
-                    <a:latin typeface="+mn-lt"/>
-                    <a:ea typeface="+mn-ea"/>
-                    <a:cs typeface="+mn-cs"/>
-                  </a:defRPr>
-                </a:lvl8pPr>
-                <a:lvl9pPr marL="3886200" indent="-228600" algn="l" defTabSz="457200" rtl="0" eaLnBrk="1" latinLnBrk="0" hangingPunct="1">
-                  <a:spcBef>
-                    <a:spcPts val="1000"/>
-                  </a:spcBef>
-                  <a:spcAft>
-                    <a:spcPts val="0"/>
-                  </a:spcAft>
-                  <a:buClr>
-                    <a:schemeClr val="accent1"/>
-                  </a:buClr>
-                  <a:buSzPct val="80000"/>
-                  <a:buFont typeface="Wingdings 3" charset="2"/>
-                  <a:buChar char=""/>
-                  <a:defRPr sz="1200" kern="1200">
-                    <a:solidFill>
-                      <a:schemeClr val="tx1">
-                        <a:lumMod val="75000"/>
-                        <a:lumOff val="25000"/>
-                      </a:schemeClr>
-                    </a:solidFill>
-                    <a:latin typeface="+mn-lt"/>
-                    <a:ea typeface="+mn-ea"/>
-                    <a:cs typeface="+mn-cs"/>
-                  </a:defRPr>
-                </a:lvl9pPr>
-              </a:lstStyle>
-              <a:p>
-                <a:r>
-                  <a:rPr lang="en-US" dirty="0" smtClean="0"/>
-                  <a:t>std::</a:t>
-                </a:r>
-                <a:r>
-                  <a:rPr lang="en-US" dirty="0" err="1" smtClean="0"/>
-                  <a:t>unordered_set</a:t>
-                </a:r>
-                <a:r>
-                  <a:rPr lang="en-US" dirty="0" smtClean="0"/>
-                  <a:t> – </a:t>
-                </a:r>
-                <a:r>
-                  <a:rPr lang="ru-RU" dirty="0" smtClean="0"/>
-                  <a:t>хэш-таблица (</a:t>
-                </a:r>
-                <a:r>
-                  <a:rPr lang="en-US" dirty="0" err="1" smtClean="0"/>
-                  <a:t>hashtable</a:t>
-                </a:r>
-                <a:r>
-                  <a:rPr lang="ru-RU" dirty="0" smtClean="0"/>
-                  <a:t>)</a:t>
-                </a:r>
-                <a:endParaRPr lang="en-US" dirty="0" smtClean="0"/>
-              </a:p>
-              <a:p>
-                <a:r>
-                  <a:rPr lang="ru-RU" dirty="0" smtClean="0"/>
-                  <a:t>Формальные параметры шаблона:</a:t>
-                </a:r>
-              </a:p>
-              <a:p>
-                <a:pPr marL="574675" indent="-234950" defTabSz="574675">
-                  <a:buFont typeface="Arial" panose="020B0604020202020204" pitchFamily="34" charset="0"/>
-                  <a:buChar char="•"/>
-                </a:pPr>
-                <a:r>
-                  <a:rPr lang="en-US" dirty="0" smtClean="0"/>
-                  <a:t>Hash – </a:t>
-                </a:r>
-                <a:r>
-                  <a:rPr lang="ru-RU" dirty="0" smtClean="0"/>
-                  <a:t>функциональный объект, </a:t>
-                </a:r>
-                <a:r>
-                  <a:rPr lang="ru-RU" dirty="0" err="1" smtClean="0"/>
-                  <a:t>релазизующий</a:t>
-                </a:r>
-                <a:r>
-                  <a:rPr lang="ru-RU" dirty="0" smtClean="0"/>
-                  <a:t> хэш-функцию</a:t>
-                </a:r>
-              </a:p>
-              <a:p>
-                <a:pPr marL="574675" indent="-234950" defTabSz="574675">
-                  <a:buFont typeface="Arial" panose="020B0604020202020204" pitchFamily="34" charset="0"/>
-                  <a:buChar char="•"/>
-                </a:pPr>
-                <a:r>
-                  <a:rPr lang="en-US" dirty="0" err="1" smtClean="0"/>
-                  <a:t>KeyEqual</a:t>
-                </a:r>
-                <a:r>
-                  <a:rPr lang="en-US" dirty="0" smtClean="0"/>
-                  <a:t> – </a:t>
-                </a:r>
-                <a:r>
-                  <a:rPr lang="ru-RU" dirty="0" smtClean="0"/>
-                  <a:t>функциональный объект, реализующий сравнение элементов</a:t>
-                </a:r>
-              </a:p>
-              <a:p>
-                <a:r>
-                  <a:rPr lang="ru-RU" dirty="0" smtClean="0"/>
-                  <a:t>При вставке ключа в контейнер, от данного ключа вычисляется хэш-функция. Ключ помещается в ячейку массива с индексом, равным соответствующему значению хэш-функции. Таким образом, значение ключа определяет его положение</a:t>
-                </a:r>
-              </a:p>
-              <a:p>
-                <a:r>
-                  <a:rPr lang="ru-RU" b="0" dirty="0" smtClean="0">
-                    <a:ea typeface="Cambria Math" panose="02040503050406030204" pitchFamily="18" charset="0"/>
-                  </a:rPr>
-                  <a:t>Для любого множества</a:t>
-                </a:r>
-                <a:r>
-                  <a:rPr lang="ru-RU" b="0" i="1" dirty="0" smtClean="0">
-                    <a:ea typeface="Cambria Math" panose="02040503050406030204" pitchFamily="18" charset="0"/>
-                  </a:rPr>
-                  <a:t> </a:t>
-                </a:r>
-                <a:r>
-                  <a:rPr lang="en-US" b="0" i="1" dirty="0" smtClean="0">
-                    <a:ea typeface="Cambria Math" panose="02040503050406030204" pitchFamily="18" charset="0"/>
-                  </a:rPr>
-                  <a:t>S </a:t>
-                </a:r>
-                <a:r>
-                  <a:rPr lang="ru-RU" b="0" dirty="0" smtClean="0">
-                    <a:ea typeface="Cambria Math" panose="02040503050406030204" pitchFamily="18" charset="0"/>
-                  </a:rPr>
-                  <a:t>и для любого положительного целого числа </a:t>
-                </a:r>
-                <a:r>
-                  <a:rPr lang="en-US" b="0" i="1" dirty="0" smtClean="0">
-                    <a:ea typeface="Cambria Math" panose="02040503050406030204" pitchFamily="18" charset="0"/>
-                  </a:rPr>
-                  <a:t>m</a:t>
-                </a:r>
-                <a:r>
-                  <a:rPr lang="en-US" b="0" dirty="0" smtClean="0">
-                    <a:ea typeface="Cambria Math" panose="02040503050406030204" pitchFamily="18" charset="0"/>
-                  </a:rPr>
-                  <a:t> </a:t>
-                </a:r>
-                <a:r>
-                  <a:rPr lang="ru-RU" b="0" dirty="0" smtClean="0">
-                    <a:ea typeface="Cambria Math" panose="02040503050406030204" pitchFamily="18" charset="0"/>
-                  </a:rPr>
-                  <a:t>функция </a:t>
-                </a:r>
-                <a14:m>
-                  <m:oMath xmlns:m="http://schemas.openxmlformats.org/officeDocument/2006/math">
-                    <m:r>
-                      <a:rPr lang="en-US" b="0" i="1" smtClean="0">
-                        <a:latin typeface="Cambria Math" panose="02040503050406030204" pitchFamily="18" charset="0"/>
-                        <a:ea typeface="Cambria Math" panose="02040503050406030204" pitchFamily="18" charset="0"/>
-                      </a:rPr>
-                      <m:t>h</m:t>
-                    </m:r>
-                    <m:r>
-                      <a:rPr lang="en-US" b="0" i="1" smtClean="0">
-                        <a:latin typeface="Cambria Math" panose="02040503050406030204" pitchFamily="18" charset="0"/>
-                        <a:ea typeface="Cambria Math" panose="02040503050406030204" pitchFamily="18" charset="0"/>
-                      </a:rPr>
-                      <m:t>:</m:t>
-                    </m:r>
-                    <m:r>
-                      <a:rPr lang="en-US" b="0" i="1" smtClean="0">
-                        <a:latin typeface="Cambria Math" panose="02040503050406030204" pitchFamily="18" charset="0"/>
-                        <a:ea typeface="Cambria Math" panose="02040503050406030204" pitchFamily="18" charset="0"/>
-                      </a:rPr>
-                      <m:t>𝑆</m:t>
-                    </m:r>
-                    <m:r>
-                      <a:rPr lang="en-US" b="0" i="1" smtClean="0">
-                        <a:latin typeface="Cambria Math" panose="02040503050406030204" pitchFamily="18" charset="0"/>
-                        <a:ea typeface="Cambria Math" panose="02040503050406030204" pitchFamily="18" charset="0"/>
-                      </a:rPr>
-                      <m:t> →</m:t>
-                    </m:r>
-                    <m:d>
-                      <m:dPr>
-                        <m:begChr m:val="{"/>
-                        <m:endChr m:val="}"/>
-                        <m:ctrlPr>
-                          <a:rPr lang="en-US" b="0" i="1" smtClean="0">
-                            <a:latin typeface="Cambria Math" panose="02040503050406030204" pitchFamily="18" charset="0"/>
-                            <a:ea typeface="Cambria Math" panose="02040503050406030204" pitchFamily="18" charset="0"/>
-                          </a:rPr>
-                        </m:ctrlPr>
-                      </m:dPr>
-                      <m:e>
-                        <m:r>
-                          <a:rPr lang="en-US" b="0" i="1" smtClean="0">
-                            <a:latin typeface="Cambria Math" panose="02040503050406030204" pitchFamily="18" charset="0"/>
-                            <a:ea typeface="Cambria Math" panose="02040503050406030204" pitchFamily="18" charset="0"/>
-                          </a:rPr>
-                          <m:t>0, 1, …, </m:t>
-                        </m:r>
-                        <m:r>
-                          <a:rPr lang="en-US" b="0" i="1" smtClean="0">
-                            <a:latin typeface="Cambria Math" panose="02040503050406030204" pitchFamily="18" charset="0"/>
-                            <a:ea typeface="Cambria Math" panose="02040503050406030204" pitchFamily="18" charset="0"/>
-                          </a:rPr>
-                          <m:t>𝑚</m:t>
-                        </m:r>
-                        <m:r>
-                          <a:rPr lang="en-US" b="0" i="1" smtClean="0">
-                            <a:latin typeface="Cambria Math" panose="02040503050406030204" pitchFamily="18" charset="0"/>
-                            <a:ea typeface="Cambria Math" panose="02040503050406030204" pitchFamily="18" charset="0"/>
-                          </a:rPr>
-                          <m:t>−1</m:t>
-                        </m:r>
-                      </m:e>
-                    </m:d>
-                  </m:oMath>
-                </a14:m>
-                <a:r>
-                  <a:rPr lang="ru-RU" b="0" dirty="0" smtClean="0">
-                    <a:ea typeface="Cambria Math" panose="02040503050406030204" pitchFamily="18" charset="0"/>
-                  </a:rPr>
-                  <a:t> - хэш-функция</a:t>
-                </a:r>
-              </a:p>
-              <a:p>
-                <a:r>
-                  <a:rPr lang="en-US" dirty="0" smtClean="0">
-                    <a:ea typeface="Cambria Math" panose="02040503050406030204" pitchFamily="18" charset="0"/>
-                  </a:rPr>
-                  <a:t>m – </a:t>
-                </a:r>
-                <a:r>
-                  <a:rPr lang="ru-RU" dirty="0" smtClean="0">
-                    <a:ea typeface="Cambria Math" panose="02040503050406030204" pitchFamily="18" charset="0"/>
-                  </a:rPr>
-                  <a:t>количество возможных значений хэш-функции – </a:t>
-                </a:r>
-                <a:r>
-                  <a:rPr lang="ru-RU" dirty="0" err="1" smtClean="0">
-                    <a:ea typeface="Cambria Math" panose="02040503050406030204" pitchFamily="18" charset="0"/>
-                  </a:rPr>
-                  <a:t>хэш</a:t>
-                </a:r>
-                <a:r>
-                  <a:rPr lang="ru-RU" dirty="0" smtClean="0">
-                    <a:ea typeface="Cambria Math" panose="02040503050406030204" pitchFamily="18" charset="0"/>
-                  </a:rPr>
-                  <a:t>-мощность, мощность хэш-функции (</a:t>
-                </a:r>
-                <a:r>
-                  <a:rPr lang="en-US" dirty="0" smtClean="0">
-                    <a:ea typeface="Cambria Math" panose="02040503050406030204" pitchFamily="18" charset="0"/>
-                  </a:rPr>
-                  <a:t>cardinality of hash function</a:t>
-                </a:r>
-                <a:r>
-                  <a:rPr lang="ru-RU" dirty="0" smtClean="0">
-                    <a:ea typeface="Cambria Math" panose="02040503050406030204" pitchFamily="18" charset="0"/>
-                  </a:rPr>
-                  <a:t>)</a:t>
-                </a:r>
-                <a:endParaRPr lang="ru-RU" b="0" dirty="0" smtClean="0">
-                  <a:ea typeface="Cambria Math" panose="02040503050406030204" pitchFamily="18" charset="0"/>
-                </a:endParaRPr>
-              </a:p>
-            </p:txBody>
-          </p:sp>
-        </mc:Choice>
-        <mc:Fallback xmlns="">
-          <p:sp>
-            <p:nvSpPr>
-              <p:cNvPr id="11" name="Объект 2"/>
-              <p:cNvSpPr txBox="1">
-                <a:spLocks noRot="1" noChangeAspect="1" noMove="1" noResize="1" noEditPoints="1" noAdjustHandles="1" noChangeArrowheads="1" noChangeShapeType="1" noTextEdit="1"/>
-              </p:cNvSpPr>
-              <p:nvPr/>
-            </p:nvSpPr>
-            <p:spPr>
-              <a:xfrm>
-                <a:off x="5344357" y="809265"/>
-                <a:ext cx="6655965" cy="5765359"/>
-              </a:xfrm>
-              <a:prstGeom prst="rect">
-                <a:avLst/>
-              </a:prstGeom>
-              <a:blipFill rotWithShape="0">
-                <a:blip r:embed="rId4"/>
-                <a:stretch>
-                  <a:fillRect l="-275" t="-740" r="-1282"/>
-                </a:stretch>
-              </a:blipFill>
-            </p:spPr>
-            <p:txBody>
-              <a:bodyPr/>
-              <a:lstStyle/>
-              <a:p>
-                <a:r>
-                  <a:rPr lang="en-US">
-                    <a:noFill/>
-                  </a:rPr>
-                  <a:t> </a:t>
-                </a:r>
-              </a:p>
-            </p:txBody>
-          </p:sp>
-        </mc:Fallback>
-      </mc:AlternateContent>
     </p:spTree>
     <p:extLst>
       <p:ext uri="{BB962C8B-B14F-4D97-AF65-F5344CB8AC3E}">
@@ -24266,161 +23682,10 @@
       </p:grpSpPr>
       <p:sp>
         <p:nvSpPr>
-          <p:cNvPr id="3" name="Объект 2"/>
-          <p:cNvSpPr>
-            <a:spLocks noGrp="1"/>
-          </p:cNvSpPr>
-          <p:nvPr>
-            <p:ph idx="1"/>
-          </p:nvPr>
-        </p:nvSpPr>
-        <p:spPr>
-          <a:xfrm>
-            <a:off x="5264459" y="833115"/>
-            <a:ext cx="6770498" cy="5683218"/>
-          </a:xfrm>
-          <a:solidFill>
-            <a:schemeClr val="bg1"/>
-          </a:solidFill>
-        </p:spPr>
-        <p:txBody>
-          <a:bodyPr/>
-          <a:lstStyle/>
-          <a:p>
-            <a:r>
-              <a:rPr lang="en-US" dirty="0" err="1" smtClean="0"/>
-              <a:t>std</a:t>
-            </a:r>
-            <a:r>
-              <a:rPr lang="en-US" dirty="0" smtClean="0"/>
-              <a:t>::</a:t>
-            </a:r>
-            <a:r>
-              <a:rPr lang="en-US" dirty="0" err="1" smtClean="0"/>
-              <a:t>unordered_map</a:t>
-            </a:r>
-            <a:r>
-              <a:rPr lang="en-US" dirty="0" smtClean="0"/>
-              <a:t> – </a:t>
-            </a:r>
-            <a:r>
-              <a:rPr lang="ru-RU" dirty="0" smtClean="0"/>
-              <a:t>тоже хэш-таблица, но хранит пары ключ-значение</a:t>
-            </a:r>
-            <a:r>
-              <a:rPr lang="en-US" dirty="0" smtClean="0"/>
-              <a:t>. </a:t>
-            </a:r>
-            <a:r>
-              <a:rPr lang="ru-RU" dirty="0" smtClean="0"/>
-              <a:t>Хэш-функция применяется к ключу</a:t>
-            </a:r>
-          </a:p>
-          <a:p>
-            <a:r>
-              <a:rPr lang="ru-RU" dirty="0" smtClean="0"/>
-              <a:t>Хэш</a:t>
-            </a:r>
-            <a:r>
-              <a:rPr lang="ru-RU" dirty="0"/>
-              <a:t>-</a:t>
-            </a:r>
-            <a:r>
-              <a:rPr lang="ru-RU" dirty="0" smtClean="0"/>
-              <a:t>функция должна вычисляться за небольшое время и давать различные значения для различных аргументов</a:t>
-            </a:r>
-          </a:p>
-          <a:p>
-            <a:r>
-              <a:rPr lang="ru-RU" dirty="0" smtClean="0"/>
-              <a:t>Про коллизии</a:t>
-            </a:r>
-            <a:endParaRPr lang="en-US" dirty="0"/>
-          </a:p>
-        </p:txBody>
-      </p:sp>
-      <p:pic>
-        <p:nvPicPr>
-          <p:cNvPr id="5" name="Рисунок 4"/>
-          <p:cNvPicPr>
-            <a:picLocks noChangeAspect="1"/>
-          </p:cNvPicPr>
-          <p:nvPr/>
-        </p:nvPicPr>
-        <p:blipFill>
-          <a:blip r:embed="rId2"/>
-          <a:stretch>
-            <a:fillRect/>
-          </a:stretch>
-        </p:blipFill>
-        <p:spPr>
-          <a:xfrm>
-            <a:off x="345890" y="2738252"/>
-            <a:ext cx="4645034" cy="3778081"/>
-          </a:xfrm>
-          <a:prstGeom prst="rect">
-            <a:avLst/>
-          </a:prstGeom>
-        </p:spPr>
-      </p:pic>
-      <p:pic>
-        <p:nvPicPr>
-          <p:cNvPr id="6" name="Рисунок 5"/>
-          <p:cNvPicPr>
-            <a:picLocks noChangeAspect="1"/>
-          </p:cNvPicPr>
-          <p:nvPr/>
-        </p:nvPicPr>
-        <p:blipFill>
-          <a:blip r:embed="rId3"/>
-          <a:stretch>
-            <a:fillRect/>
-          </a:stretch>
-        </p:blipFill>
-        <p:spPr>
-          <a:xfrm>
-            <a:off x="345890" y="1138509"/>
-            <a:ext cx="4531164" cy="1409382"/>
-          </a:xfrm>
-          <a:prstGeom prst="rect">
-            <a:avLst/>
-          </a:prstGeom>
-        </p:spPr>
-      </p:pic>
-      <p:sp>
-        <p:nvSpPr>
-          <p:cNvPr id="7" name="Прямоугольник 6"/>
-          <p:cNvSpPr/>
-          <p:nvPr/>
-        </p:nvSpPr>
-        <p:spPr>
-          <a:xfrm>
-            <a:off x="235670" y="833114"/>
-            <a:ext cx="6096000" cy="276999"/>
-          </a:xfrm>
-          <a:prstGeom prst="rect">
-            <a:avLst/>
-          </a:prstGeom>
-        </p:spPr>
-        <p:txBody>
-          <a:bodyPr>
-            <a:spAutoFit/>
-          </a:bodyPr>
-          <a:lstStyle/>
-          <a:p>
-            <a:r>
-              <a:rPr lang="en-US" sz="1200" dirty="0"/>
-              <a:t>https://en.cppreference.com/w/cpp/container/unordered_map</a:t>
-            </a:r>
-          </a:p>
-        </p:txBody>
-      </p:sp>
-      <p:sp>
-        <p:nvSpPr>
-          <p:cNvPr id="8" name="Title 1">
+          <p:cNvPr id="4" name="Title 1">
             <a:extLst>
               <a:ext uri="{FF2B5EF4-FFF2-40B4-BE49-F238E27FC236}">
-                <a16:creationId xmlns:a16="http://schemas.microsoft.com/office/drawing/2014/main" xmlns="" id="{78F05172-2BB6-4969-9FAE-01AFF727CD79}"/>
+                <a16:creationId xmlns:a16="http://schemas.microsoft.com/office/drawing/2014/main" xmlns="" id="{C60BD838-89F7-4CB1-8B5E-1D5AD5FDEA16}"/>
               </a:ext>
             </a:extLst>
           </p:cNvPr>
@@ -24431,8 +23696,8 @@
         </p:nvSpPr>
         <p:spPr>
           <a:xfrm>
-            <a:off x="235670" y="128922"/>
-            <a:ext cx="11764652" cy="561900"/>
+            <a:off x="443058" y="128922"/>
+            <a:ext cx="11491275" cy="476150"/>
           </a:xfrm>
           <a:prstGeom prst="rect">
             <a:avLst/>
@@ -24525,39 +23790,2115 @@
           <a:p>
             <a:pPr algn="ctr"/>
             <a:r>
-              <a:rPr lang="ru-RU" sz="2800" dirty="0" smtClean="0"/>
-              <a:t>Неупорядоченные контейнеры</a:t>
-            </a:r>
-            <a:r>
-              <a:rPr lang="en-US" sz="2800" dirty="0" smtClean="0"/>
-              <a:t>. </a:t>
-            </a:r>
-            <a:r>
-              <a:rPr lang="en-US" sz="2800" dirty="0" err="1" smtClean="0"/>
-              <a:t>std</a:t>
-            </a:r>
-            <a:r>
-              <a:rPr lang="en-US" sz="2800" dirty="0" smtClean="0"/>
-              <a:t>::</a:t>
-            </a:r>
-            <a:r>
-              <a:rPr lang="en-US" sz="2800" dirty="0" err="1" smtClean="0"/>
-              <a:t>unordered_map</a:t>
+              <a:rPr lang="en-US" sz="2800" dirty="0"/>
+              <a:t>STL</a:t>
+            </a:r>
+            <a:r>
+              <a:rPr lang="ru-RU" sz="2800" dirty="0"/>
+              <a:t>: </a:t>
+            </a:r>
+            <a:r>
+              <a:rPr lang="en-US" sz="2800" dirty="0" err="1"/>
+              <a:t>InputIterator</a:t>
+            </a:r>
+            <a:r>
+              <a:rPr lang="en-US" sz="2800" dirty="0"/>
+              <a:t> </a:t>
+            </a:r>
+            <a:r>
+              <a:rPr lang="ru-RU" sz="2800" dirty="0"/>
+              <a:t>и </a:t>
+            </a:r>
+            <a:r>
+              <a:rPr lang="en-US" sz="2800" dirty="0" err="1"/>
+              <a:t>OutputIterator</a:t>
             </a:r>
             <a:endParaRPr lang="en-US" sz="2800" dirty="0"/>
           </a:p>
         </p:txBody>
       </p:sp>
+      <p:graphicFrame>
+        <p:nvGraphicFramePr>
+          <p:cNvPr id="12" name="Table 11">
+            <a:extLst>
+              <a:ext uri="{FF2B5EF4-FFF2-40B4-BE49-F238E27FC236}">
+                <a16:creationId xmlns:a16="http://schemas.microsoft.com/office/drawing/2014/main" xmlns="" id="{CCE7D441-96BC-4D6A-BE32-CEC98DB5865D}"/>
+              </a:ext>
+            </a:extLst>
+          </p:cNvPr>
+          <p:cNvGraphicFramePr>
+            <a:graphicFrameLocks noGrp="1"/>
+          </p:cNvGraphicFramePr>
+          <p:nvPr>
+            <p:extLst/>
+          </p:nvPr>
+        </p:nvGraphicFramePr>
+        <p:xfrm>
+          <a:off x="519415" y="688958"/>
+          <a:ext cx="11414917" cy="6040120"/>
+        </p:xfrm>
+        <a:graphic>
+          <a:graphicData uri="http://schemas.openxmlformats.org/drawingml/2006/table">
+            <a:tbl>
+              <a:tblPr firstRow="1" bandRow="1">
+                <a:tableStyleId>{5C22544A-7EE6-4342-B048-85BDC9FD1C3A}</a:tableStyleId>
+              </a:tblPr>
+              <a:tblGrid>
+                <a:gridCol w="2648261">
+                  <a:extLst>
+                    <a:ext uri="{9D8B030D-6E8A-4147-A177-3AD203B41FA5}">
+                      <a16:colId xmlns:a16="http://schemas.microsoft.com/office/drawing/2014/main" xmlns="" val="673896950"/>
+                    </a:ext>
+                  </a:extLst>
+                </a:gridCol>
+                <a:gridCol w="2191664">
+                  <a:extLst>
+                    <a:ext uri="{9D8B030D-6E8A-4147-A177-3AD203B41FA5}">
+                      <a16:colId xmlns:a16="http://schemas.microsoft.com/office/drawing/2014/main" xmlns="" val="3404116454"/>
+                    </a:ext>
+                  </a:extLst>
+                </a:gridCol>
+                <a:gridCol w="3287496">
+                  <a:extLst>
+                    <a:ext uri="{9D8B030D-6E8A-4147-A177-3AD203B41FA5}">
+                      <a16:colId xmlns:a16="http://schemas.microsoft.com/office/drawing/2014/main" xmlns="" val="2546970233"/>
+                    </a:ext>
+                  </a:extLst>
+                </a:gridCol>
+                <a:gridCol w="3287496">
+                  <a:extLst>
+                    <a:ext uri="{9D8B030D-6E8A-4147-A177-3AD203B41FA5}">
+                      <a16:colId xmlns:a16="http://schemas.microsoft.com/office/drawing/2014/main" xmlns="" val="1905818927"/>
+                    </a:ext>
+                  </a:extLst>
+                </a:gridCol>
+              </a:tblGrid>
+              <a:tr h="370840">
+                <a:tc>
+                  <a:txBody>
+                    <a:bodyPr/>
+                    <a:lstStyle/>
+                    <a:p>
+                      <a:endParaRPr lang="en-US" dirty="0"/>
+                    </a:p>
+                  </a:txBody>
+                  <a:tcPr/>
+                </a:tc>
+                <a:tc>
+                  <a:txBody>
+                    <a:bodyPr/>
+                    <a:lstStyle/>
+                    <a:p>
+                      <a:r>
+                        <a:rPr lang="ru-RU" dirty="0"/>
+                        <a:t>Оператор</a:t>
+                      </a:r>
+                      <a:endParaRPr lang="en-US" dirty="0"/>
+                    </a:p>
+                  </a:txBody>
+                  <a:tcPr/>
+                </a:tc>
+                <a:tc>
+                  <a:txBody>
+                    <a:bodyPr/>
+                    <a:lstStyle/>
+                    <a:p>
+                      <a:r>
+                        <a:rPr lang="en-US" dirty="0" err="1"/>
+                        <a:t>InputIterator</a:t>
+                      </a:r>
+                      <a:endParaRPr lang="en-US" dirty="0"/>
+                    </a:p>
+                  </a:txBody>
+                  <a:tcPr/>
+                </a:tc>
+                <a:tc>
+                  <a:txBody>
+                    <a:bodyPr/>
+                    <a:lstStyle/>
+                    <a:p>
+                      <a:r>
+                        <a:rPr lang="en-US" dirty="0" err="1"/>
+                        <a:t>OutputIterator</a:t>
+                      </a:r>
+                      <a:endParaRPr lang="en-US" dirty="0"/>
+                    </a:p>
+                  </a:txBody>
+                  <a:tcPr/>
+                </a:tc>
+                <a:extLst>
+                  <a:ext uri="{0D108BD9-81ED-4DB2-BD59-A6C34878D82A}">
+                    <a16:rowId xmlns:a16="http://schemas.microsoft.com/office/drawing/2014/main" xmlns="" val="3707840138"/>
+                  </a:ext>
+                </a:extLst>
+              </a:tr>
+              <a:tr h="370840">
+                <a:tc>
+                  <a:txBody>
+                    <a:bodyPr/>
+                    <a:lstStyle/>
+                    <a:p>
+                      <a:r>
+                        <a:rPr lang="ru-RU" dirty="0"/>
+                        <a:t>Савнение на равенство</a:t>
+                      </a:r>
+                    </a:p>
+                    <a:p>
+                      <a:r>
+                        <a:rPr lang="en-US" dirty="0"/>
+                        <a:t>A == B </a:t>
+                      </a:r>
+                      <a:endParaRPr lang="ru-RU" dirty="0"/>
+                    </a:p>
+                    <a:p>
+                      <a:r>
+                        <a:rPr lang="en-US" dirty="0"/>
+                        <a:t>A != B</a:t>
+                      </a:r>
+                    </a:p>
+                  </a:txBody>
+                  <a:tcPr/>
+                </a:tc>
+                <a:tc>
+                  <a:txBody>
+                    <a:bodyPr/>
+                    <a:lstStyle/>
+                    <a:p>
+                      <a:r>
+                        <a:rPr lang="en-US" dirty="0"/>
+                        <a:t>bool operator==(B)</a:t>
+                      </a:r>
+                    </a:p>
+                    <a:p>
+                      <a:r>
+                        <a:rPr lang="en-US" dirty="0"/>
+                        <a:t>bool operator!=(B)</a:t>
+                      </a:r>
+                    </a:p>
+                  </a:txBody>
+                  <a:tcPr/>
+                </a:tc>
+                <a:tc>
+                  <a:txBody>
+                    <a:bodyPr/>
+                    <a:lstStyle/>
+                    <a:p>
+                      <a:pPr algn="ctr"/>
+                      <a:r>
+                        <a:rPr lang="en-US" sz="3200" dirty="0">
+                          <a:solidFill>
+                            <a:schemeClr val="accent2">
+                              <a:lumMod val="50000"/>
+                            </a:schemeClr>
+                          </a:solidFill>
+                          <a:latin typeface="Wingdings 2" panose="05020102010507070707" pitchFamily="18" charset="2"/>
+                          <a:sym typeface="Wingdings 2" panose="05020102010507070707" pitchFamily="18" charset="2"/>
+                        </a:rPr>
+                        <a:t></a:t>
+                      </a:r>
+                      <a:endParaRPr lang="ru-RU" sz="3200" dirty="0">
+                        <a:solidFill>
+                          <a:schemeClr val="accent2">
+                            <a:lumMod val="50000"/>
+                          </a:schemeClr>
+                        </a:solidFill>
+                        <a:latin typeface="Wingdings 2" panose="05020102010507070707" pitchFamily="18" charset="2"/>
+                        <a:sym typeface="Wingdings 2" panose="05020102010507070707" pitchFamily="18" charset="2"/>
+                      </a:endParaRPr>
+                    </a:p>
+                    <a:p>
+                      <a:pPr algn="ctr"/>
+                      <a:r>
+                        <a:rPr lang="ru-RU" sz="1800" dirty="0">
+                          <a:solidFill>
+                            <a:schemeClr val="tx1"/>
+                          </a:solidFill>
+                          <a:latin typeface="+mn-lt"/>
+                        </a:rPr>
+                        <a:t>Может стоять по обе стороны знака</a:t>
+                      </a:r>
+                      <a:endParaRPr lang="en-US" sz="1800" dirty="0">
+                        <a:solidFill>
+                          <a:schemeClr val="tx1"/>
+                        </a:solidFill>
+                        <a:latin typeface="+mn-lt"/>
+                      </a:endParaRPr>
+                    </a:p>
+                  </a:txBody>
+                  <a:tcPr/>
+                </a:tc>
+                <a:tc>
+                  <a:txBody>
+                    <a:bodyPr/>
+                    <a:lstStyle/>
+                    <a:p>
+                      <a:pPr marL="0" marR="0" lvl="0" indent="0" algn="ctr" defTabSz="457200" rtl="0" eaLnBrk="1" fontAlgn="auto" latinLnBrk="0" hangingPunct="1">
+                        <a:lnSpc>
+                          <a:spcPct val="100000"/>
+                        </a:lnSpc>
+                        <a:spcBef>
+                          <a:spcPts val="0"/>
+                        </a:spcBef>
+                        <a:spcAft>
+                          <a:spcPts val="0"/>
+                        </a:spcAft>
+                        <a:buClrTx/>
+                        <a:buSzTx/>
+                        <a:buFontTx/>
+                        <a:buNone/>
+                        <a:tabLst/>
+                        <a:defRPr/>
+                      </a:pPr>
+                      <a:r>
+                        <a:rPr lang="en-US" sz="3200" dirty="0">
+                          <a:solidFill>
+                            <a:schemeClr val="accent5">
+                              <a:lumMod val="75000"/>
+                            </a:schemeClr>
+                          </a:solidFill>
+                          <a:sym typeface="Wingdings 2" panose="05020102010507070707" pitchFamily="18" charset="2"/>
+                        </a:rPr>
+                        <a:t></a:t>
+                      </a:r>
+                      <a:endParaRPr lang="ru-RU" sz="3200" dirty="0">
+                        <a:solidFill>
+                          <a:schemeClr val="accent5">
+                            <a:lumMod val="75000"/>
+                          </a:schemeClr>
+                        </a:solidFill>
+                        <a:sym typeface="Wingdings 2" panose="05020102010507070707" pitchFamily="18" charset="2"/>
+                      </a:endParaRPr>
+                    </a:p>
+                    <a:p>
+                      <a:pPr marL="0" marR="0" lvl="0" indent="0" algn="ctr" defTabSz="457200" rtl="0" eaLnBrk="1" fontAlgn="auto" latinLnBrk="0" hangingPunct="1">
+                        <a:lnSpc>
+                          <a:spcPct val="100000"/>
+                        </a:lnSpc>
+                        <a:spcBef>
+                          <a:spcPts val="0"/>
+                        </a:spcBef>
+                        <a:spcAft>
+                          <a:spcPts val="0"/>
+                        </a:spcAft>
+                        <a:buClrTx/>
+                        <a:buSzTx/>
+                        <a:buFontTx/>
+                        <a:buNone/>
+                        <a:tabLst/>
+                        <a:defRPr/>
+                      </a:pPr>
+                      <a:r>
+                        <a:rPr lang="ru-RU" sz="1800" dirty="0">
+                          <a:latin typeface="+mn-lt"/>
+                        </a:rPr>
+                        <a:t>Может стоять только справа от знака</a:t>
+                      </a:r>
+                      <a:endParaRPr lang="en-US" sz="1800" dirty="0">
+                        <a:latin typeface="+mn-lt"/>
+                      </a:endParaRPr>
+                    </a:p>
+                  </a:txBody>
+                  <a:tcPr/>
+                </a:tc>
+                <a:extLst>
+                  <a:ext uri="{0D108BD9-81ED-4DB2-BD59-A6C34878D82A}">
+                    <a16:rowId xmlns:a16="http://schemas.microsoft.com/office/drawing/2014/main" xmlns="" val="541336909"/>
+                  </a:ext>
+                </a:extLst>
+              </a:tr>
+              <a:tr h="370840">
+                <a:tc>
+                  <a:txBody>
+                    <a:bodyPr/>
+                    <a:lstStyle/>
+                    <a:p>
+                      <a:r>
+                        <a:rPr lang="ru-RU" dirty="0"/>
+                        <a:t>Инкремент</a:t>
+                      </a:r>
+                    </a:p>
+                    <a:p>
+                      <a:r>
+                        <a:rPr lang="ru-RU" dirty="0"/>
+                        <a:t>++</a:t>
+                      </a:r>
+                      <a:r>
+                        <a:rPr lang="en-US" dirty="0"/>
+                        <a:t>A</a:t>
+                      </a:r>
+                    </a:p>
+                    <a:p>
+                      <a:r>
+                        <a:rPr lang="en-US" dirty="0"/>
+                        <a:t>A++</a:t>
+                      </a:r>
+                    </a:p>
+                  </a:txBody>
+                  <a:tcPr/>
+                </a:tc>
+                <a:tc>
+                  <a:txBody>
+                    <a:bodyPr/>
+                    <a:lstStyle/>
+                    <a:p>
+                      <a:r>
+                        <a:rPr lang="en-US" dirty="0"/>
+                        <a:t>A</a:t>
+                      </a:r>
+                      <a:r>
+                        <a:rPr lang="en-US" dirty="0">
+                          <a:latin typeface="Times New Roman" panose="02020603050405020304" pitchFamily="18" charset="0"/>
+                          <a:cs typeface="Times New Roman" panose="02020603050405020304" pitchFamily="18" charset="0"/>
+                        </a:rPr>
+                        <a:t>&amp;</a:t>
+                      </a:r>
+                      <a:r>
+                        <a:rPr lang="en-US" dirty="0"/>
+                        <a:t> operator++()</a:t>
+                      </a:r>
+                    </a:p>
+                    <a:p>
+                      <a:r>
+                        <a:rPr lang="en-US" dirty="0"/>
+                        <a:t>A operator++(int n)</a:t>
+                      </a:r>
+                    </a:p>
+                  </a:txBody>
+                  <a:tcPr/>
+                </a:tc>
+                <a:tc>
+                  <a:txBody>
+                    <a:bodyPr/>
+                    <a:lstStyle/>
+                    <a:p>
+                      <a:pPr algn="ctr"/>
+                      <a:r>
+                        <a:rPr lang="en-US" sz="3200" dirty="0">
+                          <a:solidFill>
+                            <a:schemeClr val="accent2">
+                              <a:lumMod val="50000"/>
+                            </a:schemeClr>
+                          </a:solidFill>
+                          <a:latin typeface="Wingdings 2" panose="05020102010507070707" pitchFamily="18" charset="2"/>
+                          <a:sym typeface="Wingdings 2" panose="05020102010507070707" pitchFamily="18" charset="2"/>
+                        </a:rPr>
+                        <a:t></a:t>
+                      </a:r>
+                      <a:endParaRPr lang="en-US" sz="3200" dirty="0">
+                        <a:solidFill>
+                          <a:schemeClr val="accent2">
+                            <a:lumMod val="50000"/>
+                          </a:schemeClr>
+                        </a:solidFill>
+                      </a:endParaRPr>
+                    </a:p>
+                  </a:txBody>
+                  <a:tcPr/>
+                </a:tc>
+                <a:tc>
+                  <a:txBody>
+                    <a:bodyPr/>
+                    <a:lstStyle/>
+                    <a:p>
+                      <a:pPr algn="ctr"/>
+                      <a:r>
+                        <a:rPr lang="en-US" sz="3200" dirty="0">
+                          <a:solidFill>
+                            <a:schemeClr val="accent2">
+                              <a:lumMod val="50000"/>
+                            </a:schemeClr>
+                          </a:solidFill>
+                          <a:latin typeface="Wingdings 2" panose="05020102010507070707" pitchFamily="18" charset="2"/>
+                          <a:sym typeface="Wingdings 2" panose="05020102010507070707" pitchFamily="18" charset="2"/>
+                        </a:rPr>
+                        <a:t></a:t>
+                      </a:r>
+                      <a:endParaRPr lang="en-US" sz="3200" dirty="0">
+                        <a:solidFill>
+                          <a:schemeClr val="accent2">
+                            <a:lumMod val="50000"/>
+                          </a:schemeClr>
+                        </a:solidFill>
+                        <a:latin typeface="Wingdings 2" panose="05020102010507070707" pitchFamily="18" charset="2"/>
+                      </a:endParaRPr>
+                    </a:p>
+                  </a:txBody>
+                  <a:tcPr/>
+                </a:tc>
+                <a:extLst>
+                  <a:ext uri="{0D108BD9-81ED-4DB2-BD59-A6C34878D82A}">
+                    <a16:rowId xmlns:a16="http://schemas.microsoft.com/office/drawing/2014/main" xmlns="" val="2595382089"/>
+                  </a:ext>
+                </a:extLst>
+              </a:tr>
+              <a:tr h="370840">
+                <a:tc>
+                  <a:txBody>
+                    <a:bodyPr/>
+                    <a:lstStyle/>
+                    <a:p>
+                      <a:r>
+                        <a:rPr lang="en-US" dirty="0"/>
+                        <a:t>Dereference as </a:t>
+                      </a:r>
+                      <a:r>
+                        <a:rPr lang="en-US" dirty="0" err="1"/>
+                        <a:t>rvalue</a:t>
+                      </a:r>
+                      <a:endParaRPr lang="ru-RU" dirty="0"/>
+                    </a:p>
+                    <a:p>
+                      <a:r>
+                        <a:rPr lang="en-US" dirty="0"/>
+                        <a:t>n = </a:t>
+                      </a:r>
+                      <a:r>
+                        <a:rPr lang="ru-RU" dirty="0"/>
+                        <a:t>*</a:t>
+                      </a:r>
+                      <a:r>
+                        <a:rPr lang="en-US" dirty="0"/>
+                        <a:t>A</a:t>
+                      </a:r>
+                    </a:p>
+                    <a:p>
+                      <a:r>
+                        <a:rPr lang="en-US" dirty="0"/>
+                        <a:t>n = A</a:t>
+                      </a:r>
+                      <a:r>
+                        <a:rPr lang="ru-RU" dirty="0"/>
+                        <a:t>-</a:t>
+                      </a:r>
+                      <a:r>
+                        <a:rPr lang="en-US" dirty="0"/>
+                        <a:t>&gt;m</a:t>
+                      </a:r>
+                    </a:p>
+                  </a:txBody>
+                  <a:tcPr/>
+                </a:tc>
+                <a:tc>
+                  <a:txBody>
+                    <a:bodyPr/>
+                    <a:lstStyle/>
+                    <a:p>
+                      <a:r>
+                        <a:rPr lang="en-US" dirty="0"/>
+                        <a:t>T operator*()</a:t>
+                      </a:r>
+                    </a:p>
+                    <a:p>
+                      <a:r>
+                        <a:rPr lang="en-US" dirty="0"/>
+                        <a:t>T operator-&gt;()</a:t>
+                      </a:r>
+                    </a:p>
+                  </a:txBody>
+                  <a:tcPr/>
+                </a:tc>
+                <a:tc>
+                  <a:txBody>
+                    <a:bodyPr/>
+                    <a:lstStyle/>
+                    <a:p>
+                      <a:pPr algn="ctr"/>
+                      <a:r>
+                        <a:rPr lang="en-US" sz="3200" dirty="0">
+                          <a:solidFill>
+                            <a:schemeClr val="accent2">
+                              <a:lumMod val="50000"/>
+                            </a:schemeClr>
+                          </a:solidFill>
+                          <a:latin typeface="Wingdings 2" panose="05020102010507070707" pitchFamily="18" charset="2"/>
+                          <a:sym typeface="Wingdings 2" panose="05020102010507070707" pitchFamily="18" charset="2"/>
+                        </a:rPr>
+                        <a:t></a:t>
+                      </a:r>
+                      <a:endParaRPr lang="ru-RU" sz="3200" dirty="0">
+                        <a:solidFill>
+                          <a:schemeClr val="accent2">
+                            <a:lumMod val="50000"/>
+                          </a:schemeClr>
+                        </a:solidFill>
+                        <a:latin typeface="Wingdings 2" panose="05020102010507070707" pitchFamily="18" charset="2"/>
+                        <a:sym typeface="Wingdings 2" panose="05020102010507070707" pitchFamily="18" charset="2"/>
+                      </a:endParaRPr>
+                    </a:p>
+                    <a:p>
+                      <a:pPr algn="ctr"/>
+                      <a:r>
+                        <a:rPr lang="ru-RU" sz="1600" dirty="0">
+                          <a:solidFill>
+                            <a:schemeClr val="tx1"/>
+                          </a:solidFill>
+                          <a:latin typeface="+mn-lt"/>
+                        </a:rPr>
+                        <a:t>Изменения значения, на которое указывает итератор, не сохраняются</a:t>
+                      </a:r>
+                      <a:endParaRPr lang="en-US" sz="2400" dirty="0">
+                        <a:solidFill>
+                          <a:schemeClr val="accent2">
+                            <a:lumMod val="50000"/>
+                          </a:schemeClr>
+                        </a:solidFill>
+                        <a:latin typeface="+mn-lt"/>
+                      </a:endParaRPr>
+                    </a:p>
+                  </a:txBody>
+                  <a:tcPr/>
+                </a:tc>
+                <a:tc>
+                  <a:txBody>
+                    <a:bodyPr/>
+                    <a:lstStyle/>
+                    <a:p>
+                      <a:pPr marL="0" marR="0" lvl="0" indent="0" algn="ctr" defTabSz="457200" rtl="0" eaLnBrk="1" fontAlgn="auto" latinLnBrk="0" hangingPunct="1">
+                        <a:lnSpc>
+                          <a:spcPct val="100000"/>
+                        </a:lnSpc>
+                        <a:spcBef>
+                          <a:spcPts val="0"/>
+                        </a:spcBef>
+                        <a:spcAft>
+                          <a:spcPts val="0"/>
+                        </a:spcAft>
+                        <a:buClrTx/>
+                        <a:buSzTx/>
+                        <a:buFontTx/>
+                        <a:buNone/>
+                        <a:tabLst/>
+                        <a:defRPr/>
+                      </a:pPr>
+                      <a:r>
+                        <a:rPr lang="en-US" sz="3200" dirty="0">
+                          <a:solidFill>
+                            <a:schemeClr val="accent5">
+                              <a:lumMod val="75000"/>
+                            </a:schemeClr>
+                          </a:solidFill>
+                          <a:sym typeface="Wingdings 2" panose="05020102010507070707" pitchFamily="18" charset="2"/>
+                        </a:rPr>
+                        <a:t></a:t>
+                      </a:r>
+                      <a:endParaRPr lang="en-US" sz="3200" dirty="0">
+                        <a:solidFill>
+                          <a:schemeClr val="accent5">
+                            <a:lumMod val="75000"/>
+                          </a:schemeClr>
+                        </a:solidFill>
+                      </a:endParaRPr>
+                    </a:p>
+                    <a:p>
+                      <a:pPr algn="ctr"/>
+                      <a:endParaRPr lang="en-US" sz="3200" dirty="0">
+                        <a:solidFill>
+                          <a:schemeClr val="accent2">
+                            <a:lumMod val="50000"/>
+                          </a:schemeClr>
+                        </a:solidFill>
+                      </a:endParaRPr>
+                    </a:p>
+                  </a:txBody>
+                  <a:tcPr/>
+                </a:tc>
+                <a:extLst>
+                  <a:ext uri="{0D108BD9-81ED-4DB2-BD59-A6C34878D82A}">
+                    <a16:rowId xmlns:a16="http://schemas.microsoft.com/office/drawing/2014/main" xmlns="" val="1389121230"/>
+                  </a:ext>
+                </a:extLst>
+              </a:tr>
+              <a:tr h="370840">
+                <a:tc>
+                  <a:txBody>
+                    <a:bodyPr/>
+                    <a:lstStyle/>
+                    <a:p>
+                      <a:r>
+                        <a:rPr lang="en-US" dirty="0"/>
+                        <a:t>Dereference as </a:t>
+                      </a:r>
+                      <a:r>
+                        <a:rPr lang="en-US" dirty="0" err="1"/>
+                        <a:t>lvalue</a:t>
+                      </a:r>
+                      <a:endParaRPr lang="en-US" dirty="0"/>
+                    </a:p>
+                    <a:p>
+                      <a:r>
+                        <a:rPr lang="ru-RU" dirty="0"/>
+                        <a:t>*</a:t>
+                      </a:r>
+                      <a:r>
+                        <a:rPr lang="en-US" dirty="0"/>
+                        <a:t>A = n,</a:t>
+                      </a:r>
+                    </a:p>
+                    <a:p>
+                      <a:r>
+                        <a:rPr lang="en-US" dirty="0"/>
+                        <a:t>A-&gt;m = n</a:t>
+                      </a:r>
+                    </a:p>
+                  </a:txBody>
+                  <a:tcPr/>
+                </a:tc>
+                <a:tc>
+                  <a:txBody>
+                    <a:bodyPr/>
+                    <a:lstStyle/>
+                    <a:p>
+                      <a:r>
+                        <a:rPr lang="en-US" dirty="0"/>
+                        <a:t>T</a:t>
+                      </a:r>
+                      <a:r>
+                        <a:rPr lang="en-US" dirty="0">
+                          <a:latin typeface="Times New Roman" panose="02020603050405020304" pitchFamily="18" charset="0"/>
+                          <a:cs typeface="Times New Roman" panose="02020603050405020304" pitchFamily="18" charset="0"/>
+                        </a:rPr>
+                        <a:t>&amp; operator*()</a:t>
+                      </a:r>
+                    </a:p>
+                    <a:p>
+                      <a:r>
+                        <a:rPr lang="en-US" dirty="0">
+                          <a:latin typeface="Times New Roman" panose="02020603050405020304" pitchFamily="18" charset="0"/>
+                          <a:cs typeface="Times New Roman" panose="02020603050405020304" pitchFamily="18" charset="0"/>
+                        </a:rPr>
+                        <a:t>T&amp; operator-&gt;()</a:t>
+                      </a:r>
+                    </a:p>
+                  </a:txBody>
+                  <a:tcPr/>
+                </a:tc>
+                <a:tc>
+                  <a:txBody>
+                    <a:bodyPr/>
+                    <a:lstStyle/>
+                    <a:p>
+                      <a:pPr algn="ctr"/>
+                      <a:r>
+                        <a:rPr lang="en-US" sz="3200" dirty="0">
+                          <a:solidFill>
+                            <a:schemeClr val="accent5">
+                              <a:lumMod val="75000"/>
+                            </a:schemeClr>
+                          </a:solidFill>
+                          <a:sym typeface="Wingdings 2" panose="05020102010507070707" pitchFamily="18" charset="2"/>
+                        </a:rPr>
+                        <a:t></a:t>
+                      </a:r>
+                      <a:endParaRPr lang="en-US" sz="3200" dirty="0">
+                        <a:solidFill>
+                          <a:schemeClr val="accent5">
+                            <a:lumMod val="75000"/>
+                          </a:schemeClr>
+                        </a:solidFill>
+                      </a:endParaRPr>
+                    </a:p>
+                  </a:txBody>
+                  <a:tcPr/>
+                </a:tc>
+                <a:tc>
+                  <a:txBody>
+                    <a:bodyPr/>
+                    <a:lstStyle/>
+                    <a:p>
+                      <a:pPr algn="ctr"/>
+                      <a:r>
+                        <a:rPr lang="en-US" sz="3200" dirty="0">
+                          <a:solidFill>
+                            <a:schemeClr val="accent2">
+                              <a:lumMod val="50000"/>
+                            </a:schemeClr>
+                          </a:solidFill>
+                          <a:latin typeface="Wingdings 2" panose="05020102010507070707" pitchFamily="18" charset="2"/>
+                          <a:sym typeface="Wingdings 2" panose="05020102010507070707" pitchFamily="18" charset="2"/>
+                        </a:rPr>
+                        <a:t></a:t>
+                      </a:r>
+                      <a:endParaRPr lang="ru-RU" sz="3200" dirty="0">
+                        <a:solidFill>
+                          <a:schemeClr val="accent2">
+                            <a:lumMod val="50000"/>
+                          </a:schemeClr>
+                        </a:solidFill>
+                        <a:latin typeface="Wingdings 2" panose="05020102010507070707" pitchFamily="18" charset="2"/>
+                        <a:sym typeface="Wingdings 2" panose="05020102010507070707" pitchFamily="18" charset="2"/>
+                      </a:endParaRPr>
+                    </a:p>
+                    <a:p>
+                      <a:pPr algn="ctr"/>
+                      <a:r>
+                        <a:rPr lang="ru-RU" sz="1800" dirty="0">
+                          <a:solidFill>
+                            <a:schemeClr val="accent2">
+                              <a:lumMod val="50000"/>
+                            </a:schemeClr>
+                          </a:solidFill>
+                          <a:latin typeface="+mn-lt"/>
+                          <a:sym typeface="Wingdings 2" panose="05020102010507070707" pitchFamily="18" charset="2"/>
+                        </a:rPr>
+                        <a:t>Можно изменять значение, на которое указывает итератор</a:t>
+                      </a:r>
+                      <a:endParaRPr lang="en-US" sz="1800" dirty="0">
+                        <a:solidFill>
+                          <a:schemeClr val="accent2">
+                            <a:lumMod val="50000"/>
+                          </a:schemeClr>
+                        </a:solidFill>
+                        <a:latin typeface="+mn-lt"/>
+                      </a:endParaRPr>
+                    </a:p>
+                  </a:txBody>
+                  <a:tcPr/>
+                </a:tc>
+                <a:extLst>
+                  <a:ext uri="{0D108BD9-81ED-4DB2-BD59-A6C34878D82A}">
+                    <a16:rowId xmlns:a16="http://schemas.microsoft.com/office/drawing/2014/main" xmlns="" val="4012556742"/>
+                  </a:ext>
+                </a:extLst>
+              </a:tr>
+              <a:tr h="370840">
+                <a:tc>
+                  <a:txBody>
+                    <a:bodyPr/>
+                    <a:lstStyle/>
+                    <a:p>
+                      <a:r>
+                        <a:rPr lang="ru-RU" dirty="0"/>
+                        <a:t>Декремент</a:t>
+                      </a:r>
+                      <a:endParaRPr lang="en-US" dirty="0"/>
+                    </a:p>
+                    <a:p>
+                      <a:r>
+                        <a:rPr lang="ru-RU" dirty="0"/>
+                        <a:t>--</a:t>
+                      </a:r>
+                      <a:r>
+                        <a:rPr lang="en-US" dirty="0"/>
+                        <a:t>A</a:t>
+                      </a:r>
+                    </a:p>
+                    <a:p>
+                      <a:r>
+                        <a:rPr lang="en-US" dirty="0"/>
+                        <a:t>A</a:t>
+                      </a:r>
+                      <a:r>
+                        <a:rPr lang="ru-RU" dirty="0"/>
+                        <a:t>--</a:t>
+                      </a:r>
+                      <a:endParaRPr lang="en-US" dirty="0"/>
+                    </a:p>
+                  </a:txBody>
+                  <a:tcPr/>
+                </a:tc>
+                <a:tc>
+                  <a:txBody>
+                    <a:bodyPr/>
+                    <a:lstStyle/>
+                    <a:p>
+                      <a:r>
+                        <a:rPr lang="en-US" dirty="0"/>
+                        <a:t>A</a:t>
+                      </a:r>
+                      <a:r>
+                        <a:rPr lang="en-US" dirty="0">
+                          <a:latin typeface="Times New Roman" panose="02020603050405020304" pitchFamily="18" charset="0"/>
+                          <a:cs typeface="Times New Roman" panose="02020603050405020304" pitchFamily="18" charset="0"/>
+                        </a:rPr>
+                        <a:t>&amp;</a:t>
+                      </a:r>
+                      <a:r>
+                        <a:rPr lang="en-US" dirty="0"/>
+                        <a:t> operator--()</a:t>
+                      </a:r>
+                    </a:p>
+                    <a:p>
+                      <a:r>
+                        <a:rPr lang="en-US" dirty="0"/>
+                        <a:t>A operator--(int n)</a:t>
+                      </a:r>
+                    </a:p>
+                    <a:p>
+                      <a:endParaRPr lang="en-US" dirty="0"/>
+                    </a:p>
+                  </a:txBody>
+                  <a:tcPr/>
+                </a:tc>
+                <a:tc>
+                  <a:txBody>
+                    <a:bodyPr/>
+                    <a:lstStyle/>
+                    <a:p>
+                      <a:pPr algn="ctr"/>
+                      <a:r>
+                        <a:rPr lang="en-US" sz="3200" dirty="0">
+                          <a:solidFill>
+                            <a:schemeClr val="accent5">
+                              <a:lumMod val="75000"/>
+                            </a:schemeClr>
+                          </a:solidFill>
+                          <a:sym typeface="Wingdings 2" panose="05020102010507070707" pitchFamily="18" charset="2"/>
+                        </a:rPr>
+                        <a:t></a:t>
+                      </a:r>
+                      <a:endParaRPr lang="en-US" sz="3200" dirty="0">
+                        <a:solidFill>
+                          <a:schemeClr val="accent5">
+                            <a:lumMod val="75000"/>
+                          </a:schemeClr>
+                        </a:solidFill>
+                      </a:endParaRPr>
+                    </a:p>
+                  </a:txBody>
+                  <a:tcPr/>
+                </a:tc>
+                <a:tc>
+                  <a:txBody>
+                    <a:bodyPr/>
+                    <a:lstStyle/>
+                    <a:p>
+                      <a:pPr marL="0" marR="0" lvl="0" indent="0" algn="ctr" defTabSz="457200" rtl="0" eaLnBrk="1" fontAlgn="auto" latinLnBrk="0" hangingPunct="1">
+                        <a:lnSpc>
+                          <a:spcPct val="100000"/>
+                        </a:lnSpc>
+                        <a:spcBef>
+                          <a:spcPts val="0"/>
+                        </a:spcBef>
+                        <a:spcAft>
+                          <a:spcPts val="0"/>
+                        </a:spcAft>
+                        <a:buClrTx/>
+                        <a:buSzTx/>
+                        <a:buFontTx/>
+                        <a:buNone/>
+                        <a:tabLst/>
+                        <a:defRPr/>
+                      </a:pPr>
+                      <a:r>
+                        <a:rPr lang="en-US" sz="3200" dirty="0">
+                          <a:solidFill>
+                            <a:schemeClr val="accent5">
+                              <a:lumMod val="75000"/>
+                            </a:schemeClr>
+                          </a:solidFill>
+                          <a:sym typeface="Wingdings 2" panose="05020102010507070707" pitchFamily="18" charset="2"/>
+                        </a:rPr>
+                        <a:t></a:t>
+                      </a:r>
+                      <a:endParaRPr lang="en-US" sz="3200" dirty="0">
+                        <a:solidFill>
+                          <a:schemeClr val="accent5">
+                            <a:lumMod val="75000"/>
+                          </a:schemeClr>
+                        </a:solidFill>
+                      </a:endParaRPr>
+                    </a:p>
+                    <a:p>
+                      <a:pPr algn="ctr"/>
+                      <a:endParaRPr lang="en-US" dirty="0"/>
+                    </a:p>
+                  </a:txBody>
+                  <a:tcPr/>
+                </a:tc>
+                <a:extLst>
+                  <a:ext uri="{0D108BD9-81ED-4DB2-BD59-A6C34878D82A}">
+                    <a16:rowId xmlns:a16="http://schemas.microsoft.com/office/drawing/2014/main" xmlns="" val="2771488528"/>
+                  </a:ext>
+                </a:extLst>
+              </a:tr>
+            </a:tbl>
+          </a:graphicData>
+        </a:graphic>
+      </p:graphicFrame>
     </p:spTree>
     <p:extLst>
       <p:ext uri="{BB962C8B-B14F-4D97-AF65-F5344CB8AC3E}">
-        <p14:creationId xmlns:p14="http://schemas.microsoft.com/office/powerpoint/2010/main" val="3638549102"/>
+        <p14:creationId xmlns:p14="http://schemas.microsoft.com/office/powerpoint/2010/main" val="1941159857"/>
       </p:ext>
     </p:extLst>
   </p:cSld>
   <p:clrMapOvr>
     <a:masterClrMapping/>
   </p:clrMapOvr>
+  <p:timing>
+    <p:tnLst>
+      <p:par>
+        <p:cTn id="1" dur="indefinite" restart="never" nodeType="tmRoot"/>
+      </p:par>
+    </p:tnLst>
+  </p:timing>
+</p:sld>
+</file>
+
+<file path=ppt/slides/slide28.xml><?xml version="1.0" encoding="utf-8"?>
+<p:sld xmlns:a="http://schemas.openxmlformats.org/drawingml/2006/main" xmlns:r="http://schemas.openxmlformats.org/officeDocument/2006/relationships" xmlns:p="http://schemas.openxmlformats.org/presentationml/2006/main">
+  <p:cSld>
+    <p:spTree>
+      <p:nvGrpSpPr>
+        <p:cNvPr id="1" name=""/>
+        <p:cNvGrpSpPr/>
+        <p:nvPr/>
+      </p:nvGrpSpPr>
+      <p:grpSpPr>
+        <a:xfrm>
+          <a:off x="0" y="0"/>
+          <a:ext cx="0" cy="0"/>
+          <a:chOff x="0" y="0"/>
+          <a:chExt cx="0" cy="0"/>
+        </a:xfrm>
+      </p:grpSpPr>
+      <p:sp>
+        <p:nvSpPr>
+          <p:cNvPr id="3" name="Content Placeholder 2">
+            <a:extLst>
+              <a:ext uri="{FF2B5EF4-FFF2-40B4-BE49-F238E27FC236}">
+                <a16:creationId xmlns:a16="http://schemas.microsoft.com/office/drawing/2014/main" xmlns="" id="{26CEDBBB-DE92-40B8-B2B5-F45A320C25F4}"/>
+              </a:ext>
+            </a:extLst>
+          </p:cNvPr>
+          <p:cNvSpPr>
+            <a:spLocks noGrp="1"/>
+          </p:cNvSpPr>
+          <p:nvPr>
+            <p:ph idx="1"/>
+          </p:nvPr>
+        </p:nvSpPr>
+        <p:spPr>
+          <a:xfrm>
+            <a:off x="6825677" y="1656039"/>
+            <a:ext cx="5108656" cy="1075267"/>
+          </a:xfrm>
+          <a:solidFill>
+            <a:schemeClr val="bg1"/>
+          </a:solidFill>
+        </p:spPr>
+        <p:txBody>
+          <a:bodyPr>
+            <a:normAutofit/>
+          </a:bodyPr>
+          <a:lstStyle/>
+          <a:p>
+            <a:r>
+              <a:rPr lang="ru-RU" sz="2000" dirty="0"/>
+              <a:t>Когда не нужно изменять элементы контейнера, можно ограничится </a:t>
+            </a:r>
+            <a:r>
+              <a:rPr lang="en-US" sz="2000" dirty="0" err="1"/>
+              <a:t>InputIterator</a:t>
+            </a:r>
+            <a:endParaRPr lang="en-US" sz="2000" dirty="0"/>
+          </a:p>
+        </p:txBody>
+      </p:sp>
+      <p:sp>
+        <p:nvSpPr>
+          <p:cNvPr id="4" name="Title 1">
+            <a:extLst>
+              <a:ext uri="{FF2B5EF4-FFF2-40B4-BE49-F238E27FC236}">
+                <a16:creationId xmlns:a16="http://schemas.microsoft.com/office/drawing/2014/main" xmlns="" id="{65E8CEB3-E3E6-4768-8409-72F9C78EF2D5}"/>
+              </a:ext>
+            </a:extLst>
+          </p:cNvPr>
+          <p:cNvSpPr txBox="1">
+            <a:spLocks/>
+          </p:cNvSpPr>
+          <p:nvPr/>
+        </p:nvSpPr>
+        <p:spPr>
+          <a:xfrm>
+            <a:off x="443058" y="128922"/>
+            <a:ext cx="11491275" cy="476150"/>
+          </a:xfrm>
+          <a:prstGeom prst="rect">
+            <a:avLst/>
+          </a:prstGeom>
+          <a:solidFill>
+            <a:schemeClr val="bg1"/>
+          </a:solidFill>
+          <a:ln>
+            <a:solidFill>
+              <a:schemeClr val="tx1"/>
+            </a:solidFill>
+          </a:ln>
+        </p:spPr>
+        <p:txBody>
+          <a:bodyPr vert="horz" lIns="91440" tIns="45720" rIns="91440" bIns="45720" rtlCol="0" anchor="t">
+            <a:noAutofit/>
+          </a:bodyPr>
+          <a:lstStyle>
+            <a:lvl1pPr algn="l" defTabSz="457200" rtl="0" eaLnBrk="1" latinLnBrk="0" hangingPunct="1">
+              <a:spcBef>
+                <a:spcPct val="0"/>
+              </a:spcBef>
+              <a:buNone/>
+              <a:defRPr sz="3600" kern="1200">
+                <a:solidFill>
+                  <a:schemeClr val="accent1"/>
+                </a:solidFill>
+                <a:latin typeface="+mj-lt"/>
+                <a:ea typeface="+mj-ea"/>
+                <a:cs typeface="+mj-cs"/>
+              </a:defRPr>
+            </a:lvl1pPr>
+            <a:lvl2pPr eaLnBrk="1" hangingPunct="1">
+              <a:defRPr>
+                <a:solidFill>
+                  <a:schemeClr val="tx2"/>
+                </a:solidFill>
+              </a:defRPr>
+            </a:lvl2pPr>
+            <a:lvl3pPr eaLnBrk="1" hangingPunct="1">
+              <a:defRPr>
+                <a:solidFill>
+                  <a:schemeClr val="tx2"/>
+                </a:solidFill>
+              </a:defRPr>
+            </a:lvl3pPr>
+            <a:lvl4pPr eaLnBrk="1" hangingPunct="1">
+              <a:defRPr>
+                <a:solidFill>
+                  <a:schemeClr val="tx2"/>
+                </a:solidFill>
+              </a:defRPr>
+            </a:lvl4pPr>
+            <a:lvl5pPr eaLnBrk="1" hangingPunct="1">
+              <a:defRPr>
+                <a:solidFill>
+                  <a:schemeClr val="tx2"/>
+                </a:solidFill>
+              </a:defRPr>
+            </a:lvl5pPr>
+            <a:lvl6pPr eaLnBrk="1" hangingPunct="1">
+              <a:defRPr>
+                <a:solidFill>
+                  <a:schemeClr val="tx2"/>
+                </a:solidFill>
+              </a:defRPr>
+            </a:lvl6pPr>
+            <a:lvl7pPr eaLnBrk="1" hangingPunct="1">
+              <a:defRPr>
+                <a:solidFill>
+                  <a:schemeClr val="tx2"/>
+                </a:solidFill>
+              </a:defRPr>
+            </a:lvl7pPr>
+            <a:lvl8pPr eaLnBrk="1" hangingPunct="1">
+              <a:defRPr>
+                <a:solidFill>
+                  <a:schemeClr val="tx2"/>
+                </a:solidFill>
+              </a:defRPr>
+            </a:lvl8pPr>
+            <a:lvl9pPr eaLnBrk="1" hangingPunct="1">
+              <a:defRPr>
+                <a:solidFill>
+                  <a:schemeClr val="tx2"/>
+                </a:solidFill>
+              </a:defRPr>
+            </a:lvl9pPr>
+          </a:lstStyle>
+          <a:p>
+            <a:pPr algn="ctr"/>
+            <a:r>
+              <a:rPr lang="en-US" sz="2800" dirty="0"/>
+              <a:t>STL</a:t>
+            </a:r>
+            <a:r>
+              <a:rPr lang="ru-RU" sz="2800" dirty="0"/>
+              <a:t>: </a:t>
+            </a:r>
+            <a:r>
+              <a:rPr lang="en-US" sz="2800" dirty="0" err="1"/>
+              <a:t>InputIterator</a:t>
+            </a:r>
+            <a:r>
+              <a:rPr lang="en-US" sz="2800" dirty="0"/>
+              <a:t> </a:t>
+            </a:r>
+            <a:r>
+              <a:rPr lang="ru-RU" sz="2800" dirty="0"/>
+              <a:t>и </a:t>
+            </a:r>
+            <a:r>
+              <a:rPr lang="en-US" sz="2800" dirty="0" err="1"/>
+              <a:t>OutputIterator</a:t>
+            </a:r>
+            <a:endParaRPr lang="en-US" sz="2800" dirty="0"/>
+          </a:p>
+        </p:txBody>
+      </p:sp>
+      <p:pic>
+        <p:nvPicPr>
+          <p:cNvPr id="5" name="Picture 4">
+            <a:extLst>
+              <a:ext uri="{FF2B5EF4-FFF2-40B4-BE49-F238E27FC236}">
+                <a16:creationId xmlns:a16="http://schemas.microsoft.com/office/drawing/2014/main" xmlns="" id="{34A4F7A9-FB6D-4A56-A01D-FC2A9E6A3C9D}"/>
+              </a:ext>
+            </a:extLst>
+          </p:cNvPr>
+          <p:cNvPicPr>
+            <a:picLocks noChangeAspect="1"/>
+          </p:cNvPicPr>
+          <p:nvPr/>
+        </p:nvPicPr>
+        <p:blipFill>
+          <a:blip r:embed="rId2"/>
+          <a:stretch>
+            <a:fillRect/>
+          </a:stretch>
+        </p:blipFill>
+        <p:spPr>
+          <a:xfrm>
+            <a:off x="443058" y="816637"/>
+            <a:ext cx="5815995" cy="2750651"/>
+          </a:xfrm>
+          <a:prstGeom prst="rect">
+            <a:avLst/>
+          </a:prstGeom>
+        </p:spPr>
+      </p:pic>
+      <p:pic>
+        <p:nvPicPr>
+          <p:cNvPr id="6" name="Picture 5">
+            <a:extLst>
+              <a:ext uri="{FF2B5EF4-FFF2-40B4-BE49-F238E27FC236}">
+                <a16:creationId xmlns:a16="http://schemas.microsoft.com/office/drawing/2014/main" xmlns="" id="{F1E797CF-4454-4FBB-8EEA-F80C7C5FD663}"/>
+              </a:ext>
+            </a:extLst>
+          </p:cNvPr>
+          <p:cNvPicPr>
+            <a:picLocks noChangeAspect="1"/>
+          </p:cNvPicPr>
+          <p:nvPr/>
+        </p:nvPicPr>
+        <p:blipFill>
+          <a:blip r:embed="rId3"/>
+          <a:stretch>
+            <a:fillRect/>
+          </a:stretch>
+        </p:blipFill>
+        <p:spPr>
+          <a:xfrm>
+            <a:off x="513275" y="4126694"/>
+            <a:ext cx="5777428" cy="1945223"/>
+          </a:xfrm>
+          <a:prstGeom prst="rect">
+            <a:avLst/>
+          </a:prstGeom>
+        </p:spPr>
+      </p:pic>
+      <p:sp>
+        <p:nvSpPr>
+          <p:cNvPr id="7" name="Content Placeholder 2">
+            <a:extLst>
+              <a:ext uri="{FF2B5EF4-FFF2-40B4-BE49-F238E27FC236}">
+                <a16:creationId xmlns:a16="http://schemas.microsoft.com/office/drawing/2014/main" xmlns="" id="{B4FAFC74-F36D-4B61-BE12-E6EFAC28AC60}"/>
+              </a:ext>
+            </a:extLst>
+          </p:cNvPr>
+          <p:cNvSpPr txBox="1">
+            <a:spLocks/>
+          </p:cNvSpPr>
+          <p:nvPr/>
+        </p:nvSpPr>
+        <p:spPr>
+          <a:xfrm>
+            <a:off x="6825677" y="4115900"/>
+            <a:ext cx="5108656" cy="2147821"/>
+          </a:xfrm>
+          <a:prstGeom prst="rect">
+            <a:avLst/>
+          </a:prstGeom>
+          <a:solidFill>
+            <a:schemeClr val="bg1"/>
+          </a:solidFill>
+        </p:spPr>
+        <p:txBody>
+          <a:bodyPr vert="horz" lIns="91440" tIns="45720" rIns="91440" bIns="45720" rtlCol="0">
+            <a:normAutofit/>
+          </a:bodyPr>
+          <a:lstStyle>
+            <a:lvl1pPr marL="342900" indent="-342900" algn="l" defTabSz="457200" rtl="0" eaLnBrk="1" latinLnBrk="0" hangingPunct="1">
+              <a:spcBef>
+                <a:spcPts val="1000"/>
+              </a:spcBef>
+              <a:spcAft>
+                <a:spcPts val="0"/>
+              </a:spcAft>
+              <a:buClr>
+                <a:schemeClr val="accent1"/>
+              </a:buClr>
+              <a:buSzPct val="80000"/>
+              <a:buFont typeface="Wingdings 3" charset="2"/>
+              <a:buChar char=""/>
+              <a:defRPr sz="1800" kern="1200">
+                <a:solidFill>
+                  <a:schemeClr val="tx1">
+                    <a:lumMod val="75000"/>
+                    <a:lumOff val="25000"/>
+                  </a:schemeClr>
+                </a:solidFill>
+                <a:latin typeface="+mn-lt"/>
+                <a:ea typeface="+mn-ea"/>
+                <a:cs typeface="+mn-cs"/>
+              </a:defRPr>
+            </a:lvl1pPr>
+            <a:lvl2pPr marL="742950" indent="-285750" algn="l" defTabSz="457200" rtl="0" eaLnBrk="1" latinLnBrk="0" hangingPunct="1">
+              <a:spcBef>
+                <a:spcPts val="1000"/>
+              </a:spcBef>
+              <a:spcAft>
+                <a:spcPts val="0"/>
+              </a:spcAft>
+              <a:buClr>
+                <a:schemeClr val="accent1"/>
+              </a:buClr>
+              <a:buSzPct val="80000"/>
+              <a:buFont typeface="Wingdings 3" charset="2"/>
+              <a:buChar char=""/>
+              <a:defRPr sz="1600" kern="1200">
+                <a:solidFill>
+                  <a:schemeClr val="tx1">
+                    <a:lumMod val="75000"/>
+                    <a:lumOff val="25000"/>
+                  </a:schemeClr>
+                </a:solidFill>
+                <a:latin typeface="+mn-lt"/>
+                <a:ea typeface="+mn-ea"/>
+                <a:cs typeface="+mn-cs"/>
+              </a:defRPr>
+            </a:lvl2pPr>
+            <a:lvl3pPr marL="1143000" indent="-228600" algn="l" defTabSz="457200" rtl="0" eaLnBrk="1" latinLnBrk="0" hangingPunct="1">
+              <a:spcBef>
+                <a:spcPts val="1000"/>
+              </a:spcBef>
+              <a:spcAft>
+                <a:spcPts val="0"/>
+              </a:spcAft>
+              <a:buClr>
+                <a:schemeClr val="accent1"/>
+              </a:buClr>
+              <a:buSzPct val="80000"/>
+              <a:buFont typeface="Wingdings 3" charset="2"/>
+              <a:buChar char=""/>
+              <a:defRPr sz="1400" kern="1200">
+                <a:solidFill>
+                  <a:schemeClr val="tx1">
+                    <a:lumMod val="75000"/>
+                    <a:lumOff val="25000"/>
+                  </a:schemeClr>
+                </a:solidFill>
+                <a:latin typeface="+mn-lt"/>
+                <a:ea typeface="+mn-ea"/>
+                <a:cs typeface="+mn-cs"/>
+              </a:defRPr>
+            </a:lvl3pPr>
+            <a:lvl4pPr marL="1600200" indent="-228600" algn="l" defTabSz="457200" rtl="0" eaLnBrk="1" latinLnBrk="0" hangingPunct="1">
+              <a:spcBef>
+                <a:spcPts val="1000"/>
+              </a:spcBef>
+              <a:spcAft>
+                <a:spcPts val="0"/>
+              </a:spcAft>
+              <a:buClr>
+                <a:schemeClr val="accent1"/>
+              </a:buClr>
+              <a:buSzPct val="80000"/>
+              <a:buFont typeface="Wingdings 3" charset="2"/>
+              <a:buChar char=""/>
+              <a:defRPr sz="1200" kern="1200">
+                <a:solidFill>
+                  <a:schemeClr val="tx1">
+                    <a:lumMod val="75000"/>
+                    <a:lumOff val="25000"/>
+                  </a:schemeClr>
+                </a:solidFill>
+                <a:latin typeface="+mn-lt"/>
+                <a:ea typeface="+mn-ea"/>
+                <a:cs typeface="+mn-cs"/>
+              </a:defRPr>
+            </a:lvl4pPr>
+            <a:lvl5pPr marL="2057400" indent="-228600" algn="l" defTabSz="457200" rtl="0" eaLnBrk="1" latinLnBrk="0" hangingPunct="1">
+              <a:spcBef>
+                <a:spcPts val="1000"/>
+              </a:spcBef>
+              <a:spcAft>
+                <a:spcPts val="0"/>
+              </a:spcAft>
+              <a:buClr>
+                <a:schemeClr val="accent1"/>
+              </a:buClr>
+              <a:buSzPct val="80000"/>
+              <a:buFont typeface="Wingdings 3" charset="2"/>
+              <a:buChar char=""/>
+              <a:defRPr sz="1200" kern="1200">
+                <a:solidFill>
+                  <a:schemeClr val="tx1">
+                    <a:lumMod val="75000"/>
+                    <a:lumOff val="25000"/>
+                  </a:schemeClr>
+                </a:solidFill>
+                <a:latin typeface="+mn-lt"/>
+                <a:ea typeface="+mn-ea"/>
+                <a:cs typeface="+mn-cs"/>
+              </a:defRPr>
+            </a:lvl5pPr>
+            <a:lvl6pPr marL="2514600" indent="-228600" algn="l" defTabSz="457200" rtl="0" eaLnBrk="1" latinLnBrk="0" hangingPunct="1">
+              <a:spcBef>
+                <a:spcPts val="1000"/>
+              </a:spcBef>
+              <a:spcAft>
+                <a:spcPts val="0"/>
+              </a:spcAft>
+              <a:buClr>
+                <a:schemeClr val="accent1"/>
+              </a:buClr>
+              <a:buSzPct val="80000"/>
+              <a:buFont typeface="Wingdings 3" charset="2"/>
+              <a:buChar char=""/>
+              <a:defRPr sz="1200" kern="1200">
+                <a:solidFill>
+                  <a:schemeClr val="tx1">
+                    <a:lumMod val="75000"/>
+                    <a:lumOff val="25000"/>
+                  </a:schemeClr>
+                </a:solidFill>
+                <a:latin typeface="+mn-lt"/>
+                <a:ea typeface="+mn-ea"/>
+                <a:cs typeface="+mn-cs"/>
+              </a:defRPr>
+            </a:lvl6pPr>
+            <a:lvl7pPr marL="2971800" indent="-228600" algn="l" defTabSz="457200" rtl="0" eaLnBrk="1" latinLnBrk="0" hangingPunct="1">
+              <a:spcBef>
+                <a:spcPts val="1000"/>
+              </a:spcBef>
+              <a:spcAft>
+                <a:spcPts val="0"/>
+              </a:spcAft>
+              <a:buClr>
+                <a:schemeClr val="accent1"/>
+              </a:buClr>
+              <a:buSzPct val="80000"/>
+              <a:buFont typeface="Wingdings 3" charset="2"/>
+              <a:buChar char=""/>
+              <a:defRPr sz="1200" kern="1200">
+                <a:solidFill>
+                  <a:schemeClr val="tx1">
+                    <a:lumMod val="75000"/>
+                    <a:lumOff val="25000"/>
+                  </a:schemeClr>
+                </a:solidFill>
+                <a:latin typeface="+mn-lt"/>
+                <a:ea typeface="+mn-ea"/>
+                <a:cs typeface="+mn-cs"/>
+              </a:defRPr>
+            </a:lvl7pPr>
+            <a:lvl8pPr marL="3429000" indent="-228600" algn="l" defTabSz="457200" rtl="0" eaLnBrk="1" latinLnBrk="0" hangingPunct="1">
+              <a:spcBef>
+                <a:spcPts val="1000"/>
+              </a:spcBef>
+              <a:spcAft>
+                <a:spcPts val="0"/>
+              </a:spcAft>
+              <a:buClr>
+                <a:schemeClr val="accent1"/>
+              </a:buClr>
+              <a:buSzPct val="80000"/>
+              <a:buFont typeface="Wingdings 3" charset="2"/>
+              <a:buChar char=""/>
+              <a:defRPr sz="1200" kern="1200">
+                <a:solidFill>
+                  <a:schemeClr val="tx1">
+                    <a:lumMod val="75000"/>
+                    <a:lumOff val="25000"/>
+                  </a:schemeClr>
+                </a:solidFill>
+                <a:latin typeface="+mn-lt"/>
+                <a:ea typeface="+mn-ea"/>
+                <a:cs typeface="+mn-cs"/>
+              </a:defRPr>
+            </a:lvl8pPr>
+            <a:lvl9pPr marL="3886200" indent="-228600" algn="l" defTabSz="457200" rtl="0" eaLnBrk="1" latinLnBrk="0" hangingPunct="1">
+              <a:spcBef>
+                <a:spcPts val="1000"/>
+              </a:spcBef>
+              <a:spcAft>
+                <a:spcPts val="0"/>
+              </a:spcAft>
+              <a:buClr>
+                <a:schemeClr val="accent1"/>
+              </a:buClr>
+              <a:buSzPct val="80000"/>
+              <a:buFont typeface="Wingdings 3" charset="2"/>
+              <a:buChar char=""/>
+              <a:defRPr sz="1200" kern="1200">
+                <a:solidFill>
+                  <a:schemeClr val="tx1">
+                    <a:lumMod val="75000"/>
+                    <a:lumOff val="25000"/>
+                  </a:schemeClr>
+                </a:solidFill>
+                <a:latin typeface="+mn-lt"/>
+                <a:ea typeface="+mn-ea"/>
+                <a:cs typeface="+mn-cs"/>
+              </a:defRPr>
+            </a:lvl9pPr>
+          </a:lstStyle>
+          <a:p>
+            <a:r>
+              <a:rPr lang="en-US" sz="2000" dirty="0" err="1"/>
+              <a:t>InputIterator</a:t>
+            </a:r>
+            <a:r>
+              <a:rPr lang="en-US" sz="2000" dirty="0"/>
+              <a:t> </a:t>
+            </a:r>
+            <a:r>
+              <a:rPr lang="en-US" sz="2000" dirty="0" err="1"/>
+              <a:t>fisrt</a:t>
+            </a:r>
+            <a:r>
+              <a:rPr lang="en-US" sz="2000" dirty="0"/>
+              <a:t> </a:t>
+            </a:r>
+            <a:r>
+              <a:rPr lang="ru-RU" sz="2000" dirty="0"/>
+              <a:t>стоит слева от знака оператора сравнения. </a:t>
+            </a:r>
+            <a:endParaRPr lang="en-US" sz="2000" dirty="0"/>
+          </a:p>
+          <a:p>
+            <a:r>
+              <a:rPr lang="en-US" sz="2000" dirty="0" err="1"/>
+              <a:t>OutputIterator</a:t>
+            </a:r>
+            <a:r>
+              <a:rPr lang="en-US" sz="2000" dirty="0"/>
+              <a:t> result </a:t>
+            </a:r>
+            <a:r>
+              <a:rPr lang="ru-RU" sz="2000" dirty="0"/>
+              <a:t>изменят совй значение на то, на которое указывает </a:t>
+            </a:r>
+            <a:r>
+              <a:rPr lang="en-US" sz="2000" dirty="0" err="1"/>
+              <a:t>InputIterator</a:t>
+            </a:r>
+            <a:r>
+              <a:rPr lang="en-US" sz="2000" dirty="0"/>
+              <a:t> first</a:t>
+            </a:r>
+          </a:p>
+        </p:txBody>
+      </p:sp>
+    </p:spTree>
+    <p:extLst>
+      <p:ext uri="{BB962C8B-B14F-4D97-AF65-F5344CB8AC3E}">
+        <p14:creationId xmlns:p14="http://schemas.microsoft.com/office/powerpoint/2010/main" val="1005149934"/>
+      </p:ext>
+    </p:extLst>
+  </p:cSld>
+  <p:clrMapOvr>
+    <a:masterClrMapping/>
+  </p:clrMapOvr>
+  <p:timing>
+    <p:tnLst>
+      <p:par>
+        <p:cTn id="1" dur="indefinite" restart="never" nodeType="tmRoot"/>
+      </p:par>
+    </p:tnLst>
+  </p:timing>
+</p:sld>
+</file>
+
+<file path=ppt/slides/slide29.xml><?xml version="1.0" encoding="utf-8"?>
+<p:sld xmlns:a="http://schemas.openxmlformats.org/drawingml/2006/main" xmlns:r="http://schemas.openxmlformats.org/officeDocument/2006/relationships" xmlns:p="http://schemas.openxmlformats.org/presentationml/2006/main">
+  <p:cSld>
+    <p:spTree>
+      <p:nvGrpSpPr>
+        <p:cNvPr id="1" name=""/>
+        <p:cNvGrpSpPr/>
+        <p:nvPr/>
+      </p:nvGrpSpPr>
+      <p:grpSpPr>
+        <a:xfrm>
+          <a:off x="0" y="0"/>
+          <a:ext cx="0" cy="0"/>
+          <a:chOff x="0" y="0"/>
+          <a:chExt cx="0" cy="0"/>
+        </a:xfrm>
+      </p:grpSpPr>
+      <p:sp>
+        <p:nvSpPr>
+          <p:cNvPr id="3" name="Content Placeholder 2">
+            <a:extLst>
+              <a:ext uri="{FF2B5EF4-FFF2-40B4-BE49-F238E27FC236}">
+                <a16:creationId xmlns:a16="http://schemas.microsoft.com/office/drawing/2014/main" xmlns="" id="{8A2ECED4-003D-4CB8-8A92-1A5FD64E89F7}"/>
+              </a:ext>
+            </a:extLst>
+          </p:cNvPr>
+          <p:cNvSpPr>
+            <a:spLocks noGrp="1"/>
+          </p:cNvSpPr>
+          <p:nvPr>
+            <p:ph idx="1"/>
+          </p:nvPr>
+        </p:nvSpPr>
+        <p:spPr>
+          <a:xfrm>
+            <a:off x="7119442" y="783343"/>
+            <a:ext cx="4814891" cy="2151768"/>
+          </a:xfrm>
+          <a:solidFill>
+            <a:schemeClr val="bg1"/>
+          </a:solidFill>
+        </p:spPr>
+        <p:txBody>
+          <a:bodyPr>
+            <a:noAutofit/>
+          </a:bodyPr>
+          <a:lstStyle/>
+          <a:p>
+            <a:r>
+              <a:rPr lang="en-US" sz="2000" dirty="0" err="1"/>
+              <a:t>ForwardIterator</a:t>
+            </a:r>
+            <a:r>
+              <a:rPr lang="en-US" sz="2000" dirty="0"/>
+              <a:t> </a:t>
+            </a:r>
+            <a:r>
+              <a:rPr lang="ru-RU" sz="2000" dirty="0"/>
+              <a:t>объединяет в себе функциональность </a:t>
+            </a:r>
+            <a:r>
+              <a:rPr lang="en-US" sz="2000" dirty="0" err="1"/>
+              <a:t>InutIterator</a:t>
+            </a:r>
+            <a:r>
+              <a:rPr lang="en-US" sz="2000" dirty="0"/>
+              <a:t> </a:t>
+            </a:r>
+            <a:r>
+              <a:rPr lang="ru-RU" sz="2000" dirty="0"/>
+              <a:t>и </a:t>
+            </a:r>
+            <a:r>
+              <a:rPr lang="en-US" sz="2000" dirty="0" err="1"/>
+              <a:t>OutputIterator</a:t>
+            </a:r>
+            <a:endParaRPr lang="en-US" sz="2000" dirty="0"/>
+          </a:p>
+          <a:p>
+            <a:r>
+              <a:rPr lang="ru-RU" sz="2000" dirty="0"/>
+              <a:t>Может использоваться в алгоритмах в качестве любого из них</a:t>
+            </a:r>
+            <a:r>
+              <a:rPr lang="en-US" sz="2000" dirty="0"/>
+              <a:t> </a:t>
+            </a:r>
+          </a:p>
+        </p:txBody>
+      </p:sp>
+      <p:pic>
+        <p:nvPicPr>
+          <p:cNvPr id="4" name="Picture 3">
+            <a:extLst>
+              <a:ext uri="{FF2B5EF4-FFF2-40B4-BE49-F238E27FC236}">
+                <a16:creationId xmlns:a16="http://schemas.microsoft.com/office/drawing/2014/main" xmlns="" id="{7EBB1CAC-E82C-4575-A59E-808C14D22364}"/>
+              </a:ext>
+            </a:extLst>
+          </p:cNvPr>
+          <p:cNvPicPr>
+            <a:picLocks noChangeAspect="1"/>
+          </p:cNvPicPr>
+          <p:nvPr/>
+        </p:nvPicPr>
+        <p:blipFill rotWithShape="1">
+          <a:blip r:embed="rId2"/>
+          <a:srcRect b="10299"/>
+          <a:stretch/>
+        </p:blipFill>
+        <p:spPr>
+          <a:xfrm>
+            <a:off x="443058" y="1097316"/>
+            <a:ext cx="5829300" cy="1307218"/>
+          </a:xfrm>
+          <a:prstGeom prst="rect">
+            <a:avLst/>
+          </a:prstGeom>
+        </p:spPr>
+      </p:pic>
+      <p:sp>
+        <p:nvSpPr>
+          <p:cNvPr id="5" name="Title 1">
+            <a:extLst>
+              <a:ext uri="{FF2B5EF4-FFF2-40B4-BE49-F238E27FC236}">
+                <a16:creationId xmlns:a16="http://schemas.microsoft.com/office/drawing/2014/main" xmlns="" id="{AB45E17C-D635-444C-9E6E-9F0B20ABC34B}"/>
+              </a:ext>
+            </a:extLst>
+          </p:cNvPr>
+          <p:cNvSpPr txBox="1">
+            <a:spLocks/>
+          </p:cNvSpPr>
+          <p:nvPr/>
+        </p:nvSpPr>
+        <p:spPr>
+          <a:xfrm>
+            <a:off x="443058" y="128922"/>
+            <a:ext cx="11491275" cy="476150"/>
+          </a:xfrm>
+          <a:prstGeom prst="rect">
+            <a:avLst/>
+          </a:prstGeom>
+          <a:solidFill>
+            <a:schemeClr val="bg1"/>
+          </a:solidFill>
+          <a:ln>
+            <a:solidFill>
+              <a:schemeClr val="tx1"/>
+            </a:solidFill>
+          </a:ln>
+        </p:spPr>
+        <p:txBody>
+          <a:bodyPr vert="horz" lIns="91440" tIns="45720" rIns="91440" bIns="45720" rtlCol="0" anchor="t">
+            <a:noAutofit/>
+          </a:bodyPr>
+          <a:lstStyle>
+            <a:lvl1pPr algn="l" defTabSz="457200" rtl="0" eaLnBrk="1" latinLnBrk="0" hangingPunct="1">
+              <a:spcBef>
+                <a:spcPct val="0"/>
+              </a:spcBef>
+              <a:buNone/>
+              <a:defRPr sz="3600" kern="1200">
+                <a:solidFill>
+                  <a:schemeClr val="accent1"/>
+                </a:solidFill>
+                <a:latin typeface="+mj-lt"/>
+                <a:ea typeface="+mj-ea"/>
+                <a:cs typeface="+mj-cs"/>
+              </a:defRPr>
+            </a:lvl1pPr>
+            <a:lvl2pPr eaLnBrk="1" hangingPunct="1">
+              <a:defRPr>
+                <a:solidFill>
+                  <a:schemeClr val="tx2"/>
+                </a:solidFill>
+              </a:defRPr>
+            </a:lvl2pPr>
+            <a:lvl3pPr eaLnBrk="1" hangingPunct="1">
+              <a:defRPr>
+                <a:solidFill>
+                  <a:schemeClr val="tx2"/>
+                </a:solidFill>
+              </a:defRPr>
+            </a:lvl3pPr>
+            <a:lvl4pPr eaLnBrk="1" hangingPunct="1">
+              <a:defRPr>
+                <a:solidFill>
+                  <a:schemeClr val="tx2"/>
+                </a:solidFill>
+              </a:defRPr>
+            </a:lvl4pPr>
+            <a:lvl5pPr eaLnBrk="1" hangingPunct="1">
+              <a:defRPr>
+                <a:solidFill>
+                  <a:schemeClr val="tx2"/>
+                </a:solidFill>
+              </a:defRPr>
+            </a:lvl5pPr>
+            <a:lvl6pPr eaLnBrk="1" hangingPunct="1">
+              <a:defRPr>
+                <a:solidFill>
+                  <a:schemeClr val="tx2"/>
+                </a:solidFill>
+              </a:defRPr>
+            </a:lvl6pPr>
+            <a:lvl7pPr eaLnBrk="1" hangingPunct="1">
+              <a:defRPr>
+                <a:solidFill>
+                  <a:schemeClr val="tx2"/>
+                </a:solidFill>
+              </a:defRPr>
+            </a:lvl7pPr>
+            <a:lvl8pPr eaLnBrk="1" hangingPunct="1">
+              <a:defRPr>
+                <a:solidFill>
+                  <a:schemeClr val="tx2"/>
+                </a:solidFill>
+              </a:defRPr>
+            </a:lvl8pPr>
+            <a:lvl9pPr eaLnBrk="1" hangingPunct="1">
+              <a:defRPr>
+                <a:solidFill>
+                  <a:schemeClr val="tx2"/>
+                </a:solidFill>
+              </a:defRPr>
+            </a:lvl9pPr>
+          </a:lstStyle>
+          <a:p>
+            <a:pPr algn="ctr"/>
+            <a:r>
+              <a:rPr lang="en-US" sz="2800" dirty="0"/>
+              <a:t>STL</a:t>
+            </a:r>
+            <a:r>
+              <a:rPr lang="ru-RU" sz="2800" dirty="0"/>
+              <a:t>: </a:t>
+            </a:r>
+            <a:r>
+              <a:rPr lang="en-US" sz="2800" dirty="0" err="1"/>
+              <a:t>ForwardIterator</a:t>
+            </a:r>
+            <a:endParaRPr lang="en-US" sz="2800" dirty="0"/>
+          </a:p>
+        </p:txBody>
+      </p:sp>
+      <p:pic>
+        <p:nvPicPr>
+          <p:cNvPr id="6" name="Picture 5">
+            <a:extLst>
+              <a:ext uri="{FF2B5EF4-FFF2-40B4-BE49-F238E27FC236}">
+                <a16:creationId xmlns:a16="http://schemas.microsoft.com/office/drawing/2014/main" xmlns="" id="{C590E18E-DB35-48A2-8D01-CCDDC5796071}"/>
+              </a:ext>
+            </a:extLst>
+          </p:cNvPr>
+          <p:cNvPicPr>
+            <a:picLocks noChangeAspect="1"/>
+          </p:cNvPicPr>
+          <p:nvPr/>
+        </p:nvPicPr>
+        <p:blipFill>
+          <a:blip r:embed="rId3"/>
+          <a:stretch>
+            <a:fillRect/>
+          </a:stretch>
+        </p:blipFill>
+        <p:spPr>
+          <a:xfrm>
+            <a:off x="561670" y="3429000"/>
+            <a:ext cx="6330420" cy="2385376"/>
+          </a:xfrm>
+          <a:prstGeom prst="rect">
+            <a:avLst/>
+          </a:prstGeom>
+        </p:spPr>
+      </p:pic>
+      <p:sp>
+        <p:nvSpPr>
+          <p:cNvPr id="7" name="Content Placeholder 2">
+            <a:extLst>
+              <a:ext uri="{FF2B5EF4-FFF2-40B4-BE49-F238E27FC236}">
+                <a16:creationId xmlns:a16="http://schemas.microsoft.com/office/drawing/2014/main" xmlns="" id="{6423B81A-58F9-4F18-87B4-FC1F266353F5}"/>
+              </a:ext>
+            </a:extLst>
+          </p:cNvPr>
+          <p:cNvSpPr txBox="1">
+            <a:spLocks/>
+          </p:cNvSpPr>
+          <p:nvPr/>
+        </p:nvSpPr>
+        <p:spPr>
+          <a:xfrm>
+            <a:off x="7119442" y="3545803"/>
+            <a:ext cx="4814891" cy="2787263"/>
+          </a:xfrm>
+          <a:prstGeom prst="rect">
+            <a:avLst/>
+          </a:prstGeom>
+          <a:solidFill>
+            <a:schemeClr val="bg1"/>
+          </a:solidFill>
+        </p:spPr>
+        <p:txBody>
+          <a:bodyPr vert="horz" lIns="91440" tIns="45720" rIns="91440" bIns="45720" rtlCol="0">
+            <a:noAutofit/>
+          </a:bodyPr>
+          <a:lstStyle>
+            <a:lvl1pPr marL="342900" indent="-342900" algn="l" defTabSz="457200" rtl="0" eaLnBrk="1" latinLnBrk="0" hangingPunct="1">
+              <a:spcBef>
+                <a:spcPts val="1000"/>
+              </a:spcBef>
+              <a:spcAft>
+                <a:spcPts val="0"/>
+              </a:spcAft>
+              <a:buClr>
+                <a:schemeClr val="accent1"/>
+              </a:buClr>
+              <a:buSzPct val="80000"/>
+              <a:buFont typeface="Wingdings 3" charset="2"/>
+              <a:buChar char=""/>
+              <a:defRPr sz="1800" kern="1200">
+                <a:solidFill>
+                  <a:schemeClr val="tx1">
+                    <a:lumMod val="75000"/>
+                    <a:lumOff val="25000"/>
+                  </a:schemeClr>
+                </a:solidFill>
+                <a:latin typeface="+mn-lt"/>
+                <a:ea typeface="+mn-ea"/>
+                <a:cs typeface="+mn-cs"/>
+              </a:defRPr>
+            </a:lvl1pPr>
+            <a:lvl2pPr marL="742950" indent="-285750" algn="l" defTabSz="457200" rtl="0" eaLnBrk="1" latinLnBrk="0" hangingPunct="1">
+              <a:spcBef>
+                <a:spcPts val="1000"/>
+              </a:spcBef>
+              <a:spcAft>
+                <a:spcPts val="0"/>
+              </a:spcAft>
+              <a:buClr>
+                <a:schemeClr val="accent1"/>
+              </a:buClr>
+              <a:buSzPct val="80000"/>
+              <a:buFont typeface="Wingdings 3" charset="2"/>
+              <a:buChar char=""/>
+              <a:defRPr sz="1600" kern="1200">
+                <a:solidFill>
+                  <a:schemeClr val="tx1">
+                    <a:lumMod val="75000"/>
+                    <a:lumOff val="25000"/>
+                  </a:schemeClr>
+                </a:solidFill>
+                <a:latin typeface="+mn-lt"/>
+                <a:ea typeface="+mn-ea"/>
+                <a:cs typeface="+mn-cs"/>
+              </a:defRPr>
+            </a:lvl2pPr>
+            <a:lvl3pPr marL="1143000" indent="-228600" algn="l" defTabSz="457200" rtl="0" eaLnBrk="1" latinLnBrk="0" hangingPunct="1">
+              <a:spcBef>
+                <a:spcPts val="1000"/>
+              </a:spcBef>
+              <a:spcAft>
+                <a:spcPts val="0"/>
+              </a:spcAft>
+              <a:buClr>
+                <a:schemeClr val="accent1"/>
+              </a:buClr>
+              <a:buSzPct val="80000"/>
+              <a:buFont typeface="Wingdings 3" charset="2"/>
+              <a:buChar char=""/>
+              <a:defRPr sz="1400" kern="1200">
+                <a:solidFill>
+                  <a:schemeClr val="tx1">
+                    <a:lumMod val="75000"/>
+                    <a:lumOff val="25000"/>
+                  </a:schemeClr>
+                </a:solidFill>
+                <a:latin typeface="+mn-lt"/>
+                <a:ea typeface="+mn-ea"/>
+                <a:cs typeface="+mn-cs"/>
+              </a:defRPr>
+            </a:lvl3pPr>
+            <a:lvl4pPr marL="1600200" indent="-228600" algn="l" defTabSz="457200" rtl="0" eaLnBrk="1" latinLnBrk="0" hangingPunct="1">
+              <a:spcBef>
+                <a:spcPts val="1000"/>
+              </a:spcBef>
+              <a:spcAft>
+                <a:spcPts val="0"/>
+              </a:spcAft>
+              <a:buClr>
+                <a:schemeClr val="accent1"/>
+              </a:buClr>
+              <a:buSzPct val="80000"/>
+              <a:buFont typeface="Wingdings 3" charset="2"/>
+              <a:buChar char=""/>
+              <a:defRPr sz="1200" kern="1200">
+                <a:solidFill>
+                  <a:schemeClr val="tx1">
+                    <a:lumMod val="75000"/>
+                    <a:lumOff val="25000"/>
+                  </a:schemeClr>
+                </a:solidFill>
+                <a:latin typeface="+mn-lt"/>
+                <a:ea typeface="+mn-ea"/>
+                <a:cs typeface="+mn-cs"/>
+              </a:defRPr>
+            </a:lvl4pPr>
+            <a:lvl5pPr marL="2057400" indent="-228600" algn="l" defTabSz="457200" rtl="0" eaLnBrk="1" latinLnBrk="0" hangingPunct="1">
+              <a:spcBef>
+                <a:spcPts val="1000"/>
+              </a:spcBef>
+              <a:spcAft>
+                <a:spcPts val="0"/>
+              </a:spcAft>
+              <a:buClr>
+                <a:schemeClr val="accent1"/>
+              </a:buClr>
+              <a:buSzPct val="80000"/>
+              <a:buFont typeface="Wingdings 3" charset="2"/>
+              <a:buChar char=""/>
+              <a:defRPr sz="1200" kern="1200">
+                <a:solidFill>
+                  <a:schemeClr val="tx1">
+                    <a:lumMod val="75000"/>
+                    <a:lumOff val="25000"/>
+                  </a:schemeClr>
+                </a:solidFill>
+                <a:latin typeface="+mn-lt"/>
+                <a:ea typeface="+mn-ea"/>
+                <a:cs typeface="+mn-cs"/>
+              </a:defRPr>
+            </a:lvl5pPr>
+            <a:lvl6pPr marL="2514600" indent="-228600" algn="l" defTabSz="457200" rtl="0" eaLnBrk="1" latinLnBrk="0" hangingPunct="1">
+              <a:spcBef>
+                <a:spcPts val="1000"/>
+              </a:spcBef>
+              <a:spcAft>
+                <a:spcPts val="0"/>
+              </a:spcAft>
+              <a:buClr>
+                <a:schemeClr val="accent1"/>
+              </a:buClr>
+              <a:buSzPct val="80000"/>
+              <a:buFont typeface="Wingdings 3" charset="2"/>
+              <a:buChar char=""/>
+              <a:defRPr sz="1200" kern="1200">
+                <a:solidFill>
+                  <a:schemeClr val="tx1">
+                    <a:lumMod val="75000"/>
+                    <a:lumOff val="25000"/>
+                  </a:schemeClr>
+                </a:solidFill>
+                <a:latin typeface="+mn-lt"/>
+                <a:ea typeface="+mn-ea"/>
+                <a:cs typeface="+mn-cs"/>
+              </a:defRPr>
+            </a:lvl6pPr>
+            <a:lvl7pPr marL="2971800" indent="-228600" algn="l" defTabSz="457200" rtl="0" eaLnBrk="1" latinLnBrk="0" hangingPunct="1">
+              <a:spcBef>
+                <a:spcPts val="1000"/>
+              </a:spcBef>
+              <a:spcAft>
+                <a:spcPts val="0"/>
+              </a:spcAft>
+              <a:buClr>
+                <a:schemeClr val="accent1"/>
+              </a:buClr>
+              <a:buSzPct val="80000"/>
+              <a:buFont typeface="Wingdings 3" charset="2"/>
+              <a:buChar char=""/>
+              <a:defRPr sz="1200" kern="1200">
+                <a:solidFill>
+                  <a:schemeClr val="tx1">
+                    <a:lumMod val="75000"/>
+                    <a:lumOff val="25000"/>
+                  </a:schemeClr>
+                </a:solidFill>
+                <a:latin typeface="+mn-lt"/>
+                <a:ea typeface="+mn-ea"/>
+                <a:cs typeface="+mn-cs"/>
+              </a:defRPr>
+            </a:lvl7pPr>
+            <a:lvl8pPr marL="3429000" indent="-228600" algn="l" defTabSz="457200" rtl="0" eaLnBrk="1" latinLnBrk="0" hangingPunct="1">
+              <a:spcBef>
+                <a:spcPts val="1000"/>
+              </a:spcBef>
+              <a:spcAft>
+                <a:spcPts val="0"/>
+              </a:spcAft>
+              <a:buClr>
+                <a:schemeClr val="accent1"/>
+              </a:buClr>
+              <a:buSzPct val="80000"/>
+              <a:buFont typeface="Wingdings 3" charset="2"/>
+              <a:buChar char=""/>
+              <a:defRPr sz="1200" kern="1200">
+                <a:solidFill>
+                  <a:schemeClr val="tx1">
+                    <a:lumMod val="75000"/>
+                    <a:lumOff val="25000"/>
+                  </a:schemeClr>
+                </a:solidFill>
+                <a:latin typeface="+mn-lt"/>
+                <a:ea typeface="+mn-ea"/>
+                <a:cs typeface="+mn-cs"/>
+              </a:defRPr>
+            </a:lvl8pPr>
+            <a:lvl9pPr marL="3886200" indent="-228600" algn="l" defTabSz="457200" rtl="0" eaLnBrk="1" latinLnBrk="0" hangingPunct="1">
+              <a:spcBef>
+                <a:spcPts val="1000"/>
+              </a:spcBef>
+              <a:spcAft>
+                <a:spcPts val="0"/>
+              </a:spcAft>
+              <a:buClr>
+                <a:schemeClr val="accent1"/>
+              </a:buClr>
+              <a:buSzPct val="80000"/>
+              <a:buFont typeface="Wingdings 3" charset="2"/>
+              <a:buChar char=""/>
+              <a:defRPr sz="1200" kern="1200">
+                <a:solidFill>
+                  <a:schemeClr val="tx1">
+                    <a:lumMod val="75000"/>
+                    <a:lumOff val="25000"/>
+                  </a:schemeClr>
+                </a:solidFill>
+                <a:latin typeface="+mn-lt"/>
+                <a:ea typeface="+mn-ea"/>
+                <a:cs typeface="+mn-cs"/>
+              </a:defRPr>
+            </a:lvl9pPr>
+          </a:lstStyle>
+          <a:p>
+            <a:r>
+              <a:rPr lang="ru-RU" sz="2000" dirty="0"/>
+              <a:t>И </a:t>
+            </a:r>
+            <a:r>
+              <a:rPr lang="en-US" sz="2000" dirty="0" err="1"/>
+              <a:t>ForwardIterator</a:t>
+            </a:r>
+            <a:r>
+              <a:rPr lang="en-US" sz="2000" dirty="0"/>
+              <a:t> first</a:t>
+            </a:r>
+            <a:r>
+              <a:rPr lang="ru-RU" sz="2000" dirty="0"/>
+              <a:t> стоит по левую сторону от знака оператора сравнения !=, т.е. он определяет этот оператор</a:t>
+            </a:r>
+          </a:p>
+          <a:p>
+            <a:r>
+              <a:rPr lang="en-US" sz="2000" dirty="0" err="1"/>
+              <a:t>ForwardIterator</a:t>
+            </a:r>
+            <a:r>
+              <a:rPr lang="en-US" sz="2000" dirty="0"/>
+              <a:t> first </a:t>
+            </a:r>
+            <a:r>
+              <a:rPr lang="ru-RU" sz="2000" dirty="0"/>
+              <a:t>разыменовывается с изменением значения</a:t>
+            </a:r>
+            <a:endParaRPr lang="en-US" sz="2000" dirty="0"/>
+          </a:p>
+        </p:txBody>
+      </p:sp>
+    </p:spTree>
+    <p:extLst>
+      <p:ext uri="{BB962C8B-B14F-4D97-AF65-F5344CB8AC3E}">
+        <p14:creationId xmlns:p14="http://schemas.microsoft.com/office/powerpoint/2010/main" val="507716601"/>
+      </p:ext>
+    </p:extLst>
+  </p:cSld>
+  <p:clrMapOvr>
+    <a:masterClrMapping/>
+  </p:clrMapOvr>
+  <p:timing>
+    <p:tnLst>
+      <p:par>
+        <p:cTn id="1" dur="indefinite" restart="never" nodeType="tmRoot"/>
+      </p:par>
+    </p:tnLst>
+  </p:timing>
 </p:sld>
 </file>
 

</xml_diff>